<commit_message>
step 100 - build docker image
</commit_message>
<xml_diff>
--- a/Java-Starter.pptx
+++ b/Java-Starter.pptx
@@ -15,6 +15,8 @@
     <p:sldId id="263" r:id="rId9"/>
     <p:sldId id="264" r:id="rId10"/>
     <p:sldId id="265" r:id="rId11"/>
+    <p:sldId id="266" r:id="rId12"/>
+    <p:sldId id="267" r:id="rId13"/>
   </p:sldIdLst>
   <p:sldSz cx="12192000" cy="6858000"/>
   <p:notesSz cx="6858000" cy="9144000"/>
@@ -113,6 +115,11 @@
       </a:defRPr>
     </a:lvl9pPr>
   </p:defaultTextStyle>
+  <p:extLst>
+    <p:ext uri="{EFAFB233-063F-42B5-8137-9DF3F51BA10A}">
+      <p15:sldGuideLst xmlns:p15="http://schemas.microsoft.com/office/powerpoint/2012/main"/>
+    </p:ext>
+  </p:extLst>
 </p:presentation>
 </file>
 
@@ -263,7 +270,7 @@
           <a:p>
             <a:fld id="{D504FEAC-1E62-0E47-82AE-5BB4BD139FFA}" type="datetimeFigureOut">
               <a:rPr lang="de-DE" smtClean="0"/>
-              <a:t>07.11.21</a:t>
+              <a:t>14.12.21</a:t>
             </a:fld>
             <a:endParaRPr lang="de-DE"/>
           </a:p>
@@ -461,7 +468,7 @@
           <a:p>
             <a:fld id="{D504FEAC-1E62-0E47-82AE-5BB4BD139FFA}" type="datetimeFigureOut">
               <a:rPr lang="de-DE" smtClean="0"/>
-              <a:t>07.11.21</a:t>
+              <a:t>14.12.21</a:t>
             </a:fld>
             <a:endParaRPr lang="de-DE"/>
           </a:p>
@@ -669,7 +676,7 @@
           <a:p>
             <a:fld id="{D504FEAC-1E62-0E47-82AE-5BB4BD139FFA}" type="datetimeFigureOut">
               <a:rPr lang="de-DE" smtClean="0"/>
-              <a:t>07.11.21</a:t>
+              <a:t>14.12.21</a:t>
             </a:fld>
             <a:endParaRPr lang="de-DE"/>
           </a:p>
@@ -867,7 +874,7 @@
           <a:p>
             <a:fld id="{D504FEAC-1E62-0E47-82AE-5BB4BD139FFA}" type="datetimeFigureOut">
               <a:rPr lang="de-DE" smtClean="0"/>
-              <a:t>07.11.21</a:t>
+              <a:t>14.12.21</a:t>
             </a:fld>
             <a:endParaRPr lang="de-DE"/>
           </a:p>
@@ -1142,7 +1149,7 @@
           <a:p>
             <a:fld id="{D504FEAC-1E62-0E47-82AE-5BB4BD139FFA}" type="datetimeFigureOut">
               <a:rPr lang="de-DE" smtClean="0"/>
-              <a:t>07.11.21</a:t>
+              <a:t>14.12.21</a:t>
             </a:fld>
             <a:endParaRPr lang="de-DE"/>
           </a:p>
@@ -1407,7 +1414,7 @@
           <a:p>
             <a:fld id="{D504FEAC-1E62-0E47-82AE-5BB4BD139FFA}" type="datetimeFigureOut">
               <a:rPr lang="de-DE" smtClean="0"/>
-              <a:t>07.11.21</a:t>
+              <a:t>14.12.21</a:t>
             </a:fld>
             <a:endParaRPr lang="de-DE"/>
           </a:p>
@@ -1819,7 +1826,7 @@
           <a:p>
             <a:fld id="{D504FEAC-1E62-0E47-82AE-5BB4BD139FFA}" type="datetimeFigureOut">
               <a:rPr lang="de-DE" smtClean="0"/>
-              <a:t>07.11.21</a:t>
+              <a:t>14.12.21</a:t>
             </a:fld>
             <a:endParaRPr lang="de-DE"/>
           </a:p>
@@ -1960,7 +1967,7 @@
           <a:p>
             <a:fld id="{D504FEAC-1E62-0E47-82AE-5BB4BD139FFA}" type="datetimeFigureOut">
               <a:rPr lang="de-DE" smtClean="0"/>
-              <a:t>07.11.21</a:t>
+              <a:t>14.12.21</a:t>
             </a:fld>
             <a:endParaRPr lang="de-DE"/>
           </a:p>
@@ -2073,7 +2080,7 @@
           <a:p>
             <a:fld id="{D504FEAC-1E62-0E47-82AE-5BB4BD139FFA}" type="datetimeFigureOut">
               <a:rPr lang="de-DE" smtClean="0"/>
-              <a:t>07.11.21</a:t>
+              <a:t>14.12.21</a:t>
             </a:fld>
             <a:endParaRPr lang="de-DE"/>
           </a:p>
@@ -2384,7 +2391,7 @@
           <a:p>
             <a:fld id="{D504FEAC-1E62-0E47-82AE-5BB4BD139FFA}" type="datetimeFigureOut">
               <a:rPr lang="de-DE" smtClean="0"/>
-              <a:t>07.11.21</a:t>
+              <a:t>14.12.21</a:t>
             </a:fld>
             <a:endParaRPr lang="de-DE"/>
           </a:p>
@@ -2672,7 +2679,7 @@
           <a:p>
             <a:fld id="{D504FEAC-1E62-0E47-82AE-5BB4BD139FFA}" type="datetimeFigureOut">
               <a:rPr lang="de-DE" smtClean="0"/>
-              <a:t>07.11.21</a:t>
+              <a:t>14.12.21</a:t>
             </a:fld>
             <a:endParaRPr lang="de-DE"/>
           </a:p>
@@ -2913,7 +2920,7 @@
           <a:p>
             <a:fld id="{D504FEAC-1E62-0E47-82AE-5BB4BD139FFA}" type="datetimeFigureOut">
               <a:rPr lang="de-DE" smtClean="0"/>
-              <a:t>07.11.21</a:t>
+              <a:t>14.12.21</a:t>
             </a:fld>
             <a:endParaRPr lang="de-DE"/>
           </a:p>
@@ -3515,6 +3522,186 @@
 </p:sld>
 </file>
 
+<file path=ppt/slides/slide11.xml><?xml version="1.0" encoding="utf-8"?>
+<p:sld xmlns:a="http://schemas.openxmlformats.org/drawingml/2006/main" xmlns:r="http://schemas.openxmlformats.org/officeDocument/2006/relationships" xmlns:p="http://schemas.openxmlformats.org/presentationml/2006/main">
+  <p:cSld>
+    <p:spTree>
+      <p:nvGrpSpPr>
+        <p:cNvPr id="1" name=""/>
+        <p:cNvGrpSpPr/>
+        <p:nvPr/>
+      </p:nvGrpSpPr>
+      <p:grpSpPr>
+        <a:xfrm>
+          <a:off x="0" y="0"/>
+          <a:ext cx="0" cy="0"/>
+          <a:chOff x="0" y="0"/>
+          <a:chExt cx="0" cy="0"/>
+        </a:xfrm>
+      </p:grpSpPr>
+      <p:sp>
+        <p:nvSpPr>
+          <p:cNvPr id="2" name="Titel 1">
+            <a:extLst>
+              <a:ext uri="{FF2B5EF4-FFF2-40B4-BE49-F238E27FC236}">
+                <a16:creationId xmlns:a16="http://schemas.microsoft.com/office/drawing/2014/main" id="{0EC7A146-A8F2-A844-9033-A0ACC828AF47}"/>
+              </a:ext>
+            </a:extLst>
+          </p:cNvPr>
+          <p:cNvSpPr>
+            <a:spLocks noGrp="1"/>
+          </p:cNvSpPr>
+          <p:nvPr>
+            <p:ph type="title"/>
+          </p:nvPr>
+        </p:nvSpPr>
+        <p:spPr/>
+        <p:txBody>
+          <a:bodyPr/>
+          <a:lstStyle/>
+          <a:p>
+            <a:r>
+              <a:rPr lang="de-DE" dirty="0" err="1"/>
+              <a:t>Step</a:t>
+            </a:r>
+            <a:r>
+              <a:rPr lang="de-DE" dirty="0"/>
+              <a:t> 90</a:t>
+            </a:r>
+          </a:p>
+        </p:txBody>
+      </p:sp>
+      <p:sp>
+        <p:nvSpPr>
+          <p:cNvPr id="3" name="Inhaltsplatzhalter 2">
+            <a:extLst>
+              <a:ext uri="{FF2B5EF4-FFF2-40B4-BE49-F238E27FC236}">
+                <a16:creationId xmlns:a16="http://schemas.microsoft.com/office/drawing/2014/main" id="{2A5EBA90-6155-FD45-A74C-ECC42BCA72DF}"/>
+              </a:ext>
+            </a:extLst>
+          </p:cNvPr>
+          <p:cNvSpPr>
+            <a:spLocks noGrp="1"/>
+          </p:cNvSpPr>
+          <p:nvPr>
+            <p:ph idx="1"/>
+          </p:nvPr>
+        </p:nvSpPr>
+        <p:spPr/>
+        <p:txBody>
+          <a:bodyPr/>
+          <a:lstStyle/>
+          <a:p>
+            <a:r>
+              <a:rPr lang="de-DE" dirty="0"/>
+              <a:t>Thema: Persistenz mit Spring Data</a:t>
+            </a:r>
+          </a:p>
+        </p:txBody>
+      </p:sp>
+    </p:spTree>
+    <p:extLst>
+      <p:ext uri="{BB962C8B-B14F-4D97-AF65-F5344CB8AC3E}">
+        <p14:creationId xmlns:p14="http://schemas.microsoft.com/office/powerpoint/2010/main" val="3263348999"/>
+      </p:ext>
+    </p:extLst>
+  </p:cSld>
+  <p:clrMapOvr>
+    <a:masterClrMapping/>
+  </p:clrMapOvr>
+</p:sld>
+</file>
+
+<file path=ppt/slides/slide12.xml><?xml version="1.0" encoding="utf-8"?>
+<p:sld xmlns:a="http://schemas.openxmlformats.org/drawingml/2006/main" xmlns:r="http://schemas.openxmlformats.org/officeDocument/2006/relationships" xmlns:p="http://schemas.openxmlformats.org/presentationml/2006/main">
+  <p:cSld>
+    <p:spTree>
+      <p:nvGrpSpPr>
+        <p:cNvPr id="1" name=""/>
+        <p:cNvGrpSpPr/>
+        <p:nvPr/>
+      </p:nvGrpSpPr>
+      <p:grpSpPr>
+        <a:xfrm>
+          <a:off x="0" y="0"/>
+          <a:ext cx="0" cy="0"/>
+          <a:chOff x="0" y="0"/>
+          <a:chExt cx="0" cy="0"/>
+        </a:xfrm>
+      </p:grpSpPr>
+      <p:sp>
+        <p:nvSpPr>
+          <p:cNvPr id="2" name="Titel 1">
+            <a:extLst>
+              <a:ext uri="{FF2B5EF4-FFF2-40B4-BE49-F238E27FC236}">
+                <a16:creationId xmlns:a16="http://schemas.microsoft.com/office/drawing/2014/main" id="{0EC7A146-A8F2-A844-9033-A0ACC828AF47}"/>
+              </a:ext>
+            </a:extLst>
+          </p:cNvPr>
+          <p:cNvSpPr>
+            <a:spLocks noGrp="1"/>
+          </p:cNvSpPr>
+          <p:nvPr>
+            <p:ph type="title"/>
+          </p:nvPr>
+        </p:nvSpPr>
+        <p:spPr/>
+        <p:txBody>
+          <a:bodyPr/>
+          <a:lstStyle/>
+          <a:p>
+            <a:r>
+              <a:rPr lang="de-DE" dirty="0" err="1"/>
+              <a:t>Step</a:t>
+            </a:r>
+            <a:r>
+              <a:rPr lang="de-DE" dirty="0"/>
+              <a:t> 100</a:t>
+            </a:r>
+          </a:p>
+        </p:txBody>
+      </p:sp>
+      <p:sp>
+        <p:nvSpPr>
+          <p:cNvPr id="3" name="Inhaltsplatzhalter 2">
+            <a:extLst>
+              <a:ext uri="{FF2B5EF4-FFF2-40B4-BE49-F238E27FC236}">
+                <a16:creationId xmlns:a16="http://schemas.microsoft.com/office/drawing/2014/main" id="{2A5EBA90-6155-FD45-A74C-ECC42BCA72DF}"/>
+              </a:ext>
+            </a:extLst>
+          </p:cNvPr>
+          <p:cNvSpPr>
+            <a:spLocks noGrp="1"/>
+          </p:cNvSpPr>
+          <p:nvPr>
+            <p:ph idx="1"/>
+          </p:nvPr>
+        </p:nvSpPr>
+        <p:spPr/>
+        <p:txBody>
+          <a:bodyPr/>
+          <a:lstStyle/>
+          <a:p>
+            <a:r>
+              <a:rPr lang="de-DE" dirty="0"/>
+              <a:t>Thema: Service als Docker-Container</a:t>
+            </a:r>
+          </a:p>
+        </p:txBody>
+      </p:sp>
+    </p:spTree>
+    <p:extLst>
+      <p:ext uri="{BB962C8B-B14F-4D97-AF65-F5344CB8AC3E}">
+        <p14:creationId xmlns:p14="http://schemas.microsoft.com/office/powerpoint/2010/main" val="1059597919"/>
+      </p:ext>
+    </p:extLst>
+  </p:cSld>
+  <p:clrMapOvr>
+    <a:masterClrMapping/>
+  </p:clrMapOvr>
+</p:sld>
+</file>
+
 <file path=ppt/slides/slide2.xml><?xml version="1.0" encoding="utf-8"?>
 <p:sld xmlns:a="http://schemas.openxmlformats.org/drawingml/2006/main" xmlns:r="http://schemas.openxmlformats.org/officeDocument/2006/relationships" xmlns:p="http://schemas.openxmlformats.org/presentationml/2006/main">
   <p:cSld>

</xml_diff>

<commit_message>
update presentation (up to step 0030)
</commit_message>
<xml_diff>
--- a/Java-Starter.pptx
+++ b/Java-Starter.pptx
@@ -11,18 +11,26 @@
     <p:sldId id="271" r:id="rId5"/>
     <p:sldId id="272" r:id="rId6"/>
     <p:sldId id="273" r:id="rId7"/>
-    <p:sldId id="269" r:id="rId8"/>
-    <p:sldId id="268" r:id="rId9"/>
-    <p:sldId id="258" r:id="rId10"/>
-    <p:sldId id="259" r:id="rId11"/>
-    <p:sldId id="260" r:id="rId12"/>
-    <p:sldId id="261" r:id="rId13"/>
-    <p:sldId id="262" r:id="rId14"/>
-    <p:sldId id="263" r:id="rId15"/>
-    <p:sldId id="264" r:id="rId16"/>
-    <p:sldId id="265" r:id="rId17"/>
-    <p:sldId id="266" r:id="rId18"/>
-    <p:sldId id="267" r:id="rId19"/>
+    <p:sldId id="274" r:id="rId8"/>
+    <p:sldId id="275" r:id="rId9"/>
+    <p:sldId id="276" r:id="rId10"/>
+    <p:sldId id="277" r:id="rId11"/>
+    <p:sldId id="269" r:id="rId12"/>
+    <p:sldId id="268" r:id="rId13"/>
+    <p:sldId id="281" r:id="rId14"/>
+    <p:sldId id="283" r:id="rId15"/>
+    <p:sldId id="284" r:id="rId16"/>
+    <p:sldId id="282" r:id="rId17"/>
+    <p:sldId id="259" r:id="rId18"/>
+    <p:sldId id="279" r:id="rId19"/>
+    <p:sldId id="286" r:id="rId20"/>
+    <p:sldId id="261" r:id="rId21"/>
+    <p:sldId id="262" r:id="rId22"/>
+    <p:sldId id="263" r:id="rId23"/>
+    <p:sldId id="264" r:id="rId24"/>
+    <p:sldId id="265" r:id="rId25"/>
+    <p:sldId id="266" r:id="rId26"/>
+    <p:sldId id="267" r:id="rId27"/>
   </p:sldIdLst>
   <p:sldSz cx="12192000" cy="6858000"/>
   <p:notesSz cx="6858000" cy="9144000"/>
@@ -276,7 +284,7 @@
           <a:p>
             <a:fld id="{D504FEAC-1E62-0E47-82AE-5BB4BD139FFA}" type="datetimeFigureOut">
               <a:rPr lang="de-DE" smtClean="0"/>
-              <a:t>21.03.22</a:t>
+              <a:t>27.03.22</a:t>
             </a:fld>
             <a:endParaRPr lang="de-DE"/>
           </a:p>
@@ -474,7 +482,7 @@
           <a:p>
             <a:fld id="{D504FEAC-1E62-0E47-82AE-5BB4BD139FFA}" type="datetimeFigureOut">
               <a:rPr lang="de-DE" smtClean="0"/>
-              <a:t>21.03.22</a:t>
+              <a:t>27.03.22</a:t>
             </a:fld>
             <a:endParaRPr lang="de-DE"/>
           </a:p>
@@ -682,7 +690,7 @@
           <a:p>
             <a:fld id="{D504FEAC-1E62-0E47-82AE-5BB4BD139FFA}" type="datetimeFigureOut">
               <a:rPr lang="de-DE" smtClean="0"/>
-              <a:t>21.03.22</a:t>
+              <a:t>27.03.22</a:t>
             </a:fld>
             <a:endParaRPr lang="de-DE"/>
           </a:p>
@@ -880,7 +888,7 @@
           <a:p>
             <a:fld id="{D504FEAC-1E62-0E47-82AE-5BB4BD139FFA}" type="datetimeFigureOut">
               <a:rPr lang="de-DE" smtClean="0"/>
-              <a:t>21.03.22</a:t>
+              <a:t>27.03.22</a:t>
             </a:fld>
             <a:endParaRPr lang="de-DE"/>
           </a:p>
@@ -1155,7 +1163,7 @@
           <a:p>
             <a:fld id="{D504FEAC-1E62-0E47-82AE-5BB4BD139FFA}" type="datetimeFigureOut">
               <a:rPr lang="de-DE" smtClean="0"/>
-              <a:t>21.03.22</a:t>
+              <a:t>27.03.22</a:t>
             </a:fld>
             <a:endParaRPr lang="de-DE"/>
           </a:p>
@@ -1420,7 +1428,7 @@
           <a:p>
             <a:fld id="{D504FEAC-1E62-0E47-82AE-5BB4BD139FFA}" type="datetimeFigureOut">
               <a:rPr lang="de-DE" smtClean="0"/>
-              <a:t>21.03.22</a:t>
+              <a:t>27.03.22</a:t>
             </a:fld>
             <a:endParaRPr lang="de-DE"/>
           </a:p>
@@ -1832,7 +1840,7 @@
           <a:p>
             <a:fld id="{D504FEAC-1E62-0E47-82AE-5BB4BD139FFA}" type="datetimeFigureOut">
               <a:rPr lang="de-DE" smtClean="0"/>
-              <a:t>21.03.22</a:t>
+              <a:t>27.03.22</a:t>
             </a:fld>
             <a:endParaRPr lang="de-DE"/>
           </a:p>
@@ -1973,7 +1981,7 @@
           <a:p>
             <a:fld id="{D504FEAC-1E62-0E47-82AE-5BB4BD139FFA}" type="datetimeFigureOut">
               <a:rPr lang="de-DE" smtClean="0"/>
-              <a:t>21.03.22</a:t>
+              <a:t>27.03.22</a:t>
             </a:fld>
             <a:endParaRPr lang="de-DE"/>
           </a:p>
@@ -2086,7 +2094,7 @@
           <a:p>
             <a:fld id="{D504FEAC-1E62-0E47-82AE-5BB4BD139FFA}" type="datetimeFigureOut">
               <a:rPr lang="de-DE" smtClean="0"/>
-              <a:t>21.03.22</a:t>
+              <a:t>27.03.22</a:t>
             </a:fld>
             <a:endParaRPr lang="de-DE"/>
           </a:p>
@@ -2397,7 +2405,7 @@
           <a:p>
             <a:fld id="{D504FEAC-1E62-0E47-82AE-5BB4BD139FFA}" type="datetimeFigureOut">
               <a:rPr lang="de-DE" smtClean="0"/>
-              <a:t>21.03.22</a:t>
+              <a:t>27.03.22</a:t>
             </a:fld>
             <a:endParaRPr lang="de-DE"/>
           </a:p>
@@ -2685,7 +2693,7 @@
           <a:p>
             <a:fld id="{D504FEAC-1E62-0E47-82AE-5BB4BD139FFA}" type="datetimeFigureOut">
               <a:rPr lang="de-DE" smtClean="0"/>
-              <a:t>21.03.22</a:t>
+              <a:t>27.03.22</a:t>
             </a:fld>
             <a:endParaRPr lang="de-DE"/>
           </a:p>
@@ -2926,7 +2934,7 @@
           <a:p>
             <a:fld id="{D504FEAC-1E62-0E47-82AE-5BB4BD139FFA}" type="datetimeFigureOut">
               <a:rPr lang="de-DE" smtClean="0"/>
-              <a:t>21.03.22</a:t>
+              <a:t>27.03.22</a:t>
             </a:fld>
             <a:endParaRPr lang="de-DE"/>
           </a:p>
@@ -3462,12 +3470,9 @@
           <a:p>
             <a:r>
               <a:rPr lang="de-DE" dirty="0" err="1"/>
-              <a:t>Step</a:t>
-            </a:r>
-            <a:r>
-              <a:rPr lang="de-DE" dirty="0"/>
-              <a:t> 20</a:t>
-            </a:r>
+              <a:t>Microservices</a:t>
+            </a:r>
+            <a:endParaRPr lang="de-DE" dirty="0"/>
           </a:p>
         </p:txBody>
       </p:sp>
@@ -3489,108 +3494,59 @@
         </p:nvSpPr>
         <p:spPr/>
         <p:txBody>
-          <a:bodyPr/>
-          <a:lstStyle/>
-          <a:p>
-            <a:r>
-              <a:rPr lang="de-DE" dirty="0"/>
-              <a:t>Thema: Nutzung eines </a:t>
-            </a:r>
-            <a:r>
-              <a:rPr lang="de-DE" dirty="0" err="1"/>
-              <a:t>Maven-Plugins</a:t>
-            </a:r>
+          <a:bodyPr>
+            <a:normAutofit/>
+          </a:bodyPr>
+          <a:lstStyle/>
+          <a:p>
+            <a:r>
+              <a:rPr lang="de-DE" dirty="0"/>
+              <a:t>Praxis-Beispiel</a:t>
+            </a:r>
+          </a:p>
+          <a:p>
             <a:endParaRPr lang="de-DE" dirty="0"/>
           </a:p>
           <a:p>
             <a:pPr lvl="1"/>
             <a:r>
               <a:rPr lang="de-DE" dirty="0"/>
-              <a:t>Das </a:t>
-            </a:r>
-            <a:r>
-              <a:rPr lang="de-DE" dirty="0" err="1">
-                <a:latin typeface="Courier New" panose="02070309020205020404" pitchFamily="49" charset="0"/>
-                <a:cs typeface="Courier New" panose="02070309020205020404" pitchFamily="49" charset="0"/>
-              </a:rPr>
-              <a:t>exec</a:t>
-            </a:r>
-            <a:r>
-              <a:rPr lang="de-DE" dirty="0" err="1"/>
-              <a:t>-Plugin</a:t>
-            </a:r>
-            <a:r>
-              <a:rPr lang="de-DE" dirty="0"/>
-              <a:t> ermöglicht es, Java-Programme aus </a:t>
-            </a:r>
-            <a:r>
-              <a:rPr lang="de-DE" dirty="0" err="1"/>
-              <a:t>Maven</a:t>
-            </a:r>
-            <a:r>
-              <a:rPr lang="de-DE" dirty="0"/>
-              <a:t> heraus auszuführen</a:t>
+              <a:t>Neue Vertriebsplattform der Deutschen Bahn</a:t>
             </a:r>
           </a:p>
           <a:p>
             <a:pPr lvl="1"/>
-            <a:r>
-              <a:rPr lang="de-DE" dirty="0"/>
-              <a:t>Kommando: </a:t>
-            </a:r>
-            <a:r>
-              <a:rPr lang="de-DE" dirty="0" err="1">
-                <a:latin typeface="Courier New" panose="02070309020205020404" pitchFamily="49" charset="0"/>
-                <a:cs typeface="Courier New" panose="02070309020205020404" pitchFamily="49" charset="0"/>
-              </a:rPr>
-              <a:t>mvn</a:t>
-            </a:r>
-            <a:r>
-              <a:rPr lang="de-DE" dirty="0">
-                <a:latin typeface="Courier New" panose="02070309020205020404" pitchFamily="49" charset="0"/>
-                <a:cs typeface="Courier New" panose="02070309020205020404" pitchFamily="49" charset="0"/>
-              </a:rPr>
-              <a:t> </a:t>
-            </a:r>
-            <a:r>
-              <a:rPr lang="de-DE" dirty="0" err="1">
-                <a:latin typeface="Courier New" panose="02070309020205020404" pitchFamily="49" charset="0"/>
-                <a:cs typeface="Courier New" panose="02070309020205020404" pitchFamily="49" charset="0"/>
-              </a:rPr>
-              <a:t>exec:java</a:t>
-            </a:r>
-            <a:endParaRPr lang="de-DE" dirty="0">
-              <a:latin typeface="Courier New" panose="02070309020205020404" pitchFamily="49" charset="0"/>
-              <a:cs typeface="Courier New" panose="02070309020205020404" pitchFamily="49" charset="0"/>
-            </a:endParaRPr>
-          </a:p>
-          <a:p>
-            <a:pPr lvl="2"/>
-            <a:r>
-              <a:rPr lang="de-DE" dirty="0" err="1">
-                <a:latin typeface="Courier New" panose="02070309020205020404" pitchFamily="49" charset="0"/>
-                <a:cs typeface="Courier New" panose="02070309020205020404" pitchFamily="49" charset="0"/>
-              </a:rPr>
-              <a:t>exec:java</a:t>
-            </a:r>
-            <a:r>
-              <a:rPr lang="de-DE" dirty="0">
-                <a:latin typeface="Courier New" panose="02070309020205020404" pitchFamily="49" charset="0"/>
-                <a:cs typeface="Courier New" panose="02070309020205020404" pitchFamily="49" charset="0"/>
-              </a:rPr>
-              <a:t> </a:t>
-            </a:r>
-            <a:r>
-              <a:rPr lang="de-DE" dirty="0"/>
-              <a:t>ist ein Goal</a:t>
-            </a:r>
+            <a:endParaRPr lang="de-DE" dirty="0"/>
+          </a:p>
+          <a:p>
+            <a:pPr lvl="1"/>
+            <a:r>
+              <a:rPr lang="de-DE" dirty="0"/>
+              <a:t>Ca. 300 Mitarbeiter</a:t>
+            </a:r>
+          </a:p>
+          <a:p>
+            <a:pPr lvl="1"/>
+            <a:endParaRPr lang="de-DE" dirty="0"/>
+          </a:p>
+          <a:p>
+            <a:pPr lvl="1"/>
+            <a:r>
+              <a:rPr lang="de-DE" dirty="0"/>
+              <a:t>&gt;100 </a:t>
+            </a:r>
+            <a:r>
+              <a:rPr lang="de-DE" dirty="0" err="1"/>
+              <a:t>Microservices</a:t>
+            </a:r>
+            <a:endParaRPr lang="de-DE" dirty="0"/>
           </a:p>
         </p:txBody>
       </p:sp>
     </p:spTree>
     <p:extLst>
       <p:ext uri="{BB962C8B-B14F-4D97-AF65-F5344CB8AC3E}">
-        <p14:creationId xmlns:p14="http://schemas.microsoft.com/office/powerpoint/2010/main" val="3687928113"/>
+        <p14:creationId xmlns:p14="http://schemas.microsoft.com/office/powerpoint/2010/main" val="1063079574"/>
       </p:ext>
     </p:extLst>
   </p:cSld>
@@ -3644,7 +3600,7 @@
             </a:r>
             <a:r>
               <a:rPr lang="de-DE" dirty="0"/>
-              <a:t> 30</a:t>
+              <a:t> 10</a:t>
             </a:r>
           </a:p>
         </p:txBody>
@@ -3672,93 +3628,67 @@
           <a:p>
             <a:r>
               <a:rPr lang="de-DE" dirty="0"/>
-              <a:t>Thema: </a:t>
-            </a:r>
-            <a:r>
-              <a:rPr lang="de-DE" dirty="0" err="1"/>
-              <a:t>Logging</a:t>
-            </a:r>
-            <a:r>
-              <a:rPr lang="de-DE" dirty="0"/>
-              <a:t> mit </a:t>
-            </a:r>
-            <a:r>
-              <a:rPr lang="de-DE" dirty="0">
-                <a:latin typeface="Courier New" panose="02070309020205020404" pitchFamily="49" charset="0"/>
-                <a:cs typeface="Courier New" panose="02070309020205020404" pitchFamily="49" charset="0"/>
-              </a:rPr>
-              <a:t>log4j</a:t>
+              <a:t>Thema: Java</a:t>
             </a:r>
           </a:p>
           <a:p>
             <a:pPr lvl="1"/>
             <a:r>
               <a:rPr lang="de-DE" dirty="0"/>
-              <a:t>Ausgaben sollten in produktivem Code nie mit </a:t>
-            </a:r>
-            <a:r>
-              <a:rPr lang="de-DE" dirty="0" err="1">
-                <a:latin typeface="Courier New" panose="02070309020205020404" pitchFamily="49" charset="0"/>
-                <a:cs typeface="Courier New" panose="02070309020205020404" pitchFamily="49" charset="0"/>
-              </a:rPr>
-              <a:t>System.out.println</a:t>
-            </a:r>
-            <a:r>
-              <a:rPr lang="de-DE" dirty="0"/>
-              <a:t> erfolgen</a:t>
+              <a:t>Objektorientierte Programmiersprache</a:t>
             </a:r>
           </a:p>
           <a:p>
             <a:pPr lvl="1"/>
             <a:r>
               <a:rPr lang="de-DE" dirty="0"/>
-              <a:t>Konzepte von </a:t>
-            </a:r>
-            <a:r>
-              <a:rPr lang="de-DE" dirty="0">
-                <a:latin typeface="Courier New" panose="02070309020205020404" pitchFamily="49" charset="0"/>
-                <a:cs typeface="Courier New" panose="02070309020205020404" pitchFamily="49" charset="0"/>
-              </a:rPr>
-              <a:t>log4j</a:t>
-            </a:r>
-            <a:r>
-              <a:rPr lang="de-DE" dirty="0"/>
-              <a:t>:</a:t>
-            </a:r>
-          </a:p>
-          <a:p>
-            <a:pPr lvl="2"/>
-            <a:r>
-              <a:rPr lang="de-DE" dirty="0"/>
-              <a:t>Logger</a:t>
-            </a:r>
-          </a:p>
-          <a:p>
-            <a:pPr lvl="2"/>
-            <a:r>
-              <a:rPr lang="de-DE" dirty="0" err="1"/>
-              <a:t>Appender</a:t>
-            </a:r>
+              <a:t>Erscheinungsjahr 1996</a:t>
+            </a:r>
+          </a:p>
+          <a:p>
+            <a:pPr lvl="1"/>
+            <a:r>
+              <a:rPr lang="de-DE" dirty="0"/>
+              <a:t>Angelehnt an C++</a:t>
+            </a:r>
+          </a:p>
+          <a:p>
+            <a:pPr lvl="1"/>
             <a:endParaRPr lang="de-DE" dirty="0"/>
           </a:p>
           <a:p>
-            <a:pPr lvl="2"/>
-            <a:r>
-              <a:rPr lang="de-DE" dirty="0" err="1"/>
-              <a:t>Loglevel</a:t>
-            </a:r>
-            <a:endParaRPr lang="de-DE" dirty="0"/>
-          </a:p>
-          <a:p>
-            <a:pPr lvl="2"/>
-            <a:endParaRPr lang="de-DE" dirty="0"/>
+            <a:r>
+              <a:rPr lang="de-DE" dirty="0"/>
+              <a:t>Inzwischen: eine der am weitesten verbreiteten Programmiersprachen</a:t>
+            </a:r>
+            <a:br>
+              <a:rPr lang="de-DE" dirty="0"/>
+            </a:br>
+            <a:r>
+              <a:rPr lang="de-DE" dirty="0"/>
+              <a:t>(zumindest für Unternehmensanwendungen)</a:t>
+            </a:r>
+          </a:p>
+          <a:p>
+            <a:pPr lvl="1"/>
+            <a:r>
+              <a:rPr lang="de-DE" dirty="0"/>
+              <a:t>Plattformunabhängigkeit</a:t>
+            </a:r>
+          </a:p>
+          <a:p>
+            <a:pPr lvl="1"/>
+            <a:r>
+              <a:rPr lang="de-DE" dirty="0"/>
+              <a:t>Große Zahl an Bibliotheken</a:t>
+            </a:r>
           </a:p>
         </p:txBody>
       </p:sp>
     </p:spTree>
     <p:extLst>
       <p:ext uri="{BB962C8B-B14F-4D97-AF65-F5344CB8AC3E}">
-        <p14:creationId xmlns:p14="http://schemas.microsoft.com/office/powerpoint/2010/main" val="2210820269"/>
+        <p14:creationId xmlns:p14="http://schemas.microsoft.com/office/powerpoint/2010/main" val="1585598179"/>
       </p:ext>
     </p:extLst>
   </p:cSld>
@@ -3812,7 +3742,7 @@
             </a:r>
             <a:r>
               <a:rPr lang="de-DE" dirty="0"/>
-              <a:t> 40</a:t>
+              <a:t> 10</a:t>
             </a:r>
           </a:p>
         </p:txBody>
@@ -3840,15 +3770,35 @@
           <a:p>
             <a:r>
               <a:rPr lang="de-DE" dirty="0"/>
-              <a:t>Thema: Strukturierung des Projekts in </a:t>
-            </a:r>
-            <a:r>
-              <a:rPr lang="de-DE" dirty="0" err="1"/>
-              <a:t>Maven</a:t>
-            </a:r>
-            <a:r>
-              <a:rPr lang="de-DE" dirty="0"/>
-              <a:t>-Module</a:t>
+              <a:t>Thema: Java</a:t>
+            </a:r>
+          </a:p>
+          <a:p>
+            <a:pPr lvl="1"/>
+            <a:r>
+              <a:rPr lang="de-DE" dirty="0"/>
+              <a:t>Compiler: </a:t>
+            </a:r>
+            <a:r>
+              <a:rPr lang="de-DE" dirty="0" err="1">
+                <a:latin typeface="Courier New" panose="02070309020205020404" pitchFamily="49" charset="0"/>
+                <a:cs typeface="Courier New" panose="02070309020205020404" pitchFamily="49" charset="0"/>
+              </a:rPr>
+              <a:t>javac</a:t>
+            </a:r>
+            <a:r>
+              <a:rPr lang="de-DE" dirty="0">
+                <a:latin typeface="Courier New" panose="02070309020205020404" pitchFamily="49" charset="0"/>
+                <a:cs typeface="Courier New" panose="02070309020205020404" pitchFamily="49" charset="0"/>
+              </a:rPr>
+              <a:t> </a:t>
+            </a:r>
+            <a:r>
+              <a:rPr lang="de-DE" dirty="0" err="1">
+                <a:latin typeface="Courier New" panose="02070309020205020404" pitchFamily="49" charset="0"/>
+                <a:cs typeface="Courier New" panose="02070309020205020404" pitchFamily="49" charset="0"/>
+              </a:rPr>
+              <a:t>HelloWorld.java</a:t>
             </a:r>
             <a:endParaRPr lang="de-DE" dirty="0">
               <a:latin typeface="Courier New" panose="02070309020205020404" pitchFamily="49" charset="0"/>
@@ -3856,29 +3806,121 @@
             </a:endParaRPr>
           </a:p>
           <a:p>
+            <a:pPr lvl="2"/>
+            <a:r>
+              <a:rPr lang="de-DE" dirty="0"/>
+              <a:t>Übersetzt Quelltext </a:t>
+            </a:r>
+            <a:r>
+              <a:rPr lang="de-DE" dirty="0">
+                <a:latin typeface="Courier New" panose="02070309020205020404" pitchFamily="49" charset="0"/>
+                <a:cs typeface="Courier New" panose="02070309020205020404" pitchFamily="49" charset="0"/>
+              </a:rPr>
+              <a:t>(*.</a:t>
+            </a:r>
+            <a:r>
+              <a:rPr lang="de-DE" dirty="0" err="1">
+                <a:latin typeface="Courier New" panose="02070309020205020404" pitchFamily="49" charset="0"/>
+                <a:cs typeface="Courier New" panose="02070309020205020404" pitchFamily="49" charset="0"/>
+              </a:rPr>
+              <a:t>java</a:t>
+            </a:r>
+            <a:r>
+              <a:rPr lang="de-DE" dirty="0"/>
+              <a:t>) in Java-Bytecode </a:t>
+            </a:r>
+            <a:r>
+              <a:rPr lang="de-DE" dirty="0">
+                <a:latin typeface="Courier New" panose="02070309020205020404" pitchFamily="49" charset="0"/>
+                <a:cs typeface="Courier New" panose="02070309020205020404" pitchFamily="49" charset="0"/>
+              </a:rPr>
+              <a:t>(*.</a:t>
+            </a:r>
+            <a:r>
+              <a:rPr lang="de-DE" dirty="0" err="1">
+                <a:latin typeface="Courier New" panose="02070309020205020404" pitchFamily="49" charset="0"/>
+                <a:cs typeface="Courier New" panose="02070309020205020404" pitchFamily="49" charset="0"/>
+              </a:rPr>
+              <a:t>class</a:t>
+            </a:r>
+            <a:r>
+              <a:rPr lang="de-DE" dirty="0"/>
+              <a:t>)</a:t>
+            </a:r>
+          </a:p>
+          <a:p>
             <a:pPr lvl="1"/>
             <a:r>
               <a:rPr lang="de-DE" dirty="0"/>
-              <a:t>Aufteilung der Definition in Parent und Module</a:t>
-            </a:r>
-          </a:p>
-          <a:p>
-            <a:pPr lvl="1"/>
-            <a:r>
-              <a:rPr lang="de-DE" dirty="0"/>
-              <a:t>Verwaltung der Abhängigkeiten in den Modul-POMs</a:t>
-            </a:r>
-          </a:p>
-          <a:p>
-            <a:pPr lvl="2"/>
-            <a:endParaRPr lang="de-DE" dirty="0"/>
+              <a:t>Ausführung: </a:t>
+            </a:r>
+            <a:r>
+              <a:rPr lang="de-DE" dirty="0" err="1">
+                <a:latin typeface="Courier New" panose="02070309020205020404" pitchFamily="49" charset="0"/>
+                <a:cs typeface="Courier New" panose="02070309020205020404" pitchFamily="49" charset="0"/>
+              </a:rPr>
+              <a:t>java</a:t>
+            </a:r>
+            <a:r>
+              <a:rPr lang="de-DE" dirty="0">
+                <a:latin typeface="Courier New" panose="02070309020205020404" pitchFamily="49" charset="0"/>
+                <a:cs typeface="Courier New" panose="02070309020205020404" pitchFamily="49" charset="0"/>
+              </a:rPr>
+              <a:t> </a:t>
+            </a:r>
+            <a:r>
+              <a:rPr lang="de-DE" dirty="0" err="1">
+                <a:latin typeface="Courier New" panose="02070309020205020404" pitchFamily="49" charset="0"/>
+                <a:cs typeface="Courier New" panose="02070309020205020404" pitchFamily="49" charset="0"/>
+              </a:rPr>
+              <a:t>HelloWorld</a:t>
+            </a:r>
+            <a:endParaRPr lang="de-DE" dirty="0">
+              <a:latin typeface="Courier New" panose="02070309020205020404" pitchFamily="49" charset="0"/>
+              <a:cs typeface="Courier New" panose="02070309020205020404" pitchFamily="49" charset="0"/>
+            </a:endParaRPr>
+          </a:p>
+          <a:p>
+            <a:pPr lvl="2"/>
+            <a:r>
+              <a:rPr lang="de-DE" dirty="0"/>
+              <a:t>Führt Java-Bytecode aus</a:t>
+            </a:r>
+          </a:p>
+          <a:p>
+            <a:pPr lvl="2"/>
+            <a:r>
+              <a:rPr lang="de-DE" dirty="0"/>
+              <a:t>Laufzeitumgebung:</a:t>
+            </a:r>
+          </a:p>
+          <a:p>
+            <a:pPr lvl="3"/>
+            <a:r>
+              <a:rPr lang="de-DE" dirty="0"/>
+              <a:t>Interpreter</a:t>
+            </a:r>
+          </a:p>
+          <a:p>
+            <a:pPr lvl="3"/>
+            <a:r>
+              <a:rPr lang="de-DE" dirty="0"/>
+              <a:t>JIT-Compiler</a:t>
+            </a:r>
+          </a:p>
+          <a:p>
+            <a:pPr lvl="3"/>
+            <a:r>
+              <a:rPr lang="de-DE" dirty="0"/>
+              <a:t>Standard-Bibliotheken</a:t>
+            </a:r>
           </a:p>
         </p:txBody>
       </p:sp>
     </p:spTree>
     <p:extLst>
       <p:ext uri="{BB962C8B-B14F-4D97-AF65-F5344CB8AC3E}">
-        <p14:creationId xmlns:p14="http://schemas.microsoft.com/office/powerpoint/2010/main" val="3784840466"/>
+        <p14:creationId xmlns:p14="http://schemas.microsoft.com/office/powerpoint/2010/main" val="2323058940"/>
       </p:ext>
     </p:extLst>
   </p:cSld>
@@ -3932,7 +3974,7 @@
             </a:r>
             <a:r>
               <a:rPr lang="de-DE" dirty="0"/>
-              <a:t> 50</a:t>
+              <a:t> 15</a:t>
             </a:r>
           </a:p>
         </p:txBody>
@@ -3960,22 +4002,76 @@
           <a:p>
             <a:r>
               <a:rPr lang="de-DE" dirty="0"/>
-              <a:t>Thema: Unit-Tests</a:t>
-            </a:r>
-            <a:endParaRPr lang="de-DE" dirty="0">
-              <a:latin typeface="Courier New" panose="02070309020205020404" pitchFamily="49" charset="0"/>
-              <a:cs typeface="Courier New" panose="02070309020205020404" pitchFamily="49" charset="0"/>
-            </a:endParaRPr>
+              <a:t>Thema: </a:t>
+            </a:r>
+            <a:r>
+              <a:rPr lang="de-DE" dirty="0" err="1"/>
+              <a:t>Build</a:t>
+            </a:r>
+            <a:r>
+              <a:rPr lang="de-DE" dirty="0"/>
+              <a:t>-Management mit </a:t>
+            </a:r>
+            <a:r>
+              <a:rPr lang="de-DE" dirty="0" err="1"/>
+              <a:t>Maven</a:t>
+            </a:r>
+            <a:endParaRPr lang="de-DE" dirty="0"/>
           </a:p>
           <a:p>
             <a:pPr lvl="1"/>
             <a:r>
               <a:rPr lang="de-DE" dirty="0"/>
-              <a:t>Framework für Unit-Tests: </a:t>
-            </a:r>
-            <a:r>
-              <a:rPr lang="de-DE" dirty="0" err="1"/>
-              <a:t>Junit</a:t>
+              <a:t>„</a:t>
+            </a:r>
+            <a:r>
+              <a:rPr lang="de-DE" dirty="0" err="1"/>
+              <a:t>Maven</a:t>
+            </a:r>
+            <a:r>
+              <a:rPr lang="de-DE" dirty="0"/>
+              <a:t> ist ein auf Java basierendes </a:t>
+            </a:r>
+            <a:r>
+              <a:rPr lang="de-DE" dirty="0" err="1"/>
+              <a:t>Build</a:t>
+            </a:r>
+            <a:r>
+              <a:rPr lang="de-DE" dirty="0"/>
+              <a:t>-Management-Tool der Apache Software </a:t>
+            </a:r>
+            <a:r>
+              <a:rPr lang="de-DE" dirty="0" err="1"/>
+              <a:t>Foundation</a:t>
+            </a:r>
+            <a:r>
+              <a:rPr lang="de-DE" dirty="0"/>
+              <a:t>“ (Wikipedia)</a:t>
+            </a:r>
+          </a:p>
+          <a:p>
+            <a:pPr lvl="2"/>
+            <a:r>
+              <a:rPr lang="de-DE" dirty="0"/>
+              <a:t>Gibt Standard-Verzeichnisstruktur und Lebenszyklen (Standard-Ablauf) vor</a:t>
+            </a:r>
+          </a:p>
+          <a:p>
+            <a:pPr lvl="2"/>
+            <a:r>
+              <a:rPr lang="de-DE" dirty="0"/>
+              <a:t>Verwaltet Abhängigkeiten (innerhalb des Projekts und zu benutzten Bibliotheken)</a:t>
+            </a:r>
+          </a:p>
+          <a:p>
+            <a:pPr lvl="2"/>
+            <a:r>
+              <a:rPr lang="de-DE" dirty="0"/>
+              <a:t>Ist erweiterbar durch </a:t>
+            </a:r>
+            <a:r>
+              <a:rPr lang="de-DE" dirty="0" err="1"/>
+              <a:t>Plugins</a:t>
             </a:r>
             <a:endParaRPr lang="de-DE" dirty="0"/>
           </a:p>
@@ -3983,67 +4079,41 @@
             <a:pPr lvl="2"/>
             <a:r>
               <a:rPr lang="de-DE" dirty="0"/>
-              <a:t>Definition und Strukturierung von Tests</a:t>
-            </a:r>
-          </a:p>
-          <a:p>
-            <a:pPr lvl="2"/>
-            <a:r>
-              <a:rPr lang="de-DE" dirty="0"/>
-              <a:t>Ausführung der Tests</a:t>
-            </a:r>
-          </a:p>
-          <a:p>
-            <a:pPr lvl="2"/>
-            <a:r>
-              <a:rPr lang="de-DE" dirty="0"/>
-              <a:t>Darstellung der Ergebnisse</a:t>
-            </a:r>
-          </a:p>
-          <a:p>
-            <a:pPr lvl="1"/>
-            <a:r>
-              <a:rPr lang="de-DE" dirty="0"/>
-              <a:t>Bibliothek für </a:t>
-            </a:r>
-            <a:r>
-              <a:rPr lang="de-DE" dirty="0" err="1"/>
-              <a:t>Assertions</a:t>
-            </a:r>
-            <a:r>
-              <a:rPr lang="de-DE" dirty="0"/>
-              <a:t>: </a:t>
-            </a:r>
-            <a:r>
-              <a:rPr lang="de-DE" dirty="0" err="1"/>
-              <a:t>AssertJ</a:t>
-            </a:r>
-            <a:endParaRPr lang="de-DE" dirty="0"/>
-          </a:p>
-          <a:p>
-            <a:pPr lvl="2"/>
-            <a:r>
-              <a:rPr lang="de-DE" dirty="0"/>
-              <a:t>Formulierung von Test-erwartungen</a:t>
-            </a:r>
-          </a:p>
-          <a:p>
-            <a:pPr lvl="2"/>
-            <a:r>
-              <a:rPr lang="de-DE" dirty="0"/>
-              <a:t>Beispiel für interne DSL</a:t>
-            </a:r>
-          </a:p>
-          <a:p>
-            <a:pPr lvl="2"/>
-            <a:endParaRPr lang="de-DE" dirty="0"/>
+              <a:t>Deklarative Definition des Projekts in </a:t>
+            </a:r>
+            <a:r>
+              <a:rPr lang="de-DE" dirty="0" err="1">
+                <a:latin typeface="Courier New" panose="02070309020205020404" pitchFamily="49" charset="0"/>
+                <a:cs typeface="Courier New" panose="02070309020205020404" pitchFamily="49" charset="0"/>
+              </a:rPr>
+              <a:t>pom.xml</a:t>
+            </a:r>
+            <a:r>
+              <a:rPr lang="de-DE" dirty="0">
+                <a:latin typeface="Courier New" panose="02070309020205020404" pitchFamily="49" charset="0"/>
+                <a:cs typeface="Courier New" panose="02070309020205020404" pitchFamily="49" charset="0"/>
+              </a:rPr>
+              <a:t> </a:t>
+            </a:r>
+            <a:r>
+              <a:rPr lang="de-DE" dirty="0"/>
+              <a:t>(Project </a:t>
+            </a:r>
+            <a:r>
+              <a:rPr lang="de-DE" dirty="0" err="1"/>
+              <a:t>Object</a:t>
+            </a:r>
+            <a:r>
+              <a:rPr lang="de-DE" dirty="0"/>
+              <a:t> Model)</a:t>
+            </a:r>
           </a:p>
         </p:txBody>
       </p:sp>
     </p:spTree>
     <p:extLst>
       <p:ext uri="{BB962C8B-B14F-4D97-AF65-F5344CB8AC3E}">
-        <p14:creationId xmlns:p14="http://schemas.microsoft.com/office/powerpoint/2010/main" val="852841484"/>
+        <p14:creationId xmlns:p14="http://schemas.microsoft.com/office/powerpoint/2010/main" val="3481766806"/>
       </p:ext>
     </p:extLst>
   </p:cSld>
@@ -4097,7 +4167,7 @@
             </a:r>
             <a:r>
               <a:rPr lang="de-DE" dirty="0"/>
-              <a:t> 60</a:t>
+              <a:t> 15</a:t>
             </a:r>
           </a:p>
         </p:txBody>
@@ -4120,122 +4190,245 @@
         </p:nvSpPr>
         <p:spPr/>
         <p:txBody>
-          <a:bodyPr/>
-          <a:lstStyle/>
-          <a:p>
-            <a:r>
-              <a:rPr lang="de-DE" dirty="0"/>
-              <a:t>Thema: Implementierung eines REST-Endpunktes mit Spring Boot</a:t>
-            </a:r>
+          <a:bodyPr>
+            <a:normAutofit/>
+          </a:bodyPr>
+          <a:lstStyle/>
+          <a:p>
+            <a:r>
+              <a:rPr lang="de-DE" dirty="0"/>
+              <a:t>Thema: </a:t>
+            </a:r>
+            <a:r>
+              <a:rPr lang="de-DE" dirty="0" err="1"/>
+              <a:t>Build</a:t>
+            </a:r>
+            <a:r>
+              <a:rPr lang="de-DE" dirty="0"/>
+              <a:t>-Management mit </a:t>
+            </a:r>
+            <a:r>
+              <a:rPr lang="de-DE" dirty="0" err="1"/>
+              <a:t>Maven</a:t>
+            </a:r>
+            <a:endParaRPr lang="de-DE" dirty="0"/>
           </a:p>
           <a:p>
             <a:pPr lvl="1"/>
             <a:r>
+              <a:rPr lang="de-DE" dirty="0"/>
+              <a:t>Identifikation eines </a:t>
+            </a:r>
+            <a:r>
+              <a:rPr lang="de-DE" dirty="0" err="1"/>
+              <a:t>Build</a:t>
+            </a:r>
+            <a:r>
+              <a:rPr lang="de-DE" dirty="0"/>
+              <a:t>-Ergebnis</a:t>
+            </a:r>
+            <a:br>
+              <a:rPr lang="de-DE" dirty="0"/>
+            </a:br>
+            <a:r>
+              <a:rPr lang="de-DE" dirty="0"/>
+              <a:t>(</a:t>
+            </a:r>
+            <a:r>
               <a:rPr lang="de-DE" dirty="0">
-                <a:cs typeface="Courier New" panose="02070309020205020404" pitchFamily="49" charset="0"/>
+                <a:hlinkClick r:id="rId2"/>
               </a:rPr>
-              <a:t>Spring</a:t>
-            </a:r>
-          </a:p>
-          <a:p>
-            <a:pPr lvl="2"/>
+              <a:t>https://maven.apache.org/guides/mini/guide-naming-conventions.html</a:t>
+            </a:r>
+            <a:r>
+              <a:rPr lang="de-DE" dirty="0"/>
+              <a:t>)</a:t>
+            </a:r>
+          </a:p>
+          <a:p>
+            <a:pPr lvl="2"/>
+            <a:r>
+              <a:rPr lang="de-DE" dirty="0" err="1"/>
+              <a:t>groupId</a:t>
+            </a:r>
+            <a:endParaRPr lang="de-DE" dirty="0"/>
+          </a:p>
+          <a:p>
+            <a:pPr lvl="3"/>
+            <a:r>
+              <a:rPr lang="de-DE" dirty="0"/>
+              <a:t>Identifiziert das Projekt</a:t>
+            </a:r>
+          </a:p>
+          <a:p>
+            <a:pPr lvl="3"/>
+            <a:r>
+              <a:rPr lang="de-DE" dirty="0"/>
+              <a:t>Sollte Java </a:t>
+            </a:r>
+            <a:r>
+              <a:rPr lang="de-DE" dirty="0" err="1"/>
+              <a:t>package</a:t>
+            </a:r>
+            <a:r>
+              <a:rPr lang="de-DE" dirty="0"/>
+              <a:t> </a:t>
+            </a:r>
+            <a:r>
+              <a:rPr lang="de-DE" dirty="0" err="1"/>
+              <a:t>name</a:t>
+            </a:r>
+            <a:r>
+              <a:rPr lang="de-DE" dirty="0"/>
+              <a:t> </a:t>
+            </a:r>
+            <a:r>
+              <a:rPr lang="de-DE" dirty="0" err="1"/>
+              <a:t>rules</a:t>
+            </a:r>
+            <a:r>
+              <a:rPr lang="de-DE" dirty="0"/>
+              <a:t> folgen, z. B. </a:t>
+            </a:r>
+            <a:r>
+              <a:rPr lang="de-DE" dirty="0" err="1"/>
+              <a:t>de.conciso.starter</a:t>
+            </a:r>
+            <a:endParaRPr lang="de-DE" dirty="0"/>
+          </a:p>
+          <a:p>
+            <a:pPr lvl="2"/>
+            <a:r>
+              <a:rPr lang="de-DE" dirty="0" err="1"/>
+              <a:t>artifactid</a:t>
+            </a:r>
+            <a:endParaRPr lang="de-DE" dirty="0"/>
+          </a:p>
+          <a:p>
+            <a:pPr lvl="3"/>
+            <a:r>
+              <a:rPr lang="de-DE" dirty="0"/>
+              <a:t>Name des </a:t>
+            </a:r>
+            <a:r>
+              <a:rPr lang="de-DE" dirty="0" err="1"/>
+              <a:t>jar</a:t>
+            </a:r>
+            <a:r>
+              <a:rPr lang="de-DE" dirty="0"/>
+              <a:t> </a:t>
+            </a:r>
+            <a:r>
+              <a:rPr lang="de-DE" dirty="0" err="1"/>
+              <a:t>files</a:t>
+            </a:r>
+            <a:r>
+              <a:rPr lang="de-DE" dirty="0"/>
+              <a:t> (</a:t>
+            </a:r>
+            <a:r>
+              <a:rPr lang="de-DE" dirty="0" err="1"/>
+              <a:t>Build</a:t>
+            </a:r>
+            <a:r>
+              <a:rPr lang="de-DE" dirty="0"/>
+              <a:t>-Ergebnis)</a:t>
+            </a:r>
+          </a:p>
+          <a:p>
+            <a:pPr lvl="3"/>
+            <a:r>
+              <a:rPr lang="de-DE" dirty="0" err="1"/>
+              <a:t>Lowercase</a:t>
+            </a:r>
+            <a:r>
+              <a:rPr lang="de-DE" dirty="0"/>
+              <a:t> </a:t>
+            </a:r>
+            <a:r>
+              <a:rPr lang="de-DE" dirty="0" err="1"/>
+              <a:t>letters</a:t>
+            </a:r>
+            <a:r>
+              <a:rPr lang="de-DE" dirty="0"/>
+              <a:t>, </a:t>
+            </a:r>
+            <a:r>
+              <a:rPr lang="de-DE" dirty="0" err="1"/>
+              <a:t>no</a:t>
+            </a:r>
+            <a:r>
+              <a:rPr lang="de-DE" dirty="0"/>
+              <a:t> </a:t>
+            </a:r>
+            <a:r>
+              <a:rPr lang="de-DE" dirty="0" err="1"/>
+              <a:t>strange</a:t>
+            </a:r>
+            <a:r>
+              <a:rPr lang="de-DE" dirty="0"/>
+              <a:t> </a:t>
+            </a:r>
+            <a:r>
+              <a:rPr lang="de-DE" dirty="0" err="1"/>
+              <a:t>symbols</a:t>
+            </a:r>
+            <a:endParaRPr lang="de-DE" dirty="0"/>
+          </a:p>
+          <a:p>
+            <a:pPr lvl="2"/>
+            <a:r>
+              <a:rPr lang="de-DE" dirty="0" err="1"/>
+              <a:t>version</a:t>
+            </a:r>
+            <a:endParaRPr lang="de-DE" dirty="0"/>
+          </a:p>
+          <a:p>
+            <a:pPr lvl="3"/>
+            <a:r>
+              <a:rPr lang="de-DE" dirty="0"/>
+              <a:t>Typisch: Zahlen und Punkte, z. B. 1.0, 1.1, 1.0.1, …</a:t>
+            </a:r>
+          </a:p>
+          <a:p>
+            <a:pPr lvl="3"/>
+            <a:r>
+              <a:rPr lang="de-DE" dirty="0"/>
+              <a:t>Beispiel: </a:t>
+            </a:r>
+            <a:r>
+              <a:rPr lang="de-DE" dirty="0" err="1"/>
+              <a:t>Semantic</a:t>
+            </a:r>
+            <a:r>
+              <a:rPr lang="de-DE" dirty="0"/>
+              <a:t> </a:t>
+            </a:r>
+            <a:r>
+              <a:rPr lang="de-DE" dirty="0" err="1"/>
+              <a:t>Versioning</a:t>
+            </a:r>
+            <a:r>
+              <a:rPr lang="de-DE" dirty="0"/>
+              <a:t> (</a:t>
+            </a:r>
             <a:r>
               <a:rPr lang="de-DE" dirty="0">
-                <a:cs typeface="Courier New" panose="02070309020205020404" pitchFamily="49" charset="0"/>
+                <a:hlinkClick r:id="rId3"/>
               </a:rPr>
-              <a:t>Java-Framework zur Implementierung von Enterprise </a:t>
-            </a:r>
-            <a:r>
-              <a:rPr lang="de-DE" dirty="0" err="1">
-                <a:cs typeface="Courier New" panose="02070309020205020404" pitchFamily="49" charset="0"/>
-              </a:rPr>
-              <a:t>Applications</a:t>
-            </a:r>
-            <a:endParaRPr lang="de-DE" dirty="0">
-              <a:cs typeface="Courier New" panose="02070309020205020404" pitchFamily="49" charset="0"/>
-            </a:endParaRPr>
-          </a:p>
-          <a:p>
-            <a:pPr lvl="2"/>
-            <a:r>
-              <a:rPr lang="de-DE" dirty="0">
-                <a:cs typeface="Courier New" panose="02070309020205020404" pitchFamily="49" charset="0"/>
-              </a:rPr>
-              <a:t>Kern: Framework für </a:t>
-            </a:r>
-            <a:r>
-              <a:rPr lang="de-DE" dirty="0" err="1">
-                <a:cs typeface="Courier New" panose="02070309020205020404" pitchFamily="49" charset="0"/>
-              </a:rPr>
-              <a:t>Dependency</a:t>
-            </a:r>
-            <a:r>
-              <a:rPr lang="de-DE" dirty="0">
-                <a:cs typeface="Courier New" panose="02070309020205020404" pitchFamily="49" charset="0"/>
-              </a:rPr>
-              <a:t> </a:t>
-            </a:r>
-            <a:r>
-              <a:rPr lang="de-DE" dirty="0" err="1">
-                <a:cs typeface="Courier New" panose="02070309020205020404" pitchFamily="49" charset="0"/>
-              </a:rPr>
-              <a:t>Injection</a:t>
-            </a:r>
-            <a:endParaRPr lang="de-DE" dirty="0">
-              <a:cs typeface="Courier New" panose="02070309020205020404" pitchFamily="49" charset="0"/>
-            </a:endParaRPr>
-          </a:p>
-          <a:p>
-            <a:pPr lvl="2"/>
-            <a:r>
-              <a:rPr lang="de-DE" dirty="0">
-                <a:cs typeface="Courier New" panose="02070309020205020404" pitchFamily="49" charset="0"/>
-              </a:rPr>
-              <a:t>Sehr umfangreich</a:t>
-            </a:r>
-          </a:p>
-          <a:p>
-            <a:pPr lvl="1"/>
-            <a:r>
-              <a:rPr lang="de-DE" dirty="0">
-                <a:cs typeface="Courier New" panose="02070309020205020404" pitchFamily="49" charset="0"/>
-              </a:rPr>
-              <a:t>Spring Boot</a:t>
-            </a:r>
-          </a:p>
-          <a:p>
-            <a:pPr lvl="2"/>
-            <a:r>
-              <a:rPr lang="de-DE" dirty="0">
-                <a:cs typeface="Courier New" panose="02070309020205020404" pitchFamily="49" charset="0"/>
-              </a:rPr>
-              <a:t>Vereinfachte Konfiguration von Spring-Anwendungen (vordefinierte Starter)</a:t>
-            </a:r>
-          </a:p>
-          <a:p>
-            <a:pPr lvl="2"/>
-            <a:r>
-              <a:rPr lang="de-DE" dirty="0">
-                <a:cs typeface="Courier New" panose="02070309020205020404" pitchFamily="49" charset="0"/>
-              </a:rPr>
-              <a:t>Sehr beliebt zur Implementierung von </a:t>
-            </a:r>
-            <a:r>
-              <a:rPr lang="de-DE" dirty="0" err="1">
-                <a:cs typeface="Courier New" panose="02070309020205020404" pitchFamily="49" charset="0"/>
-              </a:rPr>
-              <a:t>Microservices</a:t>
-            </a:r>
-            <a:endParaRPr lang="de-DE" dirty="0">
-              <a:cs typeface="Courier New" panose="02070309020205020404" pitchFamily="49" charset="0"/>
-            </a:endParaRPr>
+              <a:t>https://semver.org/</a:t>
+            </a:r>
+            <a:r>
+              <a:rPr lang="de-DE" dirty="0"/>
+              <a:t>)</a:t>
+            </a:r>
           </a:p>
         </p:txBody>
       </p:sp>
     </p:spTree>
     <p:extLst>
       <p:ext uri="{BB962C8B-B14F-4D97-AF65-F5344CB8AC3E}">
-        <p14:creationId xmlns:p14="http://schemas.microsoft.com/office/powerpoint/2010/main" val="1717894978"/>
+        <p14:creationId xmlns:p14="http://schemas.microsoft.com/office/powerpoint/2010/main" val="3657579033"/>
       </p:ext>
     </p:extLst>
   </p:cSld>
@@ -4289,7 +4482,7 @@
             </a:r>
             <a:r>
               <a:rPr lang="de-DE" dirty="0"/>
-              <a:t> 70</a:t>
+              <a:t> 15</a:t>
             </a:r>
           </a:p>
         </p:txBody>
@@ -4321,27 +4514,98 @@
             </a:r>
             <a:r>
               <a:rPr lang="de-DE" dirty="0" err="1"/>
-              <a:t>Dependency</a:t>
-            </a:r>
-            <a:r>
-              <a:rPr lang="de-DE" dirty="0"/>
-              <a:t> </a:t>
-            </a:r>
-            <a:r>
-              <a:rPr lang="de-DE" dirty="0" err="1"/>
-              <a:t>Injection</a:t>
-            </a:r>
-            <a:r>
-              <a:rPr lang="de-DE" dirty="0"/>
-              <a:t> mit Spring</a:t>
-            </a:r>
+              <a:t>Build</a:t>
+            </a:r>
+            <a:r>
+              <a:rPr lang="de-DE" dirty="0"/>
+              <a:t>-Management mit </a:t>
+            </a:r>
+            <a:r>
+              <a:rPr lang="de-DE" dirty="0" err="1"/>
+              <a:t>Maven</a:t>
+            </a:r>
+            <a:endParaRPr lang="de-DE" dirty="0"/>
+          </a:p>
+          <a:p>
+            <a:pPr lvl="1"/>
+            <a:r>
+              <a:rPr lang="de-DE" dirty="0"/>
+              <a:t>Identifikation eines </a:t>
+            </a:r>
+            <a:r>
+              <a:rPr lang="de-DE" dirty="0" err="1"/>
+              <a:t>Build</a:t>
+            </a:r>
+            <a:r>
+              <a:rPr lang="de-DE" dirty="0"/>
+              <a:t>-Ergebnis</a:t>
+            </a:r>
+          </a:p>
+          <a:p>
+            <a:pPr lvl="2"/>
+            <a:r>
+              <a:rPr lang="de-DE" dirty="0"/>
+              <a:t>Identifikation unseres eigenen Produkts</a:t>
+            </a:r>
+          </a:p>
+          <a:p>
+            <a:pPr lvl="2"/>
+            <a:r>
+              <a:rPr lang="de-DE" dirty="0"/>
+              <a:t>Identifikation fremder </a:t>
+            </a:r>
+            <a:r>
+              <a:rPr lang="de-DE" dirty="0" err="1"/>
+              <a:t>Build</a:t>
+            </a:r>
+            <a:r>
+              <a:rPr lang="de-DE" dirty="0"/>
+              <a:t>-Ergebnisse, die wir nutzen wollen!</a:t>
+            </a:r>
+          </a:p>
+          <a:p>
+            <a:pPr lvl="3"/>
+            <a:r>
+              <a:rPr lang="de-DE" dirty="0"/>
+              <a:t>Woher kommen die?</a:t>
+            </a:r>
+          </a:p>
+          <a:p>
+            <a:pPr lvl="4"/>
+            <a:r>
+              <a:rPr lang="de-DE" dirty="0">
+                <a:hlinkClick r:id="rId2"/>
+              </a:rPr>
+              <a:t>https://mvnrepository.com/</a:t>
+            </a:r>
+            <a:endParaRPr lang="de-DE" dirty="0"/>
+          </a:p>
+          <a:p>
+            <a:pPr lvl="4"/>
+            <a:r>
+              <a:rPr lang="de-DE" dirty="0"/>
+              <a:t>Beispiel: </a:t>
+            </a:r>
+            <a:r>
+              <a:rPr lang="de-DE" dirty="0">
+                <a:hlinkClick r:id="rId3"/>
+              </a:rPr>
+              <a:t>https://mvnrepository.com/artifact/org.apache.logging.log4j/log4j-core</a:t>
+            </a:r>
+            <a:endParaRPr lang="de-DE" dirty="0"/>
+          </a:p>
+          <a:p>
+            <a:pPr marL="1828800" lvl="4" indent="0">
+              <a:buNone/>
+            </a:pPr>
+            <a:endParaRPr lang="de-DE" dirty="0"/>
           </a:p>
         </p:txBody>
       </p:sp>
     </p:spTree>
     <p:extLst>
       <p:ext uri="{BB962C8B-B14F-4D97-AF65-F5344CB8AC3E}">
-        <p14:creationId xmlns:p14="http://schemas.microsoft.com/office/powerpoint/2010/main" val="2804024451"/>
+        <p14:creationId xmlns:p14="http://schemas.microsoft.com/office/powerpoint/2010/main" val="797180529"/>
       </p:ext>
     </p:extLst>
   </p:cSld>
@@ -4395,7 +4659,7 @@
             </a:r>
             <a:r>
               <a:rPr lang="de-DE" dirty="0"/>
-              <a:t> 80</a:t>
+              <a:t> 15</a:t>
             </a:r>
           </a:p>
         </p:txBody>
@@ -4423,31 +4687,89 @@
           <a:p>
             <a:r>
               <a:rPr lang="de-DE" dirty="0"/>
-              <a:t>Thema: Testen mit Mocks</a:t>
-            </a:r>
+              <a:t>Thema: </a:t>
+            </a:r>
+            <a:r>
+              <a:rPr lang="de-DE" dirty="0" err="1"/>
+              <a:t>Build</a:t>
+            </a:r>
+            <a:r>
+              <a:rPr lang="de-DE" dirty="0"/>
+              <a:t>-Management mit </a:t>
+            </a:r>
+            <a:r>
+              <a:rPr lang="de-DE" dirty="0" err="1"/>
+              <a:t>Maven</a:t>
+            </a:r>
+            <a:endParaRPr lang="de-DE" dirty="0"/>
           </a:p>
           <a:p>
             <a:pPr lvl="1"/>
             <a:r>
-              <a:rPr lang="de-DE" dirty="0" err="1"/>
-              <a:t>Mockito</a:t>
-            </a:r>
-            <a:r>
-              <a:rPr lang="de-DE" dirty="0"/>
-              <a:t>: Bibliothek zum Erstellen von Mock-Objekten </a:t>
-            </a:r>
-            <a:r>
-              <a:rPr lang="de-DE"/>
-              <a:t>in Unit-Tests</a:t>
-            </a:r>
-            <a:endParaRPr lang="de-DE" dirty="0"/>
+              <a:rPr lang="de-DE" dirty="0"/>
+              <a:t>Kommando: </a:t>
+            </a:r>
+            <a:r>
+              <a:rPr lang="de-DE" dirty="0" err="1">
+                <a:latin typeface="Courier New" panose="02070309020205020404" pitchFamily="49" charset="0"/>
+                <a:cs typeface="Courier New" panose="02070309020205020404" pitchFamily="49" charset="0"/>
+              </a:rPr>
+              <a:t>mvn</a:t>
+            </a:r>
+            <a:r>
+              <a:rPr lang="de-DE" dirty="0">
+                <a:latin typeface="Courier New" panose="02070309020205020404" pitchFamily="49" charset="0"/>
+                <a:cs typeface="Courier New" panose="02070309020205020404" pitchFamily="49" charset="0"/>
+              </a:rPr>
+              <a:t> clean </a:t>
+            </a:r>
+            <a:r>
+              <a:rPr lang="de-DE" dirty="0" err="1">
+                <a:latin typeface="Courier New" panose="02070309020205020404" pitchFamily="49" charset="0"/>
+                <a:cs typeface="Courier New" panose="02070309020205020404" pitchFamily="49" charset="0"/>
+              </a:rPr>
+              <a:t>package</a:t>
+            </a:r>
+            <a:endParaRPr lang="de-DE" dirty="0">
+              <a:latin typeface="Courier New" panose="02070309020205020404" pitchFamily="49" charset="0"/>
+              <a:cs typeface="Courier New" panose="02070309020205020404" pitchFamily="49" charset="0"/>
+            </a:endParaRPr>
+          </a:p>
+          <a:p>
+            <a:pPr lvl="2"/>
+            <a:r>
+              <a:rPr lang="de-DE" dirty="0">
+                <a:latin typeface="Courier New" panose="02070309020205020404" pitchFamily="49" charset="0"/>
+                <a:cs typeface="Courier New" panose="02070309020205020404" pitchFamily="49" charset="0"/>
+              </a:rPr>
+              <a:t>clean</a:t>
+            </a:r>
+            <a:r>
+              <a:rPr lang="de-DE" dirty="0">
+                <a:cs typeface="Courier New" panose="02070309020205020404" pitchFamily="49" charset="0"/>
+              </a:rPr>
+              <a:t> und </a:t>
+            </a:r>
+            <a:r>
+              <a:rPr lang="de-DE" dirty="0" err="1">
+                <a:latin typeface="Courier New" panose="02070309020205020404" pitchFamily="49" charset="0"/>
+                <a:cs typeface="Courier New" panose="02070309020205020404" pitchFamily="49" charset="0"/>
+              </a:rPr>
+              <a:t>package</a:t>
+            </a:r>
+            <a:r>
+              <a:rPr lang="de-DE" dirty="0">
+                <a:cs typeface="Courier New" panose="02070309020205020404" pitchFamily="49" charset="0"/>
+              </a:rPr>
+              <a:t> sind Lebenszyklen</a:t>
+            </a:r>
           </a:p>
         </p:txBody>
       </p:sp>
     </p:spTree>
     <p:extLst>
       <p:ext uri="{BB962C8B-B14F-4D97-AF65-F5344CB8AC3E}">
-        <p14:creationId xmlns:p14="http://schemas.microsoft.com/office/powerpoint/2010/main" val="1609070468"/>
+        <p14:creationId xmlns:p14="http://schemas.microsoft.com/office/powerpoint/2010/main" val="1999295126"/>
       </p:ext>
     </p:extLst>
   </p:cSld>
@@ -4501,7 +4823,7 @@
             </a:r>
             <a:r>
               <a:rPr lang="de-DE" dirty="0"/>
-              <a:t> 90</a:t>
+              <a:t> 20</a:t>
             </a:r>
           </a:p>
         </p:txBody>
@@ -4529,7 +4851,115 @@
           <a:p>
             <a:r>
               <a:rPr lang="de-DE" dirty="0"/>
-              <a:t>Thema: Persistenz mit Spring Data</a:t>
+              <a:t>Thema: Nutzung eines </a:t>
+            </a:r>
+            <a:r>
+              <a:rPr lang="de-DE" dirty="0" err="1"/>
+              <a:t>Maven-Plugins</a:t>
+            </a:r>
+            <a:endParaRPr lang="de-DE" dirty="0"/>
+          </a:p>
+          <a:p>
+            <a:pPr lvl="1"/>
+            <a:r>
+              <a:rPr lang="de-DE" dirty="0"/>
+              <a:t>Das </a:t>
+            </a:r>
+            <a:r>
+              <a:rPr lang="de-DE" dirty="0" err="1">
+                <a:latin typeface="Courier New" panose="02070309020205020404" pitchFamily="49" charset="0"/>
+                <a:cs typeface="Courier New" panose="02070309020205020404" pitchFamily="49" charset="0"/>
+              </a:rPr>
+              <a:t>exec</a:t>
+            </a:r>
+            <a:r>
+              <a:rPr lang="de-DE" dirty="0" err="1"/>
+              <a:t>-Plugin</a:t>
+            </a:r>
+            <a:r>
+              <a:rPr lang="de-DE" dirty="0"/>
+              <a:t> ermöglicht es, Java-Programme aus </a:t>
+            </a:r>
+            <a:r>
+              <a:rPr lang="de-DE" dirty="0" err="1"/>
+              <a:t>Maven</a:t>
+            </a:r>
+            <a:r>
+              <a:rPr lang="de-DE" dirty="0"/>
+              <a:t> heraus auszuführen</a:t>
+            </a:r>
+          </a:p>
+          <a:p>
+            <a:pPr lvl="2"/>
+            <a:r>
+              <a:rPr lang="de-DE" dirty="0">
+                <a:hlinkClick r:id="rId2"/>
+              </a:rPr>
+              <a:t>http://www.mojohaus.org/exec-maven-plugin/</a:t>
+            </a:r>
+            <a:endParaRPr lang="de-DE" dirty="0"/>
+          </a:p>
+          <a:p>
+            <a:pPr lvl="2"/>
+            <a:r>
+              <a:rPr lang="de-DE" dirty="0">
+                <a:hlinkClick r:id="rId3"/>
+              </a:rPr>
+              <a:t>https://mvnrepository.com/artifact/org.codehaus.mojo/exec-maven-plugin</a:t>
+            </a:r>
+            <a:endParaRPr lang="de-DE" dirty="0"/>
+          </a:p>
+          <a:p>
+            <a:pPr lvl="1"/>
+            <a:r>
+              <a:rPr lang="de-DE" dirty="0"/>
+              <a:t>Kommando: </a:t>
+            </a:r>
+            <a:r>
+              <a:rPr lang="de-DE" dirty="0" err="1">
+                <a:latin typeface="Courier New" panose="02070309020205020404" pitchFamily="49" charset="0"/>
+                <a:cs typeface="Courier New" panose="02070309020205020404" pitchFamily="49" charset="0"/>
+              </a:rPr>
+              <a:t>mvn</a:t>
+            </a:r>
+            <a:r>
+              <a:rPr lang="de-DE" dirty="0">
+                <a:latin typeface="Courier New" panose="02070309020205020404" pitchFamily="49" charset="0"/>
+                <a:cs typeface="Courier New" panose="02070309020205020404" pitchFamily="49" charset="0"/>
+              </a:rPr>
+              <a:t> </a:t>
+            </a:r>
+            <a:r>
+              <a:rPr lang="de-DE" dirty="0" err="1">
+                <a:latin typeface="Courier New" panose="02070309020205020404" pitchFamily="49" charset="0"/>
+                <a:cs typeface="Courier New" panose="02070309020205020404" pitchFamily="49" charset="0"/>
+              </a:rPr>
+              <a:t>exec:java</a:t>
+            </a:r>
+            <a:endParaRPr lang="de-DE" dirty="0">
+              <a:latin typeface="Courier New" panose="02070309020205020404" pitchFamily="49" charset="0"/>
+              <a:cs typeface="Courier New" panose="02070309020205020404" pitchFamily="49" charset="0"/>
+            </a:endParaRPr>
+          </a:p>
+          <a:p>
+            <a:pPr lvl="2"/>
+            <a:r>
+              <a:rPr lang="de-DE" dirty="0" err="1">
+                <a:latin typeface="Courier New" panose="02070309020205020404" pitchFamily="49" charset="0"/>
+                <a:cs typeface="Courier New" panose="02070309020205020404" pitchFamily="49" charset="0"/>
+              </a:rPr>
+              <a:t>exec:java</a:t>
+            </a:r>
+            <a:r>
+              <a:rPr lang="de-DE" dirty="0">
+                <a:latin typeface="Courier New" panose="02070309020205020404" pitchFamily="49" charset="0"/>
+                <a:cs typeface="Courier New" panose="02070309020205020404" pitchFamily="49" charset="0"/>
+              </a:rPr>
+              <a:t> </a:t>
+            </a:r>
+            <a:r>
+              <a:rPr lang="de-DE" dirty="0"/>
+              <a:t>ist ein Goal</a:t>
             </a:r>
           </a:p>
         </p:txBody>
@@ -4537,7 +4967,7 @@
     </p:spTree>
     <p:extLst>
       <p:ext uri="{BB962C8B-B14F-4D97-AF65-F5344CB8AC3E}">
-        <p14:creationId xmlns:p14="http://schemas.microsoft.com/office/powerpoint/2010/main" val="3263348999"/>
+        <p14:creationId xmlns:p14="http://schemas.microsoft.com/office/powerpoint/2010/main" val="3687928113"/>
       </p:ext>
     </p:extLst>
   </p:cSld>
@@ -4591,7 +5021,7 @@
             </a:r>
             <a:r>
               <a:rPr lang="de-DE" dirty="0"/>
-              <a:t> 100</a:t>
+              <a:t> 30</a:t>
             </a:r>
           </a:p>
         </p:txBody>
@@ -4619,15 +5049,236 @@
           <a:p>
             <a:r>
               <a:rPr lang="de-DE" dirty="0"/>
-              <a:t>Thema: Service als Docker-Container</a:t>
-            </a:r>
+              <a:t>Thema: </a:t>
+            </a:r>
+            <a:r>
+              <a:rPr lang="de-DE" dirty="0" err="1"/>
+              <a:t>Logging</a:t>
+            </a:r>
+            <a:r>
+              <a:rPr lang="de-DE" dirty="0"/>
+              <a:t> mit </a:t>
+            </a:r>
+            <a:r>
+              <a:rPr lang="de-DE" dirty="0">
+                <a:latin typeface="Courier New" panose="02070309020205020404" pitchFamily="49" charset="0"/>
+                <a:cs typeface="Courier New" panose="02070309020205020404" pitchFamily="49" charset="0"/>
+              </a:rPr>
+              <a:t>log4j</a:t>
+            </a:r>
+          </a:p>
+          <a:p>
+            <a:pPr lvl="1"/>
+            <a:r>
+              <a:rPr lang="de-DE" dirty="0"/>
+              <a:t>Weit verbreitete Bibliothek für </a:t>
+            </a:r>
+            <a:r>
+              <a:rPr lang="de-DE" dirty="0" err="1"/>
+              <a:t>Logging</a:t>
+            </a:r>
+            <a:endParaRPr lang="de-DE" dirty="0"/>
+          </a:p>
+          <a:p>
+            <a:pPr lvl="2"/>
+            <a:r>
+              <a:rPr lang="de-DE" dirty="0">
+                <a:hlinkClick r:id="rId2"/>
+              </a:rPr>
+              <a:t>https://logging.apache.org/log4j/2.x/</a:t>
+            </a:r>
+            <a:endParaRPr lang="de-DE" dirty="0"/>
+          </a:p>
+          <a:p>
+            <a:pPr lvl="2"/>
+            <a:r>
+              <a:rPr lang="de-DE" dirty="0">
+                <a:hlinkClick r:id="rId3"/>
+              </a:rPr>
+              <a:t>https://mvnrepository.com/artifact/org.apache.logging.log4j/log4j-core</a:t>
+            </a:r>
+            <a:endParaRPr lang="de-DE" dirty="0"/>
+          </a:p>
+          <a:p>
+            <a:pPr marL="914400" lvl="2" indent="0">
+              <a:buNone/>
+            </a:pPr>
+            <a:endParaRPr lang="de-DE" dirty="0"/>
           </a:p>
         </p:txBody>
       </p:sp>
     </p:spTree>
     <p:extLst>
       <p:ext uri="{BB962C8B-B14F-4D97-AF65-F5344CB8AC3E}">
-        <p14:creationId xmlns:p14="http://schemas.microsoft.com/office/powerpoint/2010/main" val="1059597919"/>
+        <p14:creationId xmlns:p14="http://schemas.microsoft.com/office/powerpoint/2010/main" val="1390217071"/>
+      </p:ext>
+    </p:extLst>
+  </p:cSld>
+  <p:clrMapOvr>
+    <a:masterClrMapping/>
+  </p:clrMapOvr>
+</p:sld>
+</file>
+
+<file path=ppt/slides/slide19.xml><?xml version="1.0" encoding="utf-8"?>
+<p:sld xmlns:a="http://schemas.openxmlformats.org/drawingml/2006/main" xmlns:r="http://schemas.openxmlformats.org/officeDocument/2006/relationships" xmlns:p="http://schemas.openxmlformats.org/presentationml/2006/main">
+  <p:cSld>
+    <p:spTree>
+      <p:nvGrpSpPr>
+        <p:cNvPr id="1" name=""/>
+        <p:cNvGrpSpPr/>
+        <p:nvPr/>
+      </p:nvGrpSpPr>
+      <p:grpSpPr>
+        <a:xfrm>
+          <a:off x="0" y="0"/>
+          <a:ext cx="0" cy="0"/>
+          <a:chOff x="0" y="0"/>
+          <a:chExt cx="0" cy="0"/>
+        </a:xfrm>
+      </p:grpSpPr>
+      <p:sp>
+        <p:nvSpPr>
+          <p:cNvPr id="2" name="Titel 1">
+            <a:extLst>
+              <a:ext uri="{FF2B5EF4-FFF2-40B4-BE49-F238E27FC236}">
+                <a16:creationId xmlns:a16="http://schemas.microsoft.com/office/drawing/2014/main" id="{0EC7A146-A8F2-A844-9033-A0ACC828AF47}"/>
+              </a:ext>
+            </a:extLst>
+          </p:cNvPr>
+          <p:cNvSpPr>
+            <a:spLocks noGrp="1"/>
+          </p:cNvSpPr>
+          <p:nvPr>
+            <p:ph type="title"/>
+          </p:nvPr>
+        </p:nvSpPr>
+        <p:spPr/>
+        <p:txBody>
+          <a:bodyPr/>
+          <a:lstStyle/>
+          <a:p>
+            <a:r>
+              <a:rPr lang="de-DE" dirty="0" err="1"/>
+              <a:t>Step</a:t>
+            </a:r>
+            <a:r>
+              <a:rPr lang="de-DE" dirty="0"/>
+              <a:t> 30</a:t>
+            </a:r>
+          </a:p>
+        </p:txBody>
+      </p:sp>
+      <p:sp>
+        <p:nvSpPr>
+          <p:cNvPr id="3" name="Inhaltsplatzhalter 2">
+            <a:extLst>
+              <a:ext uri="{FF2B5EF4-FFF2-40B4-BE49-F238E27FC236}">
+                <a16:creationId xmlns:a16="http://schemas.microsoft.com/office/drawing/2014/main" id="{2A5EBA90-6155-FD45-A74C-ECC42BCA72DF}"/>
+              </a:ext>
+            </a:extLst>
+          </p:cNvPr>
+          <p:cNvSpPr>
+            <a:spLocks noGrp="1"/>
+          </p:cNvSpPr>
+          <p:nvPr>
+            <p:ph idx="1"/>
+          </p:nvPr>
+        </p:nvSpPr>
+        <p:spPr/>
+        <p:txBody>
+          <a:bodyPr/>
+          <a:lstStyle/>
+          <a:p>
+            <a:r>
+              <a:rPr lang="de-DE" dirty="0"/>
+              <a:t>Thema: </a:t>
+            </a:r>
+            <a:r>
+              <a:rPr lang="de-DE" dirty="0" err="1"/>
+              <a:t>Logging</a:t>
+            </a:r>
+            <a:r>
+              <a:rPr lang="de-DE" dirty="0"/>
+              <a:t> mit </a:t>
+            </a:r>
+            <a:r>
+              <a:rPr lang="de-DE" dirty="0">
+                <a:latin typeface="Courier New" panose="02070309020205020404" pitchFamily="49" charset="0"/>
+                <a:cs typeface="Courier New" panose="02070309020205020404" pitchFamily="49" charset="0"/>
+              </a:rPr>
+              <a:t>log4j</a:t>
+            </a:r>
+          </a:p>
+          <a:p>
+            <a:pPr lvl="1"/>
+            <a:r>
+              <a:rPr lang="de-DE" dirty="0"/>
+              <a:t>Ausgaben sollten in produktivem Code nie mit </a:t>
+            </a:r>
+            <a:r>
+              <a:rPr lang="de-DE" dirty="0" err="1">
+                <a:latin typeface="Courier New" panose="02070309020205020404" pitchFamily="49" charset="0"/>
+                <a:cs typeface="Courier New" panose="02070309020205020404" pitchFamily="49" charset="0"/>
+              </a:rPr>
+              <a:t>System.out.println</a:t>
+            </a:r>
+            <a:r>
+              <a:rPr lang="de-DE" dirty="0"/>
+              <a:t> erfolgen!</a:t>
+            </a:r>
+          </a:p>
+          <a:p>
+            <a:pPr lvl="1"/>
+            <a:r>
+              <a:rPr lang="de-DE" dirty="0"/>
+              <a:t>Konzepte von </a:t>
+            </a:r>
+            <a:r>
+              <a:rPr lang="de-DE" dirty="0">
+                <a:latin typeface="Courier New" panose="02070309020205020404" pitchFamily="49" charset="0"/>
+                <a:cs typeface="Courier New" panose="02070309020205020404" pitchFamily="49" charset="0"/>
+              </a:rPr>
+              <a:t>log4j</a:t>
+            </a:r>
+            <a:r>
+              <a:rPr lang="de-DE" dirty="0"/>
+              <a:t>:</a:t>
+            </a:r>
+          </a:p>
+          <a:p>
+            <a:pPr lvl="2"/>
+            <a:r>
+              <a:rPr lang="de-DE" dirty="0"/>
+              <a:t>Logger</a:t>
+            </a:r>
+          </a:p>
+          <a:p>
+            <a:pPr lvl="2"/>
+            <a:r>
+              <a:rPr lang="de-DE" dirty="0" err="1"/>
+              <a:t>Appender</a:t>
+            </a:r>
+            <a:endParaRPr lang="de-DE" dirty="0"/>
+          </a:p>
+          <a:p>
+            <a:pPr lvl="2"/>
+            <a:r>
+              <a:rPr lang="de-DE" dirty="0" err="1"/>
+              <a:t>Loglevel</a:t>
+            </a:r>
+            <a:endParaRPr lang="de-DE" dirty="0"/>
+          </a:p>
+          <a:p>
+            <a:pPr lvl="2"/>
+            <a:endParaRPr lang="de-DE" dirty="0"/>
+          </a:p>
+        </p:txBody>
+      </p:sp>
+    </p:spTree>
+    <p:extLst>
+      <p:ext uri="{BB962C8B-B14F-4D97-AF65-F5344CB8AC3E}">
+        <p14:creationId xmlns:p14="http://schemas.microsoft.com/office/powerpoint/2010/main" val="3255580773"/>
       </p:ext>
     </p:extLst>
   </p:cSld>
@@ -4824,6 +5475,875 @@
     <p:extLst>
       <p:ext uri="{BB962C8B-B14F-4D97-AF65-F5344CB8AC3E}">
         <p14:creationId xmlns:p14="http://schemas.microsoft.com/office/powerpoint/2010/main" val="1544965855"/>
+      </p:ext>
+    </p:extLst>
+  </p:cSld>
+  <p:clrMapOvr>
+    <a:masterClrMapping/>
+  </p:clrMapOvr>
+</p:sld>
+</file>
+
+<file path=ppt/slides/slide20.xml><?xml version="1.0" encoding="utf-8"?>
+<p:sld xmlns:a="http://schemas.openxmlformats.org/drawingml/2006/main" xmlns:r="http://schemas.openxmlformats.org/officeDocument/2006/relationships" xmlns:p="http://schemas.openxmlformats.org/presentationml/2006/main">
+  <p:cSld>
+    <p:spTree>
+      <p:nvGrpSpPr>
+        <p:cNvPr id="1" name=""/>
+        <p:cNvGrpSpPr/>
+        <p:nvPr/>
+      </p:nvGrpSpPr>
+      <p:grpSpPr>
+        <a:xfrm>
+          <a:off x="0" y="0"/>
+          <a:ext cx="0" cy="0"/>
+          <a:chOff x="0" y="0"/>
+          <a:chExt cx="0" cy="0"/>
+        </a:xfrm>
+      </p:grpSpPr>
+      <p:sp>
+        <p:nvSpPr>
+          <p:cNvPr id="2" name="Titel 1">
+            <a:extLst>
+              <a:ext uri="{FF2B5EF4-FFF2-40B4-BE49-F238E27FC236}">
+                <a16:creationId xmlns:a16="http://schemas.microsoft.com/office/drawing/2014/main" id="{0EC7A146-A8F2-A844-9033-A0ACC828AF47}"/>
+              </a:ext>
+            </a:extLst>
+          </p:cNvPr>
+          <p:cNvSpPr>
+            <a:spLocks noGrp="1"/>
+          </p:cNvSpPr>
+          <p:nvPr>
+            <p:ph type="title"/>
+          </p:nvPr>
+        </p:nvSpPr>
+        <p:spPr/>
+        <p:txBody>
+          <a:bodyPr/>
+          <a:lstStyle/>
+          <a:p>
+            <a:r>
+              <a:rPr lang="de-DE" dirty="0" err="1"/>
+              <a:t>Step</a:t>
+            </a:r>
+            <a:r>
+              <a:rPr lang="de-DE" dirty="0"/>
+              <a:t> 40</a:t>
+            </a:r>
+          </a:p>
+        </p:txBody>
+      </p:sp>
+      <p:sp>
+        <p:nvSpPr>
+          <p:cNvPr id="3" name="Inhaltsplatzhalter 2">
+            <a:extLst>
+              <a:ext uri="{FF2B5EF4-FFF2-40B4-BE49-F238E27FC236}">
+                <a16:creationId xmlns:a16="http://schemas.microsoft.com/office/drawing/2014/main" id="{2A5EBA90-6155-FD45-A74C-ECC42BCA72DF}"/>
+              </a:ext>
+            </a:extLst>
+          </p:cNvPr>
+          <p:cNvSpPr>
+            <a:spLocks noGrp="1"/>
+          </p:cNvSpPr>
+          <p:nvPr>
+            <p:ph idx="1"/>
+          </p:nvPr>
+        </p:nvSpPr>
+        <p:spPr/>
+        <p:txBody>
+          <a:bodyPr/>
+          <a:lstStyle/>
+          <a:p>
+            <a:r>
+              <a:rPr lang="de-DE" dirty="0"/>
+              <a:t>Thema: Strukturierung des Projekts in </a:t>
+            </a:r>
+            <a:r>
+              <a:rPr lang="de-DE" dirty="0" err="1"/>
+              <a:t>Maven</a:t>
+            </a:r>
+            <a:r>
+              <a:rPr lang="de-DE" dirty="0"/>
+              <a:t>-Module</a:t>
+            </a:r>
+            <a:endParaRPr lang="de-DE" dirty="0">
+              <a:latin typeface="Courier New" panose="02070309020205020404" pitchFamily="49" charset="0"/>
+              <a:cs typeface="Courier New" panose="02070309020205020404" pitchFamily="49" charset="0"/>
+            </a:endParaRPr>
+          </a:p>
+          <a:p>
+            <a:pPr lvl="1"/>
+            <a:r>
+              <a:rPr lang="de-DE" dirty="0"/>
+              <a:t>Aufteilung der Definition in Parent und Module</a:t>
+            </a:r>
+          </a:p>
+          <a:p>
+            <a:pPr lvl="1"/>
+            <a:r>
+              <a:rPr lang="de-DE" dirty="0"/>
+              <a:t>Verwaltung der Abhängigkeiten in den Modul-POMs</a:t>
+            </a:r>
+          </a:p>
+          <a:p>
+            <a:pPr lvl="2"/>
+            <a:endParaRPr lang="de-DE" dirty="0"/>
+          </a:p>
+        </p:txBody>
+      </p:sp>
+    </p:spTree>
+    <p:extLst>
+      <p:ext uri="{BB962C8B-B14F-4D97-AF65-F5344CB8AC3E}">
+        <p14:creationId xmlns:p14="http://schemas.microsoft.com/office/powerpoint/2010/main" val="3784840466"/>
+      </p:ext>
+    </p:extLst>
+  </p:cSld>
+  <p:clrMapOvr>
+    <a:masterClrMapping/>
+  </p:clrMapOvr>
+</p:sld>
+</file>
+
+<file path=ppt/slides/slide21.xml><?xml version="1.0" encoding="utf-8"?>
+<p:sld xmlns:a="http://schemas.openxmlformats.org/drawingml/2006/main" xmlns:r="http://schemas.openxmlformats.org/officeDocument/2006/relationships" xmlns:p="http://schemas.openxmlformats.org/presentationml/2006/main">
+  <p:cSld>
+    <p:spTree>
+      <p:nvGrpSpPr>
+        <p:cNvPr id="1" name=""/>
+        <p:cNvGrpSpPr/>
+        <p:nvPr/>
+      </p:nvGrpSpPr>
+      <p:grpSpPr>
+        <a:xfrm>
+          <a:off x="0" y="0"/>
+          <a:ext cx="0" cy="0"/>
+          <a:chOff x="0" y="0"/>
+          <a:chExt cx="0" cy="0"/>
+        </a:xfrm>
+      </p:grpSpPr>
+      <p:sp>
+        <p:nvSpPr>
+          <p:cNvPr id="2" name="Titel 1">
+            <a:extLst>
+              <a:ext uri="{FF2B5EF4-FFF2-40B4-BE49-F238E27FC236}">
+                <a16:creationId xmlns:a16="http://schemas.microsoft.com/office/drawing/2014/main" id="{0EC7A146-A8F2-A844-9033-A0ACC828AF47}"/>
+              </a:ext>
+            </a:extLst>
+          </p:cNvPr>
+          <p:cNvSpPr>
+            <a:spLocks noGrp="1"/>
+          </p:cNvSpPr>
+          <p:nvPr>
+            <p:ph type="title"/>
+          </p:nvPr>
+        </p:nvSpPr>
+        <p:spPr/>
+        <p:txBody>
+          <a:bodyPr/>
+          <a:lstStyle/>
+          <a:p>
+            <a:r>
+              <a:rPr lang="de-DE" dirty="0" err="1"/>
+              <a:t>Step</a:t>
+            </a:r>
+            <a:r>
+              <a:rPr lang="de-DE" dirty="0"/>
+              <a:t> 50</a:t>
+            </a:r>
+          </a:p>
+        </p:txBody>
+      </p:sp>
+      <p:sp>
+        <p:nvSpPr>
+          <p:cNvPr id="3" name="Inhaltsplatzhalter 2">
+            <a:extLst>
+              <a:ext uri="{FF2B5EF4-FFF2-40B4-BE49-F238E27FC236}">
+                <a16:creationId xmlns:a16="http://schemas.microsoft.com/office/drawing/2014/main" id="{2A5EBA90-6155-FD45-A74C-ECC42BCA72DF}"/>
+              </a:ext>
+            </a:extLst>
+          </p:cNvPr>
+          <p:cNvSpPr>
+            <a:spLocks noGrp="1"/>
+          </p:cNvSpPr>
+          <p:nvPr>
+            <p:ph idx="1"/>
+          </p:nvPr>
+        </p:nvSpPr>
+        <p:spPr/>
+        <p:txBody>
+          <a:bodyPr/>
+          <a:lstStyle/>
+          <a:p>
+            <a:r>
+              <a:rPr lang="de-DE" dirty="0"/>
+              <a:t>Thema: Unit-Tests</a:t>
+            </a:r>
+            <a:endParaRPr lang="de-DE" dirty="0">
+              <a:latin typeface="Courier New" panose="02070309020205020404" pitchFamily="49" charset="0"/>
+              <a:cs typeface="Courier New" panose="02070309020205020404" pitchFamily="49" charset="0"/>
+            </a:endParaRPr>
+          </a:p>
+          <a:p>
+            <a:pPr lvl="1"/>
+            <a:r>
+              <a:rPr lang="de-DE" dirty="0"/>
+              <a:t>Framework für Unit-Tests: </a:t>
+            </a:r>
+            <a:r>
+              <a:rPr lang="de-DE" dirty="0" err="1"/>
+              <a:t>Junit</a:t>
+            </a:r>
+            <a:endParaRPr lang="de-DE" dirty="0"/>
+          </a:p>
+          <a:p>
+            <a:pPr lvl="2"/>
+            <a:r>
+              <a:rPr lang="de-DE" dirty="0"/>
+              <a:t>Definition und Strukturierung von Tests</a:t>
+            </a:r>
+          </a:p>
+          <a:p>
+            <a:pPr lvl="2"/>
+            <a:r>
+              <a:rPr lang="de-DE" dirty="0"/>
+              <a:t>Ausführung der Tests</a:t>
+            </a:r>
+          </a:p>
+          <a:p>
+            <a:pPr lvl="2"/>
+            <a:r>
+              <a:rPr lang="de-DE" dirty="0"/>
+              <a:t>Darstellung der Ergebnisse</a:t>
+            </a:r>
+          </a:p>
+          <a:p>
+            <a:pPr lvl="1"/>
+            <a:r>
+              <a:rPr lang="de-DE" dirty="0"/>
+              <a:t>Bibliothek für </a:t>
+            </a:r>
+            <a:r>
+              <a:rPr lang="de-DE" dirty="0" err="1"/>
+              <a:t>Assertions</a:t>
+            </a:r>
+            <a:r>
+              <a:rPr lang="de-DE" dirty="0"/>
+              <a:t>: </a:t>
+            </a:r>
+            <a:r>
+              <a:rPr lang="de-DE" dirty="0" err="1"/>
+              <a:t>AssertJ</a:t>
+            </a:r>
+            <a:endParaRPr lang="de-DE" dirty="0"/>
+          </a:p>
+          <a:p>
+            <a:pPr lvl="2"/>
+            <a:r>
+              <a:rPr lang="de-DE" dirty="0"/>
+              <a:t>Formulierung von Test-erwartungen</a:t>
+            </a:r>
+          </a:p>
+          <a:p>
+            <a:pPr lvl="2"/>
+            <a:r>
+              <a:rPr lang="de-DE" dirty="0"/>
+              <a:t>Beispiel für interne DSL</a:t>
+            </a:r>
+          </a:p>
+          <a:p>
+            <a:pPr lvl="2"/>
+            <a:endParaRPr lang="de-DE" dirty="0"/>
+          </a:p>
+        </p:txBody>
+      </p:sp>
+    </p:spTree>
+    <p:extLst>
+      <p:ext uri="{BB962C8B-B14F-4D97-AF65-F5344CB8AC3E}">
+        <p14:creationId xmlns:p14="http://schemas.microsoft.com/office/powerpoint/2010/main" val="852841484"/>
+      </p:ext>
+    </p:extLst>
+  </p:cSld>
+  <p:clrMapOvr>
+    <a:masterClrMapping/>
+  </p:clrMapOvr>
+</p:sld>
+</file>
+
+<file path=ppt/slides/slide22.xml><?xml version="1.0" encoding="utf-8"?>
+<p:sld xmlns:a="http://schemas.openxmlformats.org/drawingml/2006/main" xmlns:r="http://schemas.openxmlformats.org/officeDocument/2006/relationships" xmlns:p="http://schemas.openxmlformats.org/presentationml/2006/main">
+  <p:cSld>
+    <p:spTree>
+      <p:nvGrpSpPr>
+        <p:cNvPr id="1" name=""/>
+        <p:cNvGrpSpPr/>
+        <p:nvPr/>
+      </p:nvGrpSpPr>
+      <p:grpSpPr>
+        <a:xfrm>
+          <a:off x="0" y="0"/>
+          <a:ext cx="0" cy="0"/>
+          <a:chOff x="0" y="0"/>
+          <a:chExt cx="0" cy="0"/>
+        </a:xfrm>
+      </p:grpSpPr>
+      <p:sp>
+        <p:nvSpPr>
+          <p:cNvPr id="2" name="Titel 1">
+            <a:extLst>
+              <a:ext uri="{FF2B5EF4-FFF2-40B4-BE49-F238E27FC236}">
+                <a16:creationId xmlns:a16="http://schemas.microsoft.com/office/drawing/2014/main" id="{0EC7A146-A8F2-A844-9033-A0ACC828AF47}"/>
+              </a:ext>
+            </a:extLst>
+          </p:cNvPr>
+          <p:cNvSpPr>
+            <a:spLocks noGrp="1"/>
+          </p:cNvSpPr>
+          <p:nvPr>
+            <p:ph type="title"/>
+          </p:nvPr>
+        </p:nvSpPr>
+        <p:spPr/>
+        <p:txBody>
+          <a:bodyPr/>
+          <a:lstStyle/>
+          <a:p>
+            <a:r>
+              <a:rPr lang="de-DE" dirty="0" err="1"/>
+              <a:t>Step</a:t>
+            </a:r>
+            <a:r>
+              <a:rPr lang="de-DE" dirty="0"/>
+              <a:t> 60</a:t>
+            </a:r>
+          </a:p>
+        </p:txBody>
+      </p:sp>
+      <p:sp>
+        <p:nvSpPr>
+          <p:cNvPr id="3" name="Inhaltsplatzhalter 2">
+            <a:extLst>
+              <a:ext uri="{FF2B5EF4-FFF2-40B4-BE49-F238E27FC236}">
+                <a16:creationId xmlns:a16="http://schemas.microsoft.com/office/drawing/2014/main" id="{2A5EBA90-6155-FD45-A74C-ECC42BCA72DF}"/>
+              </a:ext>
+            </a:extLst>
+          </p:cNvPr>
+          <p:cNvSpPr>
+            <a:spLocks noGrp="1"/>
+          </p:cNvSpPr>
+          <p:nvPr>
+            <p:ph idx="1"/>
+          </p:nvPr>
+        </p:nvSpPr>
+        <p:spPr/>
+        <p:txBody>
+          <a:bodyPr/>
+          <a:lstStyle/>
+          <a:p>
+            <a:r>
+              <a:rPr lang="de-DE" dirty="0"/>
+              <a:t>Thema: Implementierung eines REST-Endpunktes mit Spring Boot</a:t>
+            </a:r>
+          </a:p>
+          <a:p>
+            <a:pPr lvl="1"/>
+            <a:r>
+              <a:rPr lang="de-DE" dirty="0">
+                <a:cs typeface="Courier New" panose="02070309020205020404" pitchFamily="49" charset="0"/>
+              </a:rPr>
+              <a:t>Spring</a:t>
+            </a:r>
+          </a:p>
+          <a:p>
+            <a:pPr lvl="2"/>
+            <a:r>
+              <a:rPr lang="de-DE" dirty="0">
+                <a:cs typeface="Courier New" panose="02070309020205020404" pitchFamily="49" charset="0"/>
+              </a:rPr>
+              <a:t>Java-Framework zur Implementierung von Enterprise </a:t>
+            </a:r>
+            <a:r>
+              <a:rPr lang="de-DE" dirty="0" err="1">
+                <a:cs typeface="Courier New" panose="02070309020205020404" pitchFamily="49" charset="0"/>
+              </a:rPr>
+              <a:t>Applications</a:t>
+            </a:r>
+            <a:endParaRPr lang="de-DE" dirty="0">
+              <a:cs typeface="Courier New" panose="02070309020205020404" pitchFamily="49" charset="0"/>
+            </a:endParaRPr>
+          </a:p>
+          <a:p>
+            <a:pPr lvl="2"/>
+            <a:r>
+              <a:rPr lang="de-DE" dirty="0">
+                <a:cs typeface="Courier New" panose="02070309020205020404" pitchFamily="49" charset="0"/>
+              </a:rPr>
+              <a:t>Kern: Framework für </a:t>
+            </a:r>
+            <a:r>
+              <a:rPr lang="de-DE" dirty="0" err="1">
+                <a:cs typeface="Courier New" panose="02070309020205020404" pitchFamily="49" charset="0"/>
+              </a:rPr>
+              <a:t>Dependency</a:t>
+            </a:r>
+            <a:r>
+              <a:rPr lang="de-DE" dirty="0">
+                <a:cs typeface="Courier New" panose="02070309020205020404" pitchFamily="49" charset="0"/>
+              </a:rPr>
+              <a:t> </a:t>
+            </a:r>
+            <a:r>
+              <a:rPr lang="de-DE" dirty="0" err="1">
+                <a:cs typeface="Courier New" panose="02070309020205020404" pitchFamily="49" charset="0"/>
+              </a:rPr>
+              <a:t>Injection</a:t>
+            </a:r>
+            <a:endParaRPr lang="de-DE" dirty="0">
+              <a:cs typeface="Courier New" panose="02070309020205020404" pitchFamily="49" charset="0"/>
+            </a:endParaRPr>
+          </a:p>
+          <a:p>
+            <a:pPr lvl="2"/>
+            <a:r>
+              <a:rPr lang="de-DE" dirty="0">
+                <a:cs typeface="Courier New" panose="02070309020205020404" pitchFamily="49" charset="0"/>
+              </a:rPr>
+              <a:t>Sehr umfangreich</a:t>
+            </a:r>
+          </a:p>
+          <a:p>
+            <a:pPr lvl="1"/>
+            <a:r>
+              <a:rPr lang="de-DE" dirty="0">
+                <a:cs typeface="Courier New" panose="02070309020205020404" pitchFamily="49" charset="0"/>
+              </a:rPr>
+              <a:t>Spring Boot</a:t>
+            </a:r>
+          </a:p>
+          <a:p>
+            <a:pPr lvl="2"/>
+            <a:r>
+              <a:rPr lang="de-DE" dirty="0">
+                <a:cs typeface="Courier New" panose="02070309020205020404" pitchFamily="49" charset="0"/>
+              </a:rPr>
+              <a:t>Vereinfachte Konfiguration von Spring-Anwendungen (vordefinierte Starter)</a:t>
+            </a:r>
+          </a:p>
+          <a:p>
+            <a:pPr lvl="2"/>
+            <a:r>
+              <a:rPr lang="de-DE" dirty="0">
+                <a:cs typeface="Courier New" panose="02070309020205020404" pitchFamily="49" charset="0"/>
+              </a:rPr>
+              <a:t>Sehr beliebt zur Implementierung von </a:t>
+            </a:r>
+            <a:r>
+              <a:rPr lang="de-DE" dirty="0" err="1">
+                <a:cs typeface="Courier New" panose="02070309020205020404" pitchFamily="49" charset="0"/>
+              </a:rPr>
+              <a:t>Microservices</a:t>
+            </a:r>
+            <a:endParaRPr lang="de-DE" dirty="0">
+              <a:cs typeface="Courier New" panose="02070309020205020404" pitchFamily="49" charset="0"/>
+            </a:endParaRPr>
+          </a:p>
+        </p:txBody>
+      </p:sp>
+    </p:spTree>
+    <p:extLst>
+      <p:ext uri="{BB962C8B-B14F-4D97-AF65-F5344CB8AC3E}">
+        <p14:creationId xmlns:p14="http://schemas.microsoft.com/office/powerpoint/2010/main" val="1717894978"/>
+      </p:ext>
+    </p:extLst>
+  </p:cSld>
+  <p:clrMapOvr>
+    <a:masterClrMapping/>
+  </p:clrMapOvr>
+</p:sld>
+</file>
+
+<file path=ppt/slides/slide23.xml><?xml version="1.0" encoding="utf-8"?>
+<p:sld xmlns:a="http://schemas.openxmlformats.org/drawingml/2006/main" xmlns:r="http://schemas.openxmlformats.org/officeDocument/2006/relationships" xmlns:p="http://schemas.openxmlformats.org/presentationml/2006/main">
+  <p:cSld>
+    <p:spTree>
+      <p:nvGrpSpPr>
+        <p:cNvPr id="1" name=""/>
+        <p:cNvGrpSpPr/>
+        <p:nvPr/>
+      </p:nvGrpSpPr>
+      <p:grpSpPr>
+        <a:xfrm>
+          <a:off x="0" y="0"/>
+          <a:ext cx="0" cy="0"/>
+          <a:chOff x="0" y="0"/>
+          <a:chExt cx="0" cy="0"/>
+        </a:xfrm>
+      </p:grpSpPr>
+      <p:sp>
+        <p:nvSpPr>
+          <p:cNvPr id="2" name="Titel 1">
+            <a:extLst>
+              <a:ext uri="{FF2B5EF4-FFF2-40B4-BE49-F238E27FC236}">
+                <a16:creationId xmlns:a16="http://schemas.microsoft.com/office/drawing/2014/main" id="{0EC7A146-A8F2-A844-9033-A0ACC828AF47}"/>
+              </a:ext>
+            </a:extLst>
+          </p:cNvPr>
+          <p:cNvSpPr>
+            <a:spLocks noGrp="1"/>
+          </p:cNvSpPr>
+          <p:nvPr>
+            <p:ph type="title"/>
+          </p:nvPr>
+        </p:nvSpPr>
+        <p:spPr/>
+        <p:txBody>
+          <a:bodyPr/>
+          <a:lstStyle/>
+          <a:p>
+            <a:r>
+              <a:rPr lang="de-DE" dirty="0" err="1"/>
+              <a:t>Step</a:t>
+            </a:r>
+            <a:r>
+              <a:rPr lang="de-DE" dirty="0"/>
+              <a:t> 70</a:t>
+            </a:r>
+          </a:p>
+        </p:txBody>
+      </p:sp>
+      <p:sp>
+        <p:nvSpPr>
+          <p:cNvPr id="3" name="Inhaltsplatzhalter 2">
+            <a:extLst>
+              <a:ext uri="{FF2B5EF4-FFF2-40B4-BE49-F238E27FC236}">
+                <a16:creationId xmlns:a16="http://schemas.microsoft.com/office/drawing/2014/main" id="{2A5EBA90-6155-FD45-A74C-ECC42BCA72DF}"/>
+              </a:ext>
+            </a:extLst>
+          </p:cNvPr>
+          <p:cNvSpPr>
+            <a:spLocks noGrp="1"/>
+          </p:cNvSpPr>
+          <p:nvPr>
+            <p:ph idx="1"/>
+          </p:nvPr>
+        </p:nvSpPr>
+        <p:spPr/>
+        <p:txBody>
+          <a:bodyPr/>
+          <a:lstStyle/>
+          <a:p>
+            <a:r>
+              <a:rPr lang="de-DE" dirty="0"/>
+              <a:t>Thema: </a:t>
+            </a:r>
+            <a:r>
+              <a:rPr lang="de-DE" dirty="0" err="1"/>
+              <a:t>Dependency</a:t>
+            </a:r>
+            <a:r>
+              <a:rPr lang="de-DE" dirty="0"/>
+              <a:t> </a:t>
+            </a:r>
+            <a:r>
+              <a:rPr lang="de-DE" dirty="0" err="1"/>
+              <a:t>Injection</a:t>
+            </a:r>
+            <a:r>
+              <a:rPr lang="de-DE" dirty="0"/>
+              <a:t> mit Spring</a:t>
+            </a:r>
+          </a:p>
+        </p:txBody>
+      </p:sp>
+    </p:spTree>
+    <p:extLst>
+      <p:ext uri="{BB962C8B-B14F-4D97-AF65-F5344CB8AC3E}">
+        <p14:creationId xmlns:p14="http://schemas.microsoft.com/office/powerpoint/2010/main" val="2804024451"/>
+      </p:ext>
+    </p:extLst>
+  </p:cSld>
+  <p:clrMapOvr>
+    <a:masterClrMapping/>
+  </p:clrMapOvr>
+</p:sld>
+</file>
+
+<file path=ppt/slides/slide24.xml><?xml version="1.0" encoding="utf-8"?>
+<p:sld xmlns:a="http://schemas.openxmlformats.org/drawingml/2006/main" xmlns:r="http://schemas.openxmlformats.org/officeDocument/2006/relationships" xmlns:p="http://schemas.openxmlformats.org/presentationml/2006/main">
+  <p:cSld>
+    <p:spTree>
+      <p:nvGrpSpPr>
+        <p:cNvPr id="1" name=""/>
+        <p:cNvGrpSpPr/>
+        <p:nvPr/>
+      </p:nvGrpSpPr>
+      <p:grpSpPr>
+        <a:xfrm>
+          <a:off x="0" y="0"/>
+          <a:ext cx="0" cy="0"/>
+          <a:chOff x="0" y="0"/>
+          <a:chExt cx="0" cy="0"/>
+        </a:xfrm>
+      </p:grpSpPr>
+      <p:sp>
+        <p:nvSpPr>
+          <p:cNvPr id="2" name="Titel 1">
+            <a:extLst>
+              <a:ext uri="{FF2B5EF4-FFF2-40B4-BE49-F238E27FC236}">
+                <a16:creationId xmlns:a16="http://schemas.microsoft.com/office/drawing/2014/main" id="{0EC7A146-A8F2-A844-9033-A0ACC828AF47}"/>
+              </a:ext>
+            </a:extLst>
+          </p:cNvPr>
+          <p:cNvSpPr>
+            <a:spLocks noGrp="1"/>
+          </p:cNvSpPr>
+          <p:nvPr>
+            <p:ph type="title"/>
+          </p:nvPr>
+        </p:nvSpPr>
+        <p:spPr/>
+        <p:txBody>
+          <a:bodyPr/>
+          <a:lstStyle/>
+          <a:p>
+            <a:r>
+              <a:rPr lang="de-DE" dirty="0" err="1"/>
+              <a:t>Step</a:t>
+            </a:r>
+            <a:r>
+              <a:rPr lang="de-DE" dirty="0"/>
+              <a:t> 80</a:t>
+            </a:r>
+          </a:p>
+        </p:txBody>
+      </p:sp>
+      <p:sp>
+        <p:nvSpPr>
+          <p:cNvPr id="3" name="Inhaltsplatzhalter 2">
+            <a:extLst>
+              <a:ext uri="{FF2B5EF4-FFF2-40B4-BE49-F238E27FC236}">
+                <a16:creationId xmlns:a16="http://schemas.microsoft.com/office/drawing/2014/main" id="{2A5EBA90-6155-FD45-A74C-ECC42BCA72DF}"/>
+              </a:ext>
+            </a:extLst>
+          </p:cNvPr>
+          <p:cNvSpPr>
+            <a:spLocks noGrp="1"/>
+          </p:cNvSpPr>
+          <p:nvPr>
+            <p:ph idx="1"/>
+          </p:nvPr>
+        </p:nvSpPr>
+        <p:spPr/>
+        <p:txBody>
+          <a:bodyPr/>
+          <a:lstStyle/>
+          <a:p>
+            <a:r>
+              <a:rPr lang="de-DE" dirty="0"/>
+              <a:t>Thema: Testen mit Mocks</a:t>
+            </a:r>
+          </a:p>
+          <a:p>
+            <a:pPr lvl="1"/>
+            <a:r>
+              <a:rPr lang="de-DE" dirty="0" err="1"/>
+              <a:t>Mockito</a:t>
+            </a:r>
+            <a:r>
+              <a:rPr lang="de-DE" dirty="0"/>
+              <a:t>: Bibliothek zum Erstellen von Mock-Objekten </a:t>
+            </a:r>
+            <a:r>
+              <a:rPr lang="de-DE"/>
+              <a:t>in Unit-Tests</a:t>
+            </a:r>
+            <a:endParaRPr lang="de-DE" dirty="0"/>
+          </a:p>
+        </p:txBody>
+      </p:sp>
+    </p:spTree>
+    <p:extLst>
+      <p:ext uri="{BB962C8B-B14F-4D97-AF65-F5344CB8AC3E}">
+        <p14:creationId xmlns:p14="http://schemas.microsoft.com/office/powerpoint/2010/main" val="1609070468"/>
+      </p:ext>
+    </p:extLst>
+  </p:cSld>
+  <p:clrMapOvr>
+    <a:masterClrMapping/>
+  </p:clrMapOvr>
+</p:sld>
+</file>
+
+<file path=ppt/slides/slide25.xml><?xml version="1.0" encoding="utf-8"?>
+<p:sld xmlns:a="http://schemas.openxmlformats.org/drawingml/2006/main" xmlns:r="http://schemas.openxmlformats.org/officeDocument/2006/relationships" xmlns:p="http://schemas.openxmlformats.org/presentationml/2006/main">
+  <p:cSld>
+    <p:spTree>
+      <p:nvGrpSpPr>
+        <p:cNvPr id="1" name=""/>
+        <p:cNvGrpSpPr/>
+        <p:nvPr/>
+      </p:nvGrpSpPr>
+      <p:grpSpPr>
+        <a:xfrm>
+          <a:off x="0" y="0"/>
+          <a:ext cx="0" cy="0"/>
+          <a:chOff x="0" y="0"/>
+          <a:chExt cx="0" cy="0"/>
+        </a:xfrm>
+      </p:grpSpPr>
+      <p:sp>
+        <p:nvSpPr>
+          <p:cNvPr id="2" name="Titel 1">
+            <a:extLst>
+              <a:ext uri="{FF2B5EF4-FFF2-40B4-BE49-F238E27FC236}">
+                <a16:creationId xmlns:a16="http://schemas.microsoft.com/office/drawing/2014/main" id="{0EC7A146-A8F2-A844-9033-A0ACC828AF47}"/>
+              </a:ext>
+            </a:extLst>
+          </p:cNvPr>
+          <p:cNvSpPr>
+            <a:spLocks noGrp="1"/>
+          </p:cNvSpPr>
+          <p:nvPr>
+            <p:ph type="title"/>
+          </p:nvPr>
+        </p:nvSpPr>
+        <p:spPr/>
+        <p:txBody>
+          <a:bodyPr/>
+          <a:lstStyle/>
+          <a:p>
+            <a:r>
+              <a:rPr lang="de-DE" dirty="0" err="1"/>
+              <a:t>Step</a:t>
+            </a:r>
+            <a:r>
+              <a:rPr lang="de-DE" dirty="0"/>
+              <a:t> 90</a:t>
+            </a:r>
+          </a:p>
+        </p:txBody>
+      </p:sp>
+      <p:sp>
+        <p:nvSpPr>
+          <p:cNvPr id="3" name="Inhaltsplatzhalter 2">
+            <a:extLst>
+              <a:ext uri="{FF2B5EF4-FFF2-40B4-BE49-F238E27FC236}">
+                <a16:creationId xmlns:a16="http://schemas.microsoft.com/office/drawing/2014/main" id="{2A5EBA90-6155-FD45-A74C-ECC42BCA72DF}"/>
+              </a:ext>
+            </a:extLst>
+          </p:cNvPr>
+          <p:cNvSpPr>
+            <a:spLocks noGrp="1"/>
+          </p:cNvSpPr>
+          <p:nvPr>
+            <p:ph idx="1"/>
+          </p:nvPr>
+        </p:nvSpPr>
+        <p:spPr/>
+        <p:txBody>
+          <a:bodyPr/>
+          <a:lstStyle/>
+          <a:p>
+            <a:r>
+              <a:rPr lang="de-DE" dirty="0"/>
+              <a:t>Thema: Persistenz mit Spring Data</a:t>
+            </a:r>
+          </a:p>
+        </p:txBody>
+      </p:sp>
+    </p:spTree>
+    <p:extLst>
+      <p:ext uri="{BB962C8B-B14F-4D97-AF65-F5344CB8AC3E}">
+        <p14:creationId xmlns:p14="http://schemas.microsoft.com/office/powerpoint/2010/main" val="3263348999"/>
+      </p:ext>
+    </p:extLst>
+  </p:cSld>
+  <p:clrMapOvr>
+    <a:masterClrMapping/>
+  </p:clrMapOvr>
+</p:sld>
+</file>
+
+<file path=ppt/slides/slide26.xml><?xml version="1.0" encoding="utf-8"?>
+<p:sld xmlns:a="http://schemas.openxmlformats.org/drawingml/2006/main" xmlns:r="http://schemas.openxmlformats.org/officeDocument/2006/relationships" xmlns:p="http://schemas.openxmlformats.org/presentationml/2006/main">
+  <p:cSld>
+    <p:spTree>
+      <p:nvGrpSpPr>
+        <p:cNvPr id="1" name=""/>
+        <p:cNvGrpSpPr/>
+        <p:nvPr/>
+      </p:nvGrpSpPr>
+      <p:grpSpPr>
+        <a:xfrm>
+          <a:off x="0" y="0"/>
+          <a:ext cx="0" cy="0"/>
+          <a:chOff x="0" y="0"/>
+          <a:chExt cx="0" cy="0"/>
+        </a:xfrm>
+      </p:grpSpPr>
+      <p:sp>
+        <p:nvSpPr>
+          <p:cNvPr id="2" name="Titel 1">
+            <a:extLst>
+              <a:ext uri="{FF2B5EF4-FFF2-40B4-BE49-F238E27FC236}">
+                <a16:creationId xmlns:a16="http://schemas.microsoft.com/office/drawing/2014/main" id="{0EC7A146-A8F2-A844-9033-A0ACC828AF47}"/>
+              </a:ext>
+            </a:extLst>
+          </p:cNvPr>
+          <p:cNvSpPr>
+            <a:spLocks noGrp="1"/>
+          </p:cNvSpPr>
+          <p:nvPr>
+            <p:ph type="title"/>
+          </p:nvPr>
+        </p:nvSpPr>
+        <p:spPr/>
+        <p:txBody>
+          <a:bodyPr/>
+          <a:lstStyle/>
+          <a:p>
+            <a:r>
+              <a:rPr lang="de-DE" dirty="0" err="1"/>
+              <a:t>Step</a:t>
+            </a:r>
+            <a:r>
+              <a:rPr lang="de-DE" dirty="0"/>
+              <a:t> 100</a:t>
+            </a:r>
+          </a:p>
+        </p:txBody>
+      </p:sp>
+      <p:sp>
+        <p:nvSpPr>
+          <p:cNvPr id="3" name="Inhaltsplatzhalter 2">
+            <a:extLst>
+              <a:ext uri="{FF2B5EF4-FFF2-40B4-BE49-F238E27FC236}">
+                <a16:creationId xmlns:a16="http://schemas.microsoft.com/office/drawing/2014/main" id="{2A5EBA90-6155-FD45-A74C-ECC42BCA72DF}"/>
+              </a:ext>
+            </a:extLst>
+          </p:cNvPr>
+          <p:cNvSpPr>
+            <a:spLocks noGrp="1"/>
+          </p:cNvSpPr>
+          <p:nvPr>
+            <p:ph idx="1"/>
+          </p:nvPr>
+        </p:nvSpPr>
+        <p:spPr/>
+        <p:txBody>
+          <a:bodyPr/>
+          <a:lstStyle/>
+          <a:p>
+            <a:r>
+              <a:rPr lang="de-DE" dirty="0"/>
+              <a:t>Thema: Service als Docker-Container</a:t>
+            </a:r>
+          </a:p>
+        </p:txBody>
+      </p:sp>
+    </p:spTree>
+    <p:extLst>
+      <p:ext uri="{BB962C8B-B14F-4D97-AF65-F5344CB8AC3E}">
+        <p14:creationId xmlns:p14="http://schemas.microsoft.com/office/powerpoint/2010/main" val="1059597919"/>
       </p:ext>
     </p:extLst>
   </p:cSld>
@@ -5500,12 +7020,9 @@
           <a:p>
             <a:r>
               <a:rPr lang="de-DE" dirty="0" err="1"/>
-              <a:t>Step</a:t>
-            </a:r>
-            <a:r>
-              <a:rPr lang="de-DE" dirty="0"/>
-              <a:t> 10</a:t>
-            </a:r>
+              <a:t>Microservices</a:t>
+            </a:r>
+            <a:endParaRPr lang="de-DE" dirty="0"/>
           </a:p>
         </p:txBody>
       </p:sp>
@@ -5527,72 +7044,123 @@
         </p:nvSpPr>
         <p:spPr/>
         <p:txBody>
-          <a:bodyPr/>
-          <a:lstStyle/>
-          <a:p>
-            <a:r>
-              <a:rPr lang="de-DE" dirty="0"/>
-              <a:t>Thema: Java</a:t>
+          <a:bodyPr>
+            <a:normAutofit/>
+          </a:bodyPr>
+          <a:lstStyle/>
+          <a:p>
+            <a:r>
+              <a:rPr lang="de-DE" dirty="0"/>
+              <a:t>Prinzipien</a:t>
             </a:r>
           </a:p>
           <a:p>
             <a:pPr lvl="1"/>
             <a:r>
               <a:rPr lang="de-DE" dirty="0"/>
-              <a:t>Objektorientierte Programmiersprache</a:t>
-            </a:r>
+              <a:t>Vollständige Unabhängigkeit</a:t>
+            </a:r>
+          </a:p>
+          <a:p>
+            <a:pPr lvl="2"/>
+            <a:r>
+              <a:rPr lang="de-DE" dirty="0"/>
+              <a:t>Kein </a:t>
+            </a:r>
+            <a:r>
+              <a:rPr lang="de-DE" dirty="0" err="1"/>
+              <a:t>shared</a:t>
+            </a:r>
+            <a:r>
+              <a:rPr lang="de-DE" dirty="0"/>
+              <a:t> </a:t>
+            </a:r>
+            <a:r>
+              <a:rPr lang="de-DE" dirty="0" err="1"/>
+              <a:t>code</a:t>
+            </a:r>
+            <a:endParaRPr lang="de-DE" dirty="0"/>
+          </a:p>
+          <a:p>
+            <a:pPr lvl="2"/>
+            <a:r>
+              <a:rPr lang="de-DE" dirty="0"/>
+              <a:t>Keine gemeinsam genutzte Datenbank</a:t>
+            </a:r>
+          </a:p>
+          <a:p>
+            <a:pPr lvl="2"/>
+            <a:r>
+              <a:rPr lang="de-DE" dirty="0"/>
+              <a:t>Unabhängiges </a:t>
+            </a:r>
+            <a:r>
+              <a:rPr lang="de-DE" dirty="0" err="1"/>
+              <a:t>Build</a:t>
+            </a:r>
+            <a:r>
+              <a:rPr lang="de-DE" dirty="0"/>
+              <a:t>/</a:t>
+            </a:r>
+            <a:r>
+              <a:rPr lang="de-DE" dirty="0" err="1"/>
+              <a:t>Deployment</a:t>
+            </a:r>
+            <a:endParaRPr lang="de-DE" dirty="0"/>
           </a:p>
           <a:p>
             <a:pPr lvl="1"/>
             <a:r>
               <a:rPr lang="de-DE" dirty="0"/>
-              <a:t>Erscheinungsjahr 1996</a:t>
-            </a:r>
-          </a:p>
-          <a:p>
-            <a:pPr lvl="1"/>
-            <a:r>
-              <a:rPr lang="de-DE" dirty="0"/>
-              <a:t>Angelehnt an C++</a:t>
-            </a:r>
-          </a:p>
-          <a:p>
-            <a:pPr lvl="1"/>
+              <a:t>Technik</a:t>
+            </a:r>
+          </a:p>
+          <a:p>
+            <a:pPr lvl="2"/>
+            <a:r>
+              <a:rPr lang="de-DE" dirty="0"/>
+              <a:t>Jeder </a:t>
+            </a:r>
+            <a:r>
+              <a:rPr lang="de-DE" dirty="0" err="1"/>
+              <a:t>Microservice</a:t>
+            </a:r>
+            <a:r>
+              <a:rPr lang="de-DE" dirty="0"/>
+              <a:t>: eigenständige Anwendung</a:t>
+            </a:r>
+          </a:p>
+          <a:p>
+            <a:pPr lvl="2"/>
+            <a:r>
+              <a:rPr lang="de-DE" dirty="0"/>
+              <a:t>Schnittstellen</a:t>
+            </a:r>
+          </a:p>
+          <a:p>
+            <a:pPr lvl="3"/>
+            <a:r>
+              <a:rPr lang="de-DE" dirty="0"/>
+              <a:t>REST/JSON</a:t>
+            </a:r>
+          </a:p>
+          <a:p>
+            <a:pPr lvl="3"/>
+            <a:r>
+              <a:rPr lang="de-DE" dirty="0"/>
+              <a:t>Messages</a:t>
+            </a:r>
+          </a:p>
+          <a:p>
+            <a:pPr lvl="2"/>
             <a:endParaRPr lang="de-DE" dirty="0"/>
-          </a:p>
-          <a:p>
-            <a:r>
-              <a:rPr lang="de-DE" dirty="0"/>
-              <a:t>Inzwischen: eine der am weitesten verbreiteten Programmiersprachen</a:t>
-            </a:r>
-            <a:br>
-              <a:rPr lang="de-DE" dirty="0"/>
-            </a:br>
-            <a:r>
-              <a:rPr lang="de-DE" dirty="0"/>
-              <a:t>(zumindest für Unternehmensanwendungen)</a:t>
-            </a:r>
-          </a:p>
-          <a:p>
-            <a:pPr lvl="1"/>
-            <a:r>
-              <a:rPr lang="de-DE" dirty="0"/>
-              <a:t>Plattformunabhängigkeit</a:t>
-            </a:r>
-          </a:p>
-          <a:p>
-            <a:pPr lvl="1"/>
-            <a:r>
-              <a:rPr lang="de-DE" dirty="0"/>
-              <a:t>Große Zahl an Bibliotheken</a:t>
-            </a:r>
           </a:p>
         </p:txBody>
       </p:sp>
     </p:spTree>
     <p:extLst>
       <p:ext uri="{BB962C8B-B14F-4D97-AF65-F5344CB8AC3E}">
-        <p14:creationId xmlns:p14="http://schemas.microsoft.com/office/powerpoint/2010/main" val="1585598179"/>
+        <p14:creationId xmlns:p14="http://schemas.microsoft.com/office/powerpoint/2010/main" val="2470449297"/>
       </p:ext>
     </p:extLst>
   </p:cSld>
@@ -5642,12 +7210,9 @@
           <a:p>
             <a:r>
               <a:rPr lang="de-DE" dirty="0" err="1"/>
-              <a:t>Step</a:t>
-            </a:r>
-            <a:r>
-              <a:rPr lang="de-DE" dirty="0"/>
-              <a:t> 10</a:t>
-            </a:r>
+              <a:t>Microservices</a:t>
+            </a:r>
+            <a:endParaRPr lang="de-DE" dirty="0"/>
           </a:p>
         </p:txBody>
       </p:sp>
@@ -5669,162 +7234,98 @@
         </p:nvSpPr>
         <p:spPr/>
         <p:txBody>
-          <a:bodyPr/>
-          <a:lstStyle/>
-          <a:p>
-            <a:r>
-              <a:rPr lang="de-DE" dirty="0"/>
-              <a:t>Thema: Java</a:t>
-            </a:r>
+          <a:bodyPr>
+            <a:normAutofit/>
+          </a:bodyPr>
+          <a:lstStyle/>
+          <a:p>
+            <a:r>
+              <a:rPr lang="de-DE" dirty="0"/>
+              <a:t>Prinzipien</a:t>
+            </a:r>
+          </a:p>
+          <a:p>
+            <a:endParaRPr lang="de-DE" dirty="0"/>
           </a:p>
           <a:p>
             <a:pPr lvl="1"/>
             <a:r>
               <a:rPr lang="de-DE" dirty="0"/>
-              <a:t>Compiler: </a:t>
-            </a:r>
-            <a:r>
-              <a:rPr lang="de-DE" dirty="0" err="1">
-                <a:latin typeface="Courier New" panose="02070309020205020404" pitchFamily="49" charset="0"/>
-                <a:cs typeface="Courier New" panose="02070309020205020404" pitchFamily="49" charset="0"/>
-              </a:rPr>
-              <a:t>javac</a:t>
-            </a:r>
-            <a:r>
-              <a:rPr lang="de-DE" dirty="0">
-                <a:latin typeface="Courier New" panose="02070309020205020404" pitchFamily="49" charset="0"/>
-                <a:cs typeface="Courier New" panose="02070309020205020404" pitchFamily="49" charset="0"/>
-              </a:rPr>
+              <a:t>Jeder </a:t>
+            </a:r>
+            <a:r>
+              <a:rPr lang="de-DE" dirty="0" err="1"/>
+              <a:t>Microservice</a:t>
+            </a:r>
+            <a:r>
+              <a:rPr lang="de-DE" dirty="0"/>
+              <a:t>: eigenständig laufende Anwendung</a:t>
+            </a:r>
+          </a:p>
+          <a:p>
+            <a:pPr lvl="1"/>
+            <a:endParaRPr lang="de-DE" dirty="0"/>
+          </a:p>
+          <a:p>
+            <a:pPr lvl="1"/>
+            <a:r>
+              <a:rPr lang="de-DE" dirty="0"/>
+              <a:t>Vollständige Unabhängigkeit</a:t>
+            </a:r>
+          </a:p>
+          <a:p>
+            <a:pPr lvl="2"/>
+            <a:r>
+              <a:rPr lang="de-DE" dirty="0"/>
+              <a:t>Kein </a:t>
+            </a:r>
+            <a:r>
+              <a:rPr lang="de-DE" dirty="0" err="1"/>
+              <a:t>shared</a:t>
+            </a:r>
+            <a:r>
+              <a:rPr lang="de-DE" dirty="0"/>
               <a:t> </a:t>
             </a:r>
             <a:r>
-              <a:rPr lang="de-DE" dirty="0" err="1">
-                <a:latin typeface="Courier New" panose="02070309020205020404" pitchFamily="49" charset="0"/>
-                <a:cs typeface="Courier New" panose="02070309020205020404" pitchFamily="49" charset="0"/>
-              </a:rPr>
-              <a:t>HelloWorld.java</a:t>
-            </a:r>
-            <a:endParaRPr lang="de-DE" dirty="0">
-              <a:latin typeface="Courier New" panose="02070309020205020404" pitchFamily="49" charset="0"/>
-              <a:cs typeface="Courier New" panose="02070309020205020404" pitchFamily="49" charset="0"/>
-            </a:endParaRPr>
-          </a:p>
-          <a:p>
-            <a:pPr lvl="2"/>
-            <a:r>
-              <a:rPr lang="de-DE" dirty="0"/>
-              <a:t>Übersetzt Quelltext </a:t>
-            </a:r>
-            <a:r>
-              <a:rPr lang="de-DE" dirty="0">
-                <a:latin typeface="Courier New" panose="02070309020205020404" pitchFamily="49" charset="0"/>
-                <a:cs typeface="Courier New" panose="02070309020205020404" pitchFamily="49" charset="0"/>
-              </a:rPr>
-              <a:t>(*.</a:t>
-            </a:r>
-            <a:r>
-              <a:rPr lang="de-DE" dirty="0" err="1">
-                <a:latin typeface="Courier New" panose="02070309020205020404" pitchFamily="49" charset="0"/>
-                <a:cs typeface="Courier New" panose="02070309020205020404" pitchFamily="49" charset="0"/>
-              </a:rPr>
-              <a:t>java</a:t>
-            </a:r>
-            <a:r>
-              <a:rPr lang="de-DE" dirty="0"/>
-              <a:t>) in Java-Bytecode </a:t>
-            </a:r>
-            <a:r>
-              <a:rPr lang="de-DE" dirty="0">
-                <a:latin typeface="Courier New" panose="02070309020205020404" pitchFamily="49" charset="0"/>
-                <a:cs typeface="Courier New" panose="02070309020205020404" pitchFamily="49" charset="0"/>
-              </a:rPr>
-              <a:t>(*.</a:t>
-            </a:r>
-            <a:r>
-              <a:rPr lang="de-DE" dirty="0" err="1">
-                <a:latin typeface="Courier New" panose="02070309020205020404" pitchFamily="49" charset="0"/>
-                <a:cs typeface="Courier New" panose="02070309020205020404" pitchFamily="49" charset="0"/>
-              </a:rPr>
-              <a:t>class</a:t>
-            </a:r>
-            <a:r>
-              <a:rPr lang="de-DE" dirty="0"/>
-              <a:t>)</a:t>
-            </a:r>
-          </a:p>
-          <a:p>
-            <a:pPr lvl="1"/>
-            <a:r>
-              <a:rPr lang="de-DE" dirty="0"/>
-              <a:t>Ausführung: </a:t>
-            </a:r>
-            <a:r>
-              <a:rPr lang="de-DE" dirty="0" err="1">
-                <a:latin typeface="Courier New" panose="02070309020205020404" pitchFamily="49" charset="0"/>
-                <a:cs typeface="Courier New" panose="02070309020205020404" pitchFamily="49" charset="0"/>
-              </a:rPr>
-              <a:t>java</a:t>
-            </a:r>
-            <a:r>
-              <a:rPr lang="de-DE" dirty="0">
-                <a:latin typeface="Courier New" panose="02070309020205020404" pitchFamily="49" charset="0"/>
-                <a:cs typeface="Courier New" panose="02070309020205020404" pitchFamily="49" charset="0"/>
-              </a:rPr>
-              <a:t> </a:t>
-            </a:r>
-            <a:r>
-              <a:rPr lang="de-DE" dirty="0" err="1">
-                <a:latin typeface="Courier New" panose="02070309020205020404" pitchFamily="49" charset="0"/>
-                <a:cs typeface="Courier New" panose="02070309020205020404" pitchFamily="49" charset="0"/>
-              </a:rPr>
-              <a:t>HelloWorld</a:t>
-            </a:r>
-            <a:endParaRPr lang="de-DE" dirty="0">
-              <a:latin typeface="Courier New" panose="02070309020205020404" pitchFamily="49" charset="0"/>
-              <a:cs typeface="Courier New" panose="02070309020205020404" pitchFamily="49" charset="0"/>
-            </a:endParaRPr>
-          </a:p>
-          <a:p>
-            <a:pPr lvl="2"/>
-            <a:r>
-              <a:rPr lang="de-DE" dirty="0"/>
-              <a:t>Führt Java-Bytecode aus</a:t>
-            </a:r>
-          </a:p>
-          <a:p>
-            <a:pPr lvl="2"/>
-            <a:r>
-              <a:rPr lang="de-DE" dirty="0"/>
-              <a:t>Laufzeitumgebung:</a:t>
-            </a:r>
-          </a:p>
-          <a:p>
-            <a:pPr lvl="3"/>
-            <a:r>
-              <a:rPr lang="de-DE" dirty="0"/>
-              <a:t>Interpreter</a:t>
-            </a:r>
-          </a:p>
-          <a:p>
-            <a:pPr lvl="3"/>
-            <a:r>
-              <a:rPr lang="de-DE" dirty="0"/>
-              <a:t>JIT-Compiler</a:t>
-            </a:r>
-          </a:p>
-          <a:p>
-            <a:pPr lvl="3"/>
-            <a:r>
-              <a:rPr lang="de-DE" dirty="0"/>
-              <a:t>Standard-Bibliotheken</a:t>
-            </a:r>
+              <a:rPr lang="de-DE" dirty="0" err="1"/>
+              <a:t>code</a:t>
+            </a:r>
+            <a:endParaRPr lang="de-DE" dirty="0"/>
+          </a:p>
+          <a:p>
+            <a:pPr lvl="2"/>
+            <a:r>
+              <a:rPr lang="de-DE" dirty="0"/>
+              <a:t>Keine gemeinsam genutzte Datenbank</a:t>
+            </a:r>
+          </a:p>
+          <a:p>
+            <a:pPr lvl="2"/>
+            <a:r>
+              <a:rPr lang="de-DE" dirty="0"/>
+              <a:t>Unabhängiges </a:t>
+            </a:r>
+            <a:r>
+              <a:rPr lang="de-DE" dirty="0" err="1"/>
+              <a:t>Build</a:t>
+            </a:r>
+            <a:r>
+              <a:rPr lang="de-DE" dirty="0"/>
+              <a:t>/</a:t>
+            </a:r>
+            <a:r>
+              <a:rPr lang="de-DE" dirty="0" err="1"/>
+              <a:t>Deployment</a:t>
+            </a:r>
+            <a:endParaRPr lang="de-DE" dirty="0"/>
           </a:p>
         </p:txBody>
       </p:sp>
     </p:spTree>
     <p:extLst>
       <p:ext uri="{BB962C8B-B14F-4D97-AF65-F5344CB8AC3E}">
-        <p14:creationId xmlns:p14="http://schemas.microsoft.com/office/powerpoint/2010/main" val="2323058940"/>
+        <p14:creationId xmlns:p14="http://schemas.microsoft.com/office/powerpoint/2010/main" val="2321096448"/>
       </p:ext>
     </p:extLst>
   </p:cSld>
@@ -5874,12 +7375,9 @@
           <a:p>
             <a:r>
               <a:rPr lang="de-DE" dirty="0" err="1"/>
-              <a:t>Step</a:t>
-            </a:r>
-            <a:r>
-              <a:rPr lang="de-DE" dirty="0"/>
-              <a:t> 15</a:t>
-            </a:r>
+              <a:t>Microservices</a:t>
+            </a:r>
+            <a:endParaRPr lang="de-DE" dirty="0"/>
           </a:p>
         </p:txBody>
       </p:sp>
@@ -5901,176 +7399,79 @@
         </p:nvSpPr>
         <p:spPr/>
         <p:txBody>
-          <a:bodyPr/>
-          <a:lstStyle/>
-          <a:p>
-            <a:r>
-              <a:rPr lang="de-DE" dirty="0"/>
-              <a:t>Thema: </a:t>
-            </a:r>
-            <a:r>
-              <a:rPr lang="de-DE" dirty="0" err="1"/>
-              <a:t>Build</a:t>
-            </a:r>
-            <a:r>
-              <a:rPr lang="de-DE" dirty="0"/>
-              <a:t>-Management mit </a:t>
-            </a:r>
-            <a:r>
-              <a:rPr lang="de-DE" dirty="0" err="1"/>
-              <a:t>Maven</a:t>
-            </a:r>
+          <a:bodyPr>
+            <a:normAutofit/>
+          </a:bodyPr>
+          <a:lstStyle/>
+          <a:p>
+            <a:r>
+              <a:rPr lang="de-DE" dirty="0"/>
+              <a:t>Technik</a:t>
+            </a:r>
+          </a:p>
+          <a:p>
+            <a:pPr lvl="1"/>
+            <a:r>
+              <a:rPr lang="de-DE" dirty="0"/>
+              <a:t>Schnittstellen</a:t>
+            </a:r>
+          </a:p>
+          <a:p>
+            <a:pPr lvl="2"/>
+            <a:r>
+              <a:rPr lang="de-DE" dirty="0"/>
+              <a:t>REST/JSON</a:t>
+            </a:r>
+          </a:p>
+          <a:p>
+            <a:pPr lvl="2"/>
+            <a:r>
+              <a:rPr lang="de-DE" dirty="0"/>
+              <a:t>Messages</a:t>
+            </a:r>
+          </a:p>
+          <a:p>
+            <a:pPr lvl="2"/>
             <a:endParaRPr lang="de-DE" dirty="0"/>
           </a:p>
           <a:p>
             <a:pPr lvl="1"/>
             <a:r>
               <a:rPr lang="de-DE" dirty="0"/>
-              <a:t>„</a:t>
-            </a:r>
-            <a:r>
-              <a:rPr lang="de-DE" dirty="0" err="1"/>
-              <a:t>Maven</a:t>
-            </a:r>
-            <a:r>
-              <a:rPr lang="de-DE" dirty="0"/>
-              <a:t> ist ein auf Java basierendes </a:t>
-            </a:r>
-            <a:r>
-              <a:rPr lang="de-DE" dirty="0" err="1"/>
-              <a:t>Build</a:t>
-            </a:r>
-            <a:r>
-              <a:rPr lang="de-DE" dirty="0"/>
-              <a:t>-Management-Tool der Apache Software </a:t>
-            </a:r>
-            <a:r>
-              <a:rPr lang="de-DE" dirty="0" err="1"/>
-              <a:t>Foundation</a:t>
-            </a:r>
-            <a:r>
-              <a:rPr lang="de-DE" dirty="0"/>
-              <a:t>“ (Wikipedia)</a:t>
-            </a:r>
-          </a:p>
-          <a:p>
-            <a:pPr lvl="2"/>
-            <a:r>
-              <a:rPr lang="de-DE" dirty="0"/>
-              <a:t>Gibt Standard-Verzeichnisstruktur und Lebenszyklen (Standard-Ablauf) vor</a:t>
-            </a:r>
-          </a:p>
-          <a:p>
-            <a:pPr lvl="2"/>
-            <a:r>
-              <a:rPr lang="de-DE" dirty="0"/>
-              <a:t>Verwaltet Abhängigkeiten (innerhalb des Projekts und zu benutzten Bibliotheken)</a:t>
-            </a:r>
-          </a:p>
-          <a:p>
-            <a:pPr lvl="2"/>
-            <a:r>
-              <a:rPr lang="de-DE" dirty="0"/>
-              <a:t>Ist erweiterbar durch </a:t>
-            </a:r>
-            <a:r>
-              <a:rPr lang="de-DE" dirty="0" err="1"/>
-              <a:t>Plugins</a:t>
-            </a:r>
+              <a:t>Frameworks</a:t>
+            </a:r>
+          </a:p>
+          <a:p>
+            <a:pPr lvl="2"/>
+            <a:r>
+              <a:rPr lang="de-DE" dirty="0"/>
+              <a:t>Java: Spring Boot, </a:t>
+            </a:r>
+            <a:r>
+              <a:rPr lang="de-DE" dirty="0" err="1"/>
+              <a:t>Quarkus</a:t>
+            </a:r>
+            <a:r>
+              <a:rPr lang="de-DE" dirty="0"/>
+              <a:t>, …</a:t>
+            </a:r>
+          </a:p>
+          <a:p>
+            <a:pPr lvl="2"/>
             <a:endParaRPr lang="de-DE" dirty="0"/>
           </a:p>
           <a:p>
-            <a:pPr lvl="2"/>
-            <a:r>
-              <a:rPr lang="de-DE" dirty="0"/>
-              <a:t>Deklarative Definition des Projekts in </a:t>
-            </a:r>
-            <a:r>
-              <a:rPr lang="de-DE" dirty="0" err="1">
-                <a:latin typeface="Courier New" panose="02070309020205020404" pitchFamily="49" charset="0"/>
-                <a:cs typeface="Courier New" panose="02070309020205020404" pitchFamily="49" charset="0"/>
-              </a:rPr>
-              <a:t>pom.xml</a:t>
-            </a:r>
-            <a:r>
-              <a:rPr lang="de-DE" dirty="0">
-                <a:latin typeface="Courier New" panose="02070309020205020404" pitchFamily="49" charset="0"/>
-                <a:cs typeface="Courier New" panose="02070309020205020404" pitchFamily="49" charset="0"/>
-              </a:rPr>
-              <a:t> </a:t>
-            </a:r>
-            <a:r>
-              <a:rPr lang="de-DE" dirty="0"/>
-              <a:t>(Project </a:t>
-            </a:r>
-            <a:r>
-              <a:rPr lang="de-DE" dirty="0" err="1"/>
-              <a:t>Object</a:t>
-            </a:r>
-            <a:r>
-              <a:rPr lang="de-DE" dirty="0"/>
-              <a:t> Model)</a:t>
-            </a:r>
-          </a:p>
-          <a:p>
             <a:pPr lvl="1"/>
             <a:r>
               <a:rPr lang="de-DE" dirty="0"/>
-              <a:t>Kommando: </a:t>
-            </a:r>
-            <a:r>
-              <a:rPr lang="de-DE" dirty="0" err="1">
-                <a:latin typeface="Courier New" panose="02070309020205020404" pitchFamily="49" charset="0"/>
-                <a:cs typeface="Courier New" panose="02070309020205020404" pitchFamily="49" charset="0"/>
-              </a:rPr>
-              <a:t>mvn</a:t>
-            </a:r>
-            <a:r>
-              <a:rPr lang="de-DE" dirty="0">
-                <a:latin typeface="Courier New" panose="02070309020205020404" pitchFamily="49" charset="0"/>
-                <a:cs typeface="Courier New" panose="02070309020205020404" pitchFamily="49" charset="0"/>
-              </a:rPr>
-              <a:t> clean </a:t>
-            </a:r>
-            <a:r>
-              <a:rPr lang="de-DE" dirty="0" err="1">
-                <a:latin typeface="Courier New" panose="02070309020205020404" pitchFamily="49" charset="0"/>
-                <a:cs typeface="Courier New" panose="02070309020205020404" pitchFamily="49" charset="0"/>
-              </a:rPr>
-              <a:t>package</a:t>
-            </a:r>
-            <a:endParaRPr lang="de-DE" dirty="0">
-              <a:latin typeface="Courier New" panose="02070309020205020404" pitchFamily="49" charset="0"/>
-              <a:cs typeface="Courier New" panose="02070309020205020404" pitchFamily="49" charset="0"/>
-            </a:endParaRPr>
-          </a:p>
-          <a:p>
-            <a:pPr lvl="2"/>
-            <a:r>
-              <a:rPr lang="de-DE" dirty="0">
-                <a:latin typeface="Courier New" panose="02070309020205020404" pitchFamily="49" charset="0"/>
-                <a:cs typeface="Courier New" panose="02070309020205020404" pitchFamily="49" charset="0"/>
-              </a:rPr>
-              <a:t>clean</a:t>
-            </a:r>
-            <a:r>
-              <a:rPr lang="de-DE" dirty="0">
-                <a:cs typeface="Courier New" panose="02070309020205020404" pitchFamily="49" charset="0"/>
-              </a:rPr>
-              <a:t> und </a:t>
-            </a:r>
-            <a:r>
-              <a:rPr lang="de-DE" dirty="0" err="1">
-                <a:latin typeface="Courier New" panose="02070309020205020404" pitchFamily="49" charset="0"/>
-                <a:cs typeface="Courier New" panose="02070309020205020404" pitchFamily="49" charset="0"/>
-              </a:rPr>
-              <a:t>package</a:t>
-            </a:r>
-            <a:r>
-              <a:rPr lang="de-DE" dirty="0">
-                <a:cs typeface="Courier New" panose="02070309020205020404" pitchFamily="49" charset="0"/>
-              </a:rPr>
-              <a:t> sind Lebenszyklen</a:t>
+              <a:t>Kann auch in beliebigen anderen Programmiersprachen realisiert werden</a:t>
+            </a:r>
+          </a:p>
+          <a:p>
+            <a:pPr lvl="2"/>
+            <a:r>
+              <a:rPr lang="de-DE" dirty="0"/>
+              <a:t>C#, JavaScript, Python, …</a:t>
             </a:r>
           </a:p>
         </p:txBody>
@@ -6078,7 +7479,7 @@
     </p:spTree>
     <p:extLst>
       <p:ext uri="{BB962C8B-B14F-4D97-AF65-F5344CB8AC3E}">
-        <p14:creationId xmlns:p14="http://schemas.microsoft.com/office/powerpoint/2010/main" val="492142386"/>
+        <p14:creationId xmlns:p14="http://schemas.microsoft.com/office/powerpoint/2010/main" val="237707568"/>
       </p:ext>
     </p:extLst>
   </p:cSld>

</xml_diff>

<commit_message>
add slides for step0060
</commit_message>
<xml_diff>
--- a/Java-Starter.pptx
+++ b/Java-Starter.pptx
@@ -34,10 +34,17 @@
     <p:sldId id="295" r:id="rId28"/>
     <p:sldId id="293" r:id="rId29"/>
     <p:sldId id="263" r:id="rId30"/>
-    <p:sldId id="264" r:id="rId31"/>
-    <p:sldId id="265" r:id="rId32"/>
-    <p:sldId id="266" r:id="rId33"/>
-    <p:sldId id="267" r:id="rId34"/>
+    <p:sldId id="298" r:id="rId31"/>
+    <p:sldId id="302" r:id="rId32"/>
+    <p:sldId id="303" r:id="rId33"/>
+    <p:sldId id="301" r:id="rId34"/>
+    <p:sldId id="300" r:id="rId35"/>
+    <p:sldId id="297" r:id="rId36"/>
+    <p:sldId id="299" r:id="rId37"/>
+    <p:sldId id="264" r:id="rId38"/>
+    <p:sldId id="265" r:id="rId39"/>
+    <p:sldId id="266" r:id="rId40"/>
+    <p:sldId id="267" r:id="rId41"/>
   </p:sldIdLst>
   <p:sldSz cx="12192000" cy="6858000"/>
   <p:notesSz cx="6858000" cy="9144000"/>
@@ -291,7 +298,7 @@
           <a:p>
             <a:fld id="{D504FEAC-1E62-0E47-82AE-5BB4BD139FFA}" type="datetimeFigureOut">
               <a:rPr lang="de-DE" smtClean="0"/>
-              <a:t>03.04.22</a:t>
+              <a:t>04.04.22</a:t>
             </a:fld>
             <a:endParaRPr lang="de-DE"/>
           </a:p>
@@ -489,7 +496,7 @@
           <a:p>
             <a:fld id="{D504FEAC-1E62-0E47-82AE-5BB4BD139FFA}" type="datetimeFigureOut">
               <a:rPr lang="de-DE" smtClean="0"/>
-              <a:t>03.04.22</a:t>
+              <a:t>04.04.22</a:t>
             </a:fld>
             <a:endParaRPr lang="de-DE"/>
           </a:p>
@@ -697,7 +704,7 @@
           <a:p>
             <a:fld id="{D504FEAC-1E62-0E47-82AE-5BB4BD139FFA}" type="datetimeFigureOut">
               <a:rPr lang="de-DE" smtClean="0"/>
-              <a:t>03.04.22</a:t>
+              <a:t>04.04.22</a:t>
             </a:fld>
             <a:endParaRPr lang="de-DE"/>
           </a:p>
@@ -895,7 +902,7 @@
           <a:p>
             <a:fld id="{D504FEAC-1E62-0E47-82AE-5BB4BD139FFA}" type="datetimeFigureOut">
               <a:rPr lang="de-DE" smtClean="0"/>
-              <a:t>03.04.22</a:t>
+              <a:t>04.04.22</a:t>
             </a:fld>
             <a:endParaRPr lang="de-DE"/>
           </a:p>
@@ -1170,7 +1177,7 @@
           <a:p>
             <a:fld id="{D504FEAC-1E62-0E47-82AE-5BB4BD139FFA}" type="datetimeFigureOut">
               <a:rPr lang="de-DE" smtClean="0"/>
-              <a:t>03.04.22</a:t>
+              <a:t>04.04.22</a:t>
             </a:fld>
             <a:endParaRPr lang="de-DE"/>
           </a:p>
@@ -1435,7 +1442,7 @@
           <a:p>
             <a:fld id="{D504FEAC-1E62-0E47-82AE-5BB4BD139FFA}" type="datetimeFigureOut">
               <a:rPr lang="de-DE" smtClean="0"/>
-              <a:t>03.04.22</a:t>
+              <a:t>04.04.22</a:t>
             </a:fld>
             <a:endParaRPr lang="de-DE"/>
           </a:p>
@@ -1847,7 +1854,7 @@
           <a:p>
             <a:fld id="{D504FEAC-1E62-0E47-82AE-5BB4BD139FFA}" type="datetimeFigureOut">
               <a:rPr lang="de-DE" smtClean="0"/>
-              <a:t>03.04.22</a:t>
+              <a:t>04.04.22</a:t>
             </a:fld>
             <a:endParaRPr lang="de-DE"/>
           </a:p>
@@ -1988,7 +1995,7 @@
           <a:p>
             <a:fld id="{D504FEAC-1E62-0E47-82AE-5BB4BD139FFA}" type="datetimeFigureOut">
               <a:rPr lang="de-DE" smtClean="0"/>
-              <a:t>03.04.22</a:t>
+              <a:t>04.04.22</a:t>
             </a:fld>
             <a:endParaRPr lang="de-DE"/>
           </a:p>
@@ -2101,7 +2108,7 @@
           <a:p>
             <a:fld id="{D504FEAC-1E62-0E47-82AE-5BB4BD139FFA}" type="datetimeFigureOut">
               <a:rPr lang="de-DE" smtClean="0"/>
-              <a:t>03.04.22</a:t>
+              <a:t>04.04.22</a:t>
             </a:fld>
             <a:endParaRPr lang="de-DE"/>
           </a:p>
@@ -2412,7 +2419,7 @@
           <a:p>
             <a:fld id="{D504FEAC-1E62-0E47-82AE-5BB4BD139FFA}" type="datetimeFigureOut">
               <a:rPr lang="de-DE" smtClean="0"/>
-              <a:t>03.04.22</a:t>
+              <a:t>04.04.22</a:t>
             </a:fld>
             <a:endParaRPr lang="de-DE"/>
           </a:p>
@@ -2700,7 +2707,7 @@
           <a:p>
             <a:fld id="{D504FEAC-1E62-0E47-82AE-5BB4BD139FFA}" type="datetimeFigureOut">
               <a:rPr lang="de-DE" smtClean="0"/>
-              <a:t>03.04.22</a:t>
+              <a:t>04.04.22</a:t>
             </a:fld>
             <a:endParaRPr lang="de-DE"/>
           </a:p>
@@ -2941,7 +2948,7 @@
           <a:p>
             <a:fld id="{D504FEAC-1E62-0E47-82AE-5BB4BD139FFA}" type="datetimeFigureOut">
               <a:rPr lang="de-DE" smtClean="0"/>
-              <a:t>03.04.22</a:t>
+              <a:t>04.04.22</a:t>
             </a:fld>
             <a:endParaRPr lang="de-DE"/>
           </a:p>
@@ -8196,106 +8203,92 @@
           <a:p>
             <a:r>
               <a:rPr lang="de-DE" dirty="0"/>
-              <a:t>Thema: Implementierung eines REST-Endpunktes mit Spring Boot</a:t>
+              <a:t>HTTP – das Protokoll des Internets</a:t>
             </a:r>
           </a:p>
           <a:p>
             <a:pPr lvl="1"/>
+            <a:r>
+              <a:rPr lang="de-DE" dirty="0"/>
+              <a:t> zustandsloses Protokoll zur Übertragung von Daten über ein Rechnernetz</a:t>
+            </a:r>
+          </a:p>
+          <a:p>
             <a:r>
               <a:rPr lang="de-DE" dirty="0">
                 <a:cs typeface="Courier New" panose="02070309020205020404" pitchFamily="49" charset="0"/>
               </a:rPr>
-              <a:t>Spring</a:t>
-            </a:r>
-          </a:p>
-          <a:p>
-            <a:pPr lvl="2"/>
+              <a:t>Eng verknüpft mit</a:t>
+            </a:r>
+          </a:p>
+          <a:p>
+            <a:pPr lvl="1"/>
             <a:r>
               <a:rPr lang="de-DE" dirty="0">
                 <a:cs typeface="Courier New" panose="02070309020205020404" pitchFamily="49" charset="0"/>
               </a:rPr>
-              <a:t>Java-Framework zur Implementierung von Enterprise </a:t>
+              <a:t>URLs (URIs)</a:t>
+            </a:r>
+          </a:p>
+          <a:p>
+            <a:pPr lvl="2"/>
+            <a:r>
+              <a:rPr lang="de-DE" dirty="0">
+                <a:cs typeface="Courier New" panose="02070309020205020404" pitchFamily="49" charset="0"/>
+              </a:rPr>
+              <a:t>Identifiziert eine Ressource in Computernetzwerken</a:t>
+            </a:r>
+          </a:p>
+          <a:p>
+            <a:pPr lvl="2"/>
+            <a:r>
+              <a:rPr lang="de-DE" dirty="0">
+                <a:cs typeface="Courier New" panose="02070309020205020404" pitchFamily="49" charset="0"/>
+              </a:rPr>
+              <a:t>Beispiel: </a:t>
+            </a:r>
+            <a:r>
+              <a:rPr lang="de-DE" dirty="0">
+                <a:cs typeface="Courier New" panose="02070309020205020404" pitchFamily="49" charset="0"/>
+                <a:hlinkClick r:id="rId2"/>
+              </a:rPr>
+              <a:t>http://localhost:8080/hello.html</a:t>
+            </a:r>
+            <a:endParaRPr lang="de-DE" dirty="0">
+              <a:cs typeface="Courier New" panose="02070309020205020404" pitchFamily="49" charset="0"/>
+            </a:endParaRPr>
+          </a:p>
+          <a:p>
+            <a:pPr lvl="1"/>
+            <a:r>
+              <a:rPr lang="de-DE" dirty="0">
+                <a:cs typeface="Courier New" panose="02070309020205020404" pitchFamily="49" charset="0"/>
+              </a:rPr>
+              <a:t>HTML</a:t>
+            </a:r>
+          </a:p>
+          <a:p>
+            <a:pPr lvl="2"/>
+            <a:r>
+              <a:rPr lang="de-DE" dirty="0">
+                <a:cs typeface="Courier New" panose="02070309020205020404" pitchFamily="49" charset="0"/>
+              </a:rPr>
+              <a:t>Auszeichnungssprache zur Strukturierung elektronischer Dokumente wie Texte mit Hyperlinks, Bildern und anderen Inhalten</a:t>
+            </a:r>
+          </a:p>
+          <a:p>
+            <a:pPr lvl="2"/>
+            <a:r>
+              <a:rPr lang="de-DE" dirty="0">
+                <a:cs typeface="Courier New" panose="02070309020205020404" pitchFamily="49" charset="0"/>
+              </a:rPr>
+              <a:t> Beispiel: </a:t>
             </a:r>
             <a:r>
               <a:rPr lang="de-DE" dirty="0" err="1">
                 <a:cs typeface="Courier New" panose="02070309020205020404" pitchFamily="49" charset="0"/>
               </a:rPr>
-              <a:t>Applications</a:t>
-            </a:r>
-            <a:endParaRPr lang="de-DE" dirty="0">
-              <a:cs typeface="Courier New" panose="02070309020205020404" pitchFamily="49" charset="0"/>
-            </a:endParaRPr>
-          </a:p>
-          <a:p>
-            <a:pPr lvl="2"/>
-            <a:r>
-              <a:rPr lang="de-DE" dirty="0">
-                <a:cs typeface="Courier New" panose="02070309020205020404" pitchFamily="49" charset="0"/>
-              </a:rPr>
-              <a:t>Kern: Framework für </a:t>
-            </a:r>
-            <a:r>
-              <a:rPr lang="de-DE" dirty="0" err="1">
-                <a:cs typeface="Courier New" panose="02070309020205020404" pitchFamily="49" charset="0"/>
-              </a:rPr>
-              <a:t>Dependency</a:t>
-            </a:r>
-            <a:r>
-              <a:rPr lang="de-DE" dirty="0">
-                <a:cs typeface="Courier New" panose="02070309020205020404" pitchFamily="49" charset="0"/>
-              </a:rPr>
-              <a:t> </a:t>
-            </a:r>
-            <a:r>
-              <a:rPr lang="de-DE" dirty="0" err="1">
-                <a:cs typeface="Courier New" panose="02070309020205020404" pitchFamily="49" charset="0"/>
-              </a:rPr>
-              <a:t>Injection</a:t>
-            </a:r>
-            <a:endParaRPr lang="de-DE" dirty="0">
-              <a:cs typeface="Courier New" panose="02070309020205020404" pitchFamily="49" charset="0"/>
-            </a:endParaRPr>
-          </a:p>
-          <a:p>
-            <a:pPr lvl="2"/>
-            <a:r>
-              <a:rPr lang="de-DE" dirty="0">
-                <a:cs typeface="Courier New" panose="02070309020205020404" pitchFamily="49" charset="0"/>
-              </a:rPr>
-              <a:t>Sehr umfangreich</a:t>
-            </a:r>
-          </a:p>
-          <a:p>
-            <a:pPr lvl="1"/>
-            <a:r>
-              <a:rPr lang="de-DE" dirty="0">
-                <a:cs typeface="Courier New" panose="02070309020205020404" pitchFamily="49" charset="0"/>
-              </a:rPr>
-              <a:t>Spring Boot</a:t>
-            </a:r>
-          </a:p>
-          <a:p>
-            <a:pPr lvl="2"/>
-            <a:r>
-              <a:rPr lang="de-DE" dirty="0">
-                <a:cs typeface="Courier New" panose="02070309020205020404" pitchFamily="49" charset="0"/>
-              </a:rPr>
-              <a:t>Vereinfachte Konfiguration von Spring-Anwendungen (vordefinierte Starter)</a:t>
-            </a:r>
-          </a:p>
-          <a:p>
-            <a:pPr lvl="2"/>
-            <a:r>
-              <a:rPr lang="de-DE" dirty="0">
-                <a:cs typeface="Courier New" panose="02070309020205020404" pitchFamily="49" charset="0"/>
-              </a:rPr>
-              <a:t>Sehr beliebt zur Implementierung von </a:t>
-            </a:r>
-            <a:r>
-              <a:rPr lang="de-DE" dirty="0" err="1">
-                <a:cs typeface="Courier New" panose="02070309020205020404" pitchFamily="49" charset="0"/>
-              </a:rPr>
-              <a:t>Microservices</a:t>
+              <a:t>hello.html</a:t>
             </a:r>
             <a:endParaRPr lang="de-DE" dirty="0">
               <a:cs typeface="Courier New" panose="02070309020205020404" pitchFamily="49" charset="0"/>
@@ -8532,7 +8525,7 @@
             </a:r>
             <a:r>
               <a:rPr lang="de-DE" dirty="0"/>
-              <a:t> 70</a:t>
+              <a:t> 60</a:t>
             </a:r>
           </a:p>
         </p:txBody>
@@ -8555,28 +8548,51 @@
         </p:nvSpPr>
         <p:spPr/>
         <p:txBody>
-          <a:bodyPr/>
-          <a:lstStyle/>
-          <a:p>
-            <a:r>
-              <a:rPr lang="de-DE" dirty="0"/>
-              <a:t>Thema: </a:t>
-            </a:r>
-            <a:r>
-              <a:rPr lang="de-DE" dirty="0" err="1"/>
-              <a:t>Dependency</a:t>
-            </a:r>
-            <a:r>
-              <a:rPr lang="de-DE" dirty="0"/>
-              <a:t> </a:t>
-            </a:r>
-            <a:r>
-              <a:rPr lang="de-DE" dirty="0" err="1"/>
-              <a:t>Injection</a:t>
-            </a:r>
-            <a:r>
-              <a:rPr lang="de-DE" dirty="0"/>
-              <a:t> mit Spring</a:t>
+          <a:bodyPr>
+            <a:normAutofit/>
+          </a:bodyPr>
+          <a:lstStyle/>
+          <a:p>
+            <a:r>
+              <a:rPr lang="de-DE" dirty="0"/>
+              <a:t>REST-Endpunkt</a:t>
+            </a:r>
+          </a:p>
+          <a:p>
+            <a:pPr lvl="1"/>
+            <a:r>
+              <a:rPr lang="de-DE" dirty="0"/>
+              <a:t>Schnittstelle eines </a:t>
+            </a:r>
+            <a:r>
+              <a:rPr lang="de-DE" dirty="0" err="1"/>
+              <a:t>Microservices</a:t>
+            </a:r>
+            <a:r>
+              <a:rPr lang="de-DE" dirty="0"/>
+              <a:t>, über die Funktionen des </a:t>
+            </a:r>
+            <a:r>
+              <a:rPr lang="de-DE" dirty="0" err="1"/>
+              <a:t>Microservice</a:t>
+            </a:r>
+            <a:r>
+              <a:rPr lang="de-DE" dirty="0"/>
+              <a:t> aufgerufen werden können</a:t>
+            </a:r>
+          </a:p>
+          <a:p>
+            <a:pPr lvl="1"/>
+            <a:r>
+              <a:rPr lang="de-DE" dirty="0"/>
+              <a:t>Basierend auf dem HTTP-Protokoll</a:t>
+            </a:r>
+          </a:p>
+          <a:p>
+            <a:pPr lvl="1"/>
+            <a:r>
+              <a:rPr lang="de-DE" dirty="0"/>
+              <a:t>Codierung der Daten als JSON</a:t>
             </a:r>
           </a:p>
         </p:txBody>
@@ -8584,7 +8600,7 @@
     </p:spTree>
     <p:extLst>
       <p:ext uri="{BB962C8B-B14F-4D97-AF65-F5344CB8AC3E}">
-        <p14:creationId xmlns:p14="http://schemas.microsoft.com/office/powerpoint/2010/main" val="2804024451"/>
+        <p14:creationId xmlns:p14="http://schemas.microsoft.com/office/powerpoint/2010/main" val="254585829"/>
       </p:ext>
     </p:extLst>
   </p:cSld>
@@ -8638,7 +8654,7 @@
             </a:r>
             <a:r>
               <a:rPr lang="de-DE" dirty="0"/>
-              <a:t> 80</a:t>
+              <a:t> 60</a:t>
             </a:r>
           </a:p>
         </p:txBody>
@@ -8661,36 +8677,78 @@
         </p:nvSpPr>
         <p:spPr/>
         <p:txBody>
-          <a:bodyPr/>
-          <a:lstStyle/>
-          <a:p>
-            <a:r>
-              <a:rPr lang="de-DE" dirty="0"/>
-              <a:t>Thema: Testen mit Mocks</a:t>
+          <a:bodyPr>
+            <a:normAutofit/>
+          </a:bodyPr>
+          <a:lstStyle/>
+          <a:p>
+            <a:r>
+              <a:rPr lang="de-DE" dirty="0"/>
+              <a:t>REST-Endpunkt</a:t>
             </a:r>
           </a:p>
           <a:p>
             <a:pPr lvl="1"/>
             <a:r>
-              <a:rPr lang="de-DE" dirty="0" err="1"/>
-              <a:t>Mockito</a:t>
-            </a:r>
-            <a:r>
-              <a:rPr lang="de-DE" dirty="0"/>
-              <a:t>: Bibliothek zum Erstellen von Mock-Objekten </a:t>
-            </a:r>
-            <a:r>
-              <a:rPr lang="de-DE"/>
-              <a:t>in Unit-Tests</a:t>
-            </a:r>
-            <a:endParaRPr lang="de-DE" dirty="0"/>
+              <a:rPr lang="de-DE" dirty="0"/>
+              <a:t>Aufruf</a:t>
+            </a:r>
+          </a:p>
+          <a:p>
+            <a:pPr lvl="2"/>
+            <a:r>
+              <a:rPr lang="de-DE" dirty="0"/>
+              <a:t>Methode (POST, PUT, GET, DELETE)</a:t>
+            </a:r>
+          </a:p>
+          <a:p>
+            <a:pPr lvl="2"/>
+            <a:r>
+              <a:rPr lang="de-DE" dirty="0"/>
+              <a:t>URL</a:t>
+            </a:r>
+          </a:p>
+          <a:p>
+            <a:pPr lvl="2"/>
+            <a:r>
+              <a:rPr lang="de-DE" dirty="0"/>
+              <a:t>Request-Header</a:t>
+            </a:r>
+          </a:p>
+          <a:p>
+            <a:pPr lvl="3"/>
+            <a:r>
+              <a:rPr lang="de-DE" dirty="0"/>
+              <a:t>Steuer-Parameter/Meta-Informationen, z. B. Format, Zeichensatz</a:t>
+            </a:r>
+          </a:p>
+          <a:p>
+            <a:pPr lvl="2"/>
+            <a:r>
+              <a:rPr lang="de-DE" dirty="0"/>
+              <a:t>Request-Body</a:t>
+            </a:r>
+          </a:p>
+          <a:p>
+            <a:pPr lvl="3"/>
+            <a:r>
+              <a:rPr lang="de-DE" dirty="0"/>
+              <a:t>Eingabe-Daten</a:t>
+            </a:r>
+          </a:p>
+          <a:p>
+            <a:pPr lvl="3"/>
+            <a:r>
+              <a:rPr lang="de-DE" dirty="0"/>
+              <a:t>JSON-Format</a:t>
+            </a:r>
           </a:p>
         </p:txBody>
       </p:sp>
     </p:spTree>
     <p:extLst>
       <p:ext uri="{BB962C8B-B14F-4D97-AF65-F5344CB8AC3E}">
-        <p14:creationId xmlns:p14="http://schemas.microsoft.com/office/powerpoint/2010/main" val="1609070468"/>
+        <p14:creationId xmlns:p14="http://schemas.microsoft.com/office/powerpoint/2010/main" val="3155125537"/>
       </p:ext>
     </p:extLst>
   </p:cSld>
@@ -8744,7 +8802,7 @@
             </a:r>
             <a:r>
               <a:rPr lang="de-DE" dirty="0"/>
-              <a:t> 90</a:t>
+              <a:t> 60</a:t>
             </a:r>
           </a:p>
         </p:txBody>
@@ -8767,20 +8825,65 @@
         </p:nvSpPr>
         <p:spPr/>
         <p:txBody>
-          <a:bodyPr/>
-          <a:lstStyle/>
-          <a:p>
-            <a:r>
-              <a:rPr lang="de-DE" dirty="0"/>
-              <a:t>Thema: Persistenz mit Spring Data</a:t>
-            </a:r>
+          <a:bodyPr>
+            <a:normAutofit/>
+          </a:bodyPr>
+          <a:lstStyle/>
+          <a:p>
+            <a:r>
+              <a:rPr lang="de-DE" dirty="0"/>
+              <a:t>REST-Endpunkt</a:t>
+            </a:r>
+          </a:p>
+          <a:p>
+            <a:pPr lvl="1"/>
+            <a:r>
+              <a:rPr lang="de-DE" dirty="0"/>
+              <a:t>Ergebnis</a:t>
+            </a:r>
+          </a:p>
+          <a:p>
+            <a:pPr lvl="2"/>
+            <a:r>
+              <a:rPr lang="de-DE" dirty="0"/>
+              <a:t>Response-Header</a:t>
+            </a:r>
+          </a:p>
+          <a:p>
+            <a:pPr lvl="3"/>
+            <a:r>
+              <a:rPr lang="de-DE" dirty="0"/>
+              <a:t>Steuer-Parameter/Meta-Informationen, z. B. Format, Zeichensatz</a:t>
+            </a:r>
+          </a:p>
+          <a:p>
+            <a:pPr lvl="2"/>
+            <a:r>
+              <a:rPr lang="de-DE" dirty="0"/>
+              <a:t>Request-Body</a:t>
+            </a:r>
+          </a:p>
+          <a:p>
+            <a:pPr lvl="3"/>
+            <a:r>
+              <a:rPr lang="de-DE" dirty="0"/>
+              <a:t>Ausgabe-Daten</a:t>
+            </a:r>
+          </a:p>
+          <a:p>
+            <a:pPr lvl="3"/>
+            <a:r>
+              <a:rPr lang="de-DE"/>
+              <a:t>JSON-Format</a:t>
+            </a:r>
+            <a:endParaRPr lang="de-DE" dirty="0"/>
           </a:p>
         </p:txBody>
       </p:sp>
     </p:spTree>
     <p:extLst>
       <p:ext uri="{BB962C8B-B14F-4D97-AF65-F5344CB8AC3E}">
-        <p14:creationId xmlns:p14="http://schemas.microsoft.com/office/powerpoint/2010/main" val="3263348999"/>
+        <p14:creationId xmlns:p14="http://schemas.microsoft.com/office/powerpoint/2010/main" val="3667401884"/>
       </p:ext>
     </p:extLst>
   </p:cSld>
@@ -8834,7 +8937,7 @@
             </a:r>
             <a:r>
               <a:rPr lang="de-DE" dirty="0"/>
-              <a:t> 100</a:t>
+              <a:t> 60</a:t>
             </a:r>
           </a:p>
         </p:txBody>
@@ -8862,7 +8965,143 @@
           <a:p>
             <a:r>
               <a:rPr lang="de-DE" dirty="0"/>
-              <a:t>Thema: Service als Docker-Container</a:t>
+              <a:t>Typische Methoden für REST-Endpunkt</a:t>
+            </a:r>
+          </a:p>
+          <a:p>
+            <a:pPr lvl="1"/>
+            <a:r>
+              <a:rPr lang="de-DE" dirty="0"/>
+              <a:t>POST /</a:t>
+            </a:r>
+            <a:r>
+              <a:rPr lang="de-DE" dirty="0" err="1"/>
+              <a:t>api</a:t>
+            </a:r>
+            <a:r>
+              <a:rPr lang="de-DE" dirty="0"/>
+              <a:t>/</a:t>
+            </a:r>
+            <a:r>
+              <a:rPr lang="de-DE" dirty="0" err="1"/>
+              <a:t>person</a:t>
+            </a:r>
+            <a:endParaRPr lang="de-DE" dirty="0"/>
+          </a:p>
+          <a:p>
+            <a:pPr lvl="2"/>
+            <a:r>
+              <a:rPr lang="de-DE" dirty="0"/>
+              <a:t>Erzeugt Person</a:t>
+            </a:r>
+          </a:p>
+          <a:p>
+            <a:pPr lvl="2"/>
+            <a:r>
+              <a:rPr lang="de-DE" dirty="0"/>
+              <a:t>Liefert ID</a:t>
+            </a:r>
+          </a:p>
+          <a:p>
+            <a:pPr lvl="1"/>
+            <a:r>
+              <a:rPr lang="de-DE" dirty="0"/>
+              <a:t>PUT /</a:t>
+            </a:r>
+            <a:r>
+              <a:rPr lang="de-DE" dirty="0" err="1"/>
+              <a:t>api</a:t>
+            </a:r>
+            <a:r>
+              <a:rPr lang="de-DE" dirty="0"/>
+              <a:t>/</a:t>
+            </a:r>
+            <a:r>
+              <a:rPr lang="de-DE" dirty="0" err="1"/>
+              <a:t>person</a:t>
+            </a:r>
+            <a:r>
+              <a:rPr lang="de-DE" dirty="0"/>
+              <a:t>/{ID}</a:t>
+            </a:r>
+          </a:p>
+          <a:p>
+            <a:pPr lvl="2"/>
+            <a:r>
+              <a:rPr lang="de-DE" dirty="0"/>
+              <a:t>Ändert Person</a:t>
+            </a:r>
+          </a:p>
+          <a:p>
+            <a:pPr lvl="1"/>
+            <a:r>
+              <a:rPr lang="de-DE" dirty="0"/>
+              <a:t>GET /</a:t>
+            </a:r>
+            <a:r>
+              <a:rPr lang="de-DE" dirty="0" err="1"/>
+              <a:t>api</a:t>
+            </a:r>
+            <a:r>
+              <a:rPr lang="de-DE" dirty="0"/>
+              <a:t>/</a:t>
+            </a:r>
+            <a:r>
+              <a:rPr lang="de-DE" dirty="0" err="1"/>
+              <a:t>person</a:t>
+            </a:r>
+            <a:r>
+              <a:rPr lang="de-DE" dirty="0"/>
+              <a:t>/{ID}</a:t>
+            </a:r>
+          </a:p>
+          <a:p>
+            <a:pPr lvl="2"/>
+            <a:r>
+              <a:rPr lang="de-DE" dirty="0"/>
+              <a:t>Holt Person</a:t>
+            </a:r>
+          </a:p>
+          <a:p>
+            <a:pPr lvl="1"/>
+            <a:r>
+              <a:rPr lang="de-DE" dirty="0"/>
+              <a:t>GET /</a:t>
+            </a:r>
+            <a:r>
+              <a:rPr lang="de-DE" dirty="0" err="1"/>
+              <a:t>api</a:t>
+            </a:r>
+            <a:r>
+              <a:rPr lang="de-DE" dirty="0"/>
+              <a:t>/</a:t>
+            </a:r>
+            <a:r>
+              <a:rPr lang="de-DE" dirty="0" err="1"/>
+              <a:t>person</a:t>
+            </a:r>
+            <a:endParaRPr lang="de-DE" dirty="0"/>
+          </a:p>
+          <a:p>
+            <a:pPr lvl="2"/>
+            <a:r>
+              <a:rPr lang="de-DE" dirty="0"/>
+              <a:t>Holt </a:t>
+            </a:r>
+            <a:r>
+              <a:rPr lang="de-DE" b="1" dirty="0"/>
+              <a:t>alle</a:t>
+            </a:r>
+            <a:r>
+              <a:rPr lang="de-DE" dirty="0"/>
+              <a:t> Personen</a:t>
+            </a:r>
+          </a:p>
+          <a:p>
+            <a:pPr lvl="2"/>
+            <a:r>
+              <a:rPr lang="de-DE" dirty="0"/>
+              <a:t>Und wenn das sehr viele sind (Millionen)?</a:t>
             </a:r>
           </a:p>
         </p:txBody>
@@ -8870,7 +9109,765 @@
     </p:spTree>
     <p:extLst>
       <p:ext uri="{BB962C8B-B14F-4D97-AF65-F5344CB8AC3E}">
-        <p14:creationId xmlns:p14="http://schemas.microsoft.com/office/powerpoint/2010/main" val="1059597919"/>
+        <p14:creationId xmlns:p14="http://schemas.microsoft.com/office/powerpoint/2010/main" val="213345787"/>
+      </p:ext>
+    </p:extLst>
+  </p:cSld>
+  <p:clrMapOvr>
+    <a:masterClrMapping/>
+  </p:clrMapOvr>
+</p:sld>
+</file>
+
+<file path=ppt/slides/slide34.xml><?xml version="1.0" encoding="utf-8"?>
+<p:sld xmlns:a="http://schemas.openxmlformats.org/drawingml/2006/main" xmlns:r="http://schemas.openxmlformats.org/officeDocument/2006/relationships" xmlns:p="http://schemas.openxmlformats.org/presentationml/2006/main">
+  <p:cSld>
+    <p:spTree>
+      <p:nvGrpSpPr>
+        <p:cNvPr id="1" name=""/>
+        <p:cNvGrpSpPr/>
+        <p:nvPr/>
+      </p:nvGrpSpPr>
+      <p:grpSpPr>
+        <a:xfrm>
+          <a:off x="0" y="0"/>
+          <a:ext cx="0" cy="0"/>
+          <a:chOff x="0" y="0"/>
+          <a:chExt cx="0" cy="0"/>
+        </a:xfrm>
+      </p:grpSpPr>
+      <p:sp>
+        <p:nvSpPr>
+          <p:cNvPr id="2" name="Titel 1">
+            <a:extLst>
+              <a:ext uri="{FF2B5EF4-FFF2-40B4-BE49-F238E27FC236}">
+                <a16:creationId xmlns:a16="http://schemas.microsoft.com/office/drawing/2014/main" id="{0EC7A146-A8F2-A844-9033-A0ACC828AF47}"/>
+              </a:ext>
+            </a:extLst>
+          </p:cNvPr>
+          <p:cNvSpPr>
+            <a:spLocks noGrp="1"/>
+          </p:cNvSpPr>
+          <p:nvPr>
+            <p:ph type="title"/>
+          </p:nvPr>
+        </p:nvSpPr>
+        <p:spPr/>
+        <p:txBody>
+          <a:bodyPr/>
+          <a:lstStyle/>
+          <a:p>
+            <a:r>
+              <a:rPr lang="de-DE" dirty="0" err="1"/>
+              <a:t>Step</a:t>
+            </a:r>
+            <a:r>
+              <a:rPr lang="de-DE" dirty="0"/>
+              <a:t> 60</a:t>
+            </a:r>
+          </a:p>
+        </p:txBody>
+      </p:sp>
+      <p:sp>
+        <p:nvSpPr>
+          <p:cNvPr id="3" name="Inhaltsplatzhalter 2">
+            <a:extLst>
+              <a:ext uri="{FF2B5EF4-FFF2-40B4-BE49-F238E27FC236}">
+                <a16:creationId xmlns:a16="http://schemas.microsoft.com/office/drawing/2014/main" id="{2A5EBA90-6155-FD45-A74C-ECC42BCA72DF}"/>
+              </a:ext>
+            </a:extLst>
+          </p:cNvPr>
+          <p:cNvSpPr>
+            <a:spLocks noGrp="1"/>
+          </p:cNvSpPr>
+          <p:nvPr>
+            <p:ph idx="1"/>
+          </p:nvPr>
+        </p:nvSpPr>
+        <p:spPr/>
+        <p:txBody>
+          <a:bodyPr/>
+          <a:lstStyle/>
+          <a:p>
+            <a:r>
+              <a:rPr lang="de-DE" dirty="0"/>
+              <a:t>Thema: Implementierung eines REST-Endpunktes mit Spring Boot</a:t>
+            </a:r>
+          </a:p>
+          <a:p>
+            <a:pPr lvl="1"/>
+            <a:r>
+              <a:rPr lang="de-DE" dirty="0">
+                <a:cs typeface="Courier New" panose="02070309020205020404" pitchFamily="49" charset="0"/>
+              </a:rPr>
+              <a:t>Spring</a:t>
+            </a:r>
+          </a:p>
+          <a:p>
+            <a:pPr lvl="2"/>
+            <a:r>
+              <a:rPr lang="de-DE" dirty="0">
+                <a:cs typeface="Courier New" panose="02070309020205020404" pitchFamily="49" charset="0"/>
+              </a:rPr>
+              <a:t>Java-Framework zur Implementierung von Enterprise </a:t>
+            </a:r>
+            <a:r>
+              <a:rPr lang="de-DE" dirty="0" err="1">
+                <a:cs typeface="Courier New" panose="02070309020205020404" pitchFamily="49" charset="0"/>
+              </a:rPr>
+              <a:t>Applications</a:t>
+            </a:r>
+            <a:endParaRPr lang="de-DE" dirty="0">
+              <a:cs typeface="Courier New" panose="02070309020205020404" pitchFamily="49" charset="0"/>
+            </a:endParaRPr>
+          </a:p>
+          <a:p>
+            <a:pPr lvl="2"/>
+            <a:r>
+              <a:rPr lang="de-DE" dirty="0">
+                <a:cs typeface="Courier New" panose="02070309020205020404" pitchFamily="49" charset="0"/>
+              </a:rPr>
+              <a:t>Kern (Spring </a:t>
+            </a:r>
+            <a:r>
+              <a:rPr lang="de-DE">
+                <a:cs typeface="Courier New" panose="02070309020205020404" pitchFamily="49" charset="0"/>
+              </a:rPr>
+              <a:t>core): </a:t>
+            </a:r>
+            <a:r>
+              <a:rPr lang="de-DE" dirty="0">
+                <a:cs typeface="Courier New" panose="02070309020205020404" pitchFamily="49" charset="0"/>
+              </a:rPr>
+              <a:t>Framework für </a:t>
+            </a:r>
+            <a:r>
+              <a:rPr lang="de-DE" dirty="0" err="1">
+                <a:cs typeface="Courier New" panose="02070309020205020404" pitchFamily="49" charset="0"/>
+              </a:rPr>
+              <a:t>Dependency</a:t>
+            </a:r>
+            <a:r>
+              <a:rPr lang="de-DE" dirty="0">
+                <a:cs typeface="Courier New" panose="02070309020205020404" pitchFamily="49" charset="0"/>
+              </a:rPr>
+              <a:t> </a:t>
+            </a:r>
+            <a:r>
+              <a:rPr lang="de-DE" dirty="0" err="1">
+                <a:cs typeface="Courier New" panose="02070309020205020404" pitchFamily="49" charset="0"/>
+              </a:rPr>
+              <a:t>Injection</a:t>
+            </a:r>
+            <a:endParaRPr lang="de-DE" dirty="0">
+              <a:cs typeface="Courier New" panose="02070309020205020404" pitchFamily="49" charset="0"/>
+            </a:endParaRPr>
+          </a:p>
+          <a:p>
+            <a:pPr lvl="2"/>
+            <a:r>
+              <a:rPr lang="de-DE" dirty="0">
+                <a:cs typeface="Courier New" panose="02070309020205020404" pitchFamily="49" charset="0"/>
+              </a:rPr>
+              <a:t>Sehr umfangreich</a:t>
+            </a:r>
+          </a:p>
+          <a:p>
+            <a:pPr lvl="1"/>
+            <a:r>
+              <a:rPr lang="de-DE" dirty="0">
+                <a:cs typeface="Courier New" panose="02070309020205020404" pitchFamily="49" charset="0"/>
+              </a:rPr>
+              <a:t>Spring Boot</a:t>
+            </a:r>
+          </a:p>
+          <a:p>
+            <a:pPr lvl="2"/>
+            <a:r>
+              <a:rPr lang="de-DE" dirty="0">
+                <a:cs typeface="Courier New" panose="02070309020205020404" pitchFamily="49" charset="0"/>
+              </a:rPr>
+              <a:t>Vereinfachte Konfiguration von Spring-Anwendungen (vordefinierte Starter)</a:t>
+            </a:r>
+          </a:p>
+          <a:p>
+            <a:pPr lvl="2"/>
+            <a:r>
+              <a:rPr lang="de-DE" dirty="0">
+                <a:cs typeface="Courier New" panose="02070309020205020404" pitchFamily="49" charset="0"/>
+              </a:rPr>
+              <a:t>Sehr beliebt zur Implementierung von </a:t>
+            </a:r>
+            <a:r>
+              <a:rPr lang="de-DE" dirty="0" err="1">
+                <a:cs typeface="Courier New" panose="02070309020205020404" pitchFamily="49" charset="0"/>
+              </a:rPr>
+              <a:t>Microservices</a:t>
+            </a:r>
+            <a:endParaRPr lang="de-DE" dirty="0">
+              <a:cs typeface="Courier New" panose="02070309020205020404" pitchFamily="49" charset="0"/>
+            </a:endParaRPr>
+          </a:p>
+        </p:txBody>
+      </p:sp>
+    </p:spTree>
+    <p:extLst>
+      <p:ext uri="{BB962C8B-B14F-4D97-AF65-F5344CB8AC3E}">
+        <p14:creationId xmlns:p14="http://schemas.microsoft.com/office/powerpoint/2010/main" val="192711415"/>
+      </p:ext>
+    </p:extLst>
+  </p:cSld>
+  <p:clrMapOvr>
+    <a:masterClrMapping/>
+  </p:clrMapOvr>
+</p:sld>
+</file>
+
+<file path=ppt/slides/slide35.xml><?xml version="1.0" encoding="utf-8"?>
+<p:sld xmlns:a="http://schemas.openxmlformats.org/drawingml/2006/main" xmlns:r="http://schemas.openxmlformats.org/officeDocument/2006/relationships" xmlns:p="http://schemas.openxmlformats.org/presentationml/2006/main">
+  <p:cSld>
+    <p:spTree>
+      <p:nvGrpSpPr>
+        <p:cNvPr id="1" name=""/>
+        <p:cNvGrpSpPr/>
+        <p:nvPr/>
+      </p:nvGrpSpPr>
+      <p:grpSpPr>
+        <a:xfrm>
+          <a:off x="0" y="0"/>
+          <a:ext cx="0" cy="0"/>
+          <a:chOff x="0" y="0"/>
+          <a:chExt cx="0" cy="0"/>
+        </a:xfrm>
+      </p:grpSpPr>
+      <p:sp>
+        <p:nvSpPr>
+          <p:cNvPr id="2" name="Titel 1">
+            <a:extLst>
+              <a:ext uri="{FF2B5EF4-FFF2-40B4-BE49-F238E27FC236}">
+                <a16:creationId xmlns:a16="http://schemas.microsoft.com/office/drawing/2014/main" id="{0EC7A146-A8F2-A844-9033-A0ACC828AF47}"/>
+              </a:ext>
+            </a:extLst>
+          </p:cNvPr>
+          <p:cNvSpPr>
+            <a:spLocks noGrp="1"/>
+          </p:cNvSpPr>
+          <p:nvPr>
+            <p:ph type="title"/>
+          </p:nvPr>
+        </p:nvSpPr>
+        <p:spPr/>
+        <p:txBody>
+          <a:bodyPr/>
+          <a:lstStyle/>
+          <a:p>
+            <a:r>
+              <a:rPr lang="de-DE" dirty="0" err="1"/>
+              <a:t>Step</a:t>
+            </a:r>
+            <a:r>
+              <a:rPr lang="de-DE" dirty="0"/>
+              <a:t> 65</a:t>
+            </a:r>
+          </a:p>
+        </p:txBody>
+      </p:sp>
+      <p:sp>
+        <p:nvSpPr>
+          <p:cNvPr id="3" name="Inhaltsplatzhalter 2">
+            <a:extLst>
+              <a:ext uri="{FF2B5EF4-FFF2-40B4-BE49-F238E27FC236}">
+                <a16:creationId xmlns:a16="http://schemas.microsoft.com/office/drawing/2014/main" id="{2A5EBA90-6155-FD45-A74C-ECC42BCA72DF}"/>
+              </a:ext>
+            </a:extLst>
+          </p:cNvPr>
+          <p:cNvSpPr>
+            <a:spLocks noGrp="1"/>
+          </p:cNvSpPr>
+          <p:nvPr>
+            <p:ph idx="1"/>
+          </p:nvPr>
+        </p:nvSpPr>
+        <p:spPr/>
+        <p:txBody>
+          <a:bodyPr/>
+          <a:lstStyle/>
+          <a:p>
+            <a:r>
+              <a:rPr lang="de-DE" dirty="0"/>
+              <a:t>Thema: REST-Endpunkt mit Pfad-Variable</a:t>
+            </a:r>
+          </a:p>
+        </p:txBody>
+      </p:sp>
+    </p:spTree>
+    <p:extLst>
+      <p:ext uri="{BB962C8B-B14F-4D97-AF65-F5344CB8AC3E}">
+        <p14:creationId xmlns:p14="http://schemas.microsoft.com/office/powerpoint/2010/main" val="1108630757"/>
+      </p:ext>
+    </p:extLst>
+  </p:cSld>
+  <p:clrMapOvr>
+    <a:masterClrMapping/>
+  </p:clrMapOvr>
+</p:sld>
+</file>
+
+<file path=ppt/slides/slide36.xml><?xml version="1.0" encoding="utf-8"?>
+<p:sld xmlns:a="http://schemas.openxmlformats.org/drawingml/2006/main" xmlns:r="http://schemas.openxmlformats.org/officeDocument/2006/relationships" xmlns:p="http://schemas.openxmlformats.org/presentationml/2006/main">
+  <p:cSld>
+    <p:spTree>
+      <p:nvGrpSpPr>
+        <p:cNvPr id="1" name=""/>
+        <p:cNvGrpSpPr/>
+        <p:nvPr/>
+      </p:nvGrpSpPr>
+      <p:grpSpPr>
+        <a:xfrm>
+          <a:off x="0" y="0"/>
+          <a:ext cx="0" cy="0"/>
+          <a:chOff x="0" y="0"/>
+          <a:chExt cx="0" cy="0"/>
+        </a:xfrm>
+      </p:grpSpPr>
+      <p:sp>
+        <p:nvSpPr>
+          <p:cNvPr id="2" name="Titel 1">
+            <a:extLst>
+              <a:ext uri="{FF2B5EF4-FFF2-40B4-BE49-F238E27FC236}">
+                <a16:creationId xmlns:a16="http://schemas.microsoft.com/office/drawing/2014/main" id="{0EC7A146-A8F2-A844-9033-A0ACC828AF47}"/>
+              </a:ext>
+            </a:extLst>
+          </p:cNvPr>
+          <p:cNvSpPr>
+            <a:spLocks noGrp="1"/>
+          </p:cNvSpPr>
+          <p:nvPr>
+            <p:ph type="title"/>
+          </p:nvPr>
+        </p:nvSpPr>
+        <p:spPr/>
+        <p:txBody>
+          <a:bodyPr/>
+          <a:lstStyle/>
+          <a:p>
+            <a:r>
+              <a:rPr lang="de-DE" dirty="0" err="1"/>
+              <a:t>Step</a:t>
+            </a:r>
+            <a:r>
+              <a:rPr lang="de-DE" dirty="0"/>
+              <a:t> 65</a:t>
+            </a:r>
+          </a:p>
+        </p:txBody>
+      </p:sp>
+      <p:sp>
+        <p:nvSpPr>
+          <p:cNvPr id="3" name="Inhaltsplatzhalter 2">
+            <a:extLst>
+              <a:ext uri="{FF2B5EF4-FFF2-40B4-BE49-F238E27FC236}">
+                <a16:creationId xmlns:a16="http://schemas.microsoft.com/office/drawing/2014/main" id="{2A5EBA90-6155-FD45-A74C-ECC42BCA72DF}"/>
+              </a:ext>
+            </a:extLst>
+          </p:cNvPr>
+          <p:cNvSpPr>
+            <a:spLocks noGrp="1"/>
+          </p:cNvSpPr>
+          <p:nvPr>
+            <p:ph idx="1"/>
+          </p:nvPr>
+        </p:nvSpPr>
+        <p:spPr/>
+        <p:txBody>
+          <a:bodyPr/>
+          <a:lstStyle/>
+          <a:p>
+            <a:r>
+              <a:rPr lang="de-DE" dirty="0"/>
+              <a:t>Typische Methoden für REST-Endpunkt</a:t>
+            </a:r>
+          </a:p>
+          <a:p>
+            <a:pPr lvl="1"/>
+            <a:r>
+              <a:rPr lang="de-DE" dirty="0"/>
+              <a:t>DELETE /</a:t>
+            </a:r>
+            <a:r>
+              <a:rPr lang="de-DE" dirty="0" err="1"/>
+              <a:t>api</a:t>
+            </a:r>
+            <a:r>
+              <a:rPr lang="de-DE" dirty="0"/>
+              <a:t>/</a:t>
+            </a:r>
+            <a:r>
+              <a:rPr lang="de-DE" dirty="0" err="1"/>
+              <a:t>person</a:t>
+            </a:r>
+            <a:r>
+              <a:rPr lang="de-DE" dirty="0"/>
+              <a:t>/{ID}</a:t>
+            </a:r>
+          </a:p>
+          <a:p>
+            <a:pPr lvl="2"/>
+            <a:r>
+              <a:rPr lang="de-DE" dirty="0"/>
+              <a:t>Löscht Person</a:t>
+            </a:r>
+          </a:p>
+          <a:p>
+            <a:pPr lvl="1"/>
+            <a:r>
+              <a:rPr lang="de-DE" dirty="0"/>
+              <a:t>DELETE /</a:t>
+            </a:r>
+            <a:r>
+              <a:rPr lang="de-DE" dirty="0" err="1"/>
+              <a:t>api</a:t>
+            </a:r>
+            <a:r>
+              <a:rPr lang="de-DE" dirty="0"/>
+              <a:t>/</a:t>
+            </a:r>
+            <a:r>
+              <a:rPr lang="de-DE" dirty="0" err="1"/>
+              <a:t>person</a:t>
+            </a:r>
+            <a:endParaRPr lang="de-DE" dirty="0"/>
+          </a:p>
+          <a:p>
+            <a:pPr lvl="2"/>
+            <a:r>
+              <a:rPr lang="de-DE" dirty="0"/>
+              <a:t>Loscht </a:t>
+            </a:r>
+            <a:r>
+              <a:rPr lang="de-DE" b="1" dirty="0"/>
+              <a:t>alle</a:t>
+            </a:r>
+            <a:r>
+              <a:rPr lang="de-DE" dirty="0"/>
+              <a:t> Personen</a:t>
+            </a:r>
+          </a:p>
+          <a:p>
+            <a:pPr lvl="2"/>
+            <a:r>
+              <a:rPr lang="de-DE" dirty="0"/>
+              <a:t>Ist das gefährlich?</a:t>
+            </a:r>
+          </a:p>
+        </p:txBody>
+      </p:sp>
+    </p:spTree>
+    <p:extLst>
+      <p:ext uri="{BB962C8B-B14F-4D97-AF65-F5344CB8AC3E}">
+        <p14:creationId xmlns:p14="http://schemas.microsoft.com/office/powerpoint/2010/main" val="1274039183"/>
+      </p:ext>
+    </p:extLst>
+  </p:cSld>
+  <p:clrMapOvr>
+    <a:masterClrMapping/>
+  </p:clrMapOvr>
+</p:sld>
+</file>
+
+<file path=ppt/slides/slide37.xml><?xml version="1.0" encoding="utf-8"?>
+<p:sld xmlns:a="http://schemas.openxmlformats.org/drawingml/2006/main" xmlns:r="http://schemas.openxmlformats.org/officeDocument/2006/relationships" xmlns:p="http://schemas.openxmlformats.org/presentationml/2006/main">
+  <p:cSld>
+    <p:spTree>
+      <p:nvGrpSpPr>
+        <p:cNvPr id="1" name=""/>
+        <p:cNvGrpSpPr/>
+        <p:nvPr/>
+      </p:nvGrpSpPr>
+      <p:grpSpPr>
+        <a:xfrm>
+          <a:off x="0" y="0"/>
+          <a:ext cx="0" cy="0"/>
+          <a:chOff x="0" y="0"/>
+          <a:chExt cx="0" cy="0"/>
+        </a:xfrm>
+      </p:grpSpPr>
+      <p:sp>
+        <p:nvSpPr>
+          <p:cNvPr id="2" name="Titel 1">
+            <a:extLst>
+              <a:ext uri="{FF2B5EF4-FFF2-40B4-BE49-F238E27FC236}">
+                <a16:creationId xmlns:a16="http://schemas.microsoft.com/office/drawing/2014/main" id="{0EC7A146-A8F2-A844-9033-A0ACC828AF47}"/>
+              </a:ext>
+            </a:extLst>
+          </p:cNvPr>
+          <p:cNvSpPr>
+            <a:spLocks noGrp="1"/>
+          </p:cNvSpPr>
+          <p:nvPr>
+            <p:ph type="title"/>
+          </p:nvPr>
+        </p:nvSpPr>
+        <p:spPr/>
+        <p:txBody>
+          <a:bodyPr/>
+          <a:lstStyle/>
+          <a:p>
+            <a:r>
+              <a:rPr lang="de-DE" dirty="0" err="1"/>
+              <a:t>Step</a:t>
+            </a:r>
+            <a:r>
+              <a:rPr lang="de-DE" dirty="0"/>
+              <a:t> 70</a:t>
+            </a:r>
+          </a:p>
+        </p:txBody>
+      </p:sp>
+      <p:sp>
+        <p:nvSpPr>
+          <p:cNvPr id="3" name="Inhaltsplatzhalter 2">
+            <a:extLst>
+              <a:ext uri="{FF2B5EF4-FFF2-40B4-BE49-F238E27FC236}">
+                <a16:creationId xmlns:a16="http://schemas.microsoft.com/office/drawing/2014/main" id="{2A5EBA90-6155-FD45-A74C-ECC42BCA72DF}"/>
+              </a:ext>
+            </a:extLst>
+          </p:cNvPr>
+          <p:cNvSpPr>
+            <a:spLocks noGrp="1"/>
+          </p:cNvSpPr>
+          <p:nvPr>
+            <p:ph idx="1"/>
+          </p:nvPr>
+        </p:nvSpPr>
+        <p:spPr/>
+        <p:txBody>
+          <a:bodyPr/>
+          <a:lstStyle/>
+          <a:p>
+            <a:r>
+              <a:rPr lang="de-DE" dirty="0"/>
+              <a:t>Thema: </a:t>
+            </a:r>
+            <a:r>
+              <a:rPr lang="de-DE" dirty="0" err="1"/>
+              <a:t>Dependency</a:t>
+            </a:r>
+            <a:r>
+              <a:rPr lang="de-DE" dirty="0"/>
+              <a:t> </a:t>
+            </a:r>
+            <a:r>
+              <a:rPr lang="de-DE" dirty="0" err="1"/>
+              <a:t>Injection</a:t>
+            </a:r>
+            <a:r>
+              <a:rPr lang="de-DE" dirty="0"/>
+              <a:t> mit Spring</a:t>
+            </a:r>
+          </a:p>
+        </p:txBody>
+      </p:sp>
+    </p:spTree>
+    <p:extLst>
+      <p:ext uri="{BB962C8B-B14F-4D97-AF65-F5344CB8AC3E}">
+        <p14:creationId xmlns:p14="http://schemas.microsoft.com/office/powerpoint/2010/main" val="2804024451"/>
+      </p:ext>
+    </p:extLst>
+  </p:cSld>
+  <p:clrMapOvr>
+    <a:masterClrMapping/>
+  </p:clrMapOvr>
+</p:sld>
+</file>
+
+<file path=ppt/slides/slide38.xml><?xml version="1.0" encoding="utf-8"?>
+<p:sld xmlns:a="http://schemas.openxmlformats.org/drawingml/2006/main" xmlns:r="http://schemas.openxmlformats.org/officeDocument/2006/relationships" xmlns:p="http://schemas.openxmlformats.org/presentationml/2006/main">
+  <p:cSld>
+    <p:spTree>
+      <p:nvGrpSpPr>
+        <p:cNvPr id="1" name=""/>
+        <p:cNvGrpSpPr/>
+        <p:nvPr/>
+      </p:nvGrpSpPr>
+      <p:grpSpPr>
+        <a:xfrm>
+          <a:off x="0" y="0"/>
+          <a:ext cx="0" cy="0"/>
+          <a:chOff x="0" y="0"/>
+          <a:chExt cx="0" cy="0"/>
+        </a:xfrm>
+      </p:grpSpPr>
+      <p:sp>
+        <p:nvSpPr>
+          <p:cNvPr id="2" name="Titel 1">
+            <a:extLst>
+              <a:ext uri="{FF2B5EF4-FFF2-40B4-BE49-F238E27FC236}">
+                <a16:creationId xmlns:a16="http://schemas.microsoft.com/office/drawing/2014/main" id="{0EC7A146-A8F2-A844-9033-A0ACC828AF47}"/>
+              </a:ext>
+            </a:extLst>
+          </p:cNvPr>
+          <p:cNvSpPr>
+            <a:spLocks noGrp="1"/>
+          </p:cNvSpPr>
+          <p:nvPr>
+            <p:ph type="title"/>
+          </p:nvPr>
+        </p:nvSpPr>
+        <p:spPr/>
+        <p:txBody>
+          <a:bodyPr/>
+          <a:lstStyle/>
+          <a:p>
+            <a:r>
+              <a:rPr lang="de-DE" dirty="0" err="1"/>
+              <a:t>Step</a:t>
+            </a:r>
+            <a:r>
+              <a:rPr lang="de-DE" dirty="0"/>
+              <a:t> 80</a:t>
+            </a:r>
+          </a:p>
+        </p:txBody>
+      </p:sp>
+      <p:sp>
+        <p:nvSpPr>
+          <p:cNvPr id="3" name="Inhaltsplatzhalter 2">
+            <a:extLst>
+              <a:ext uri="{FF2B5EF4-FFF2-40B4-BE49-F238E27FC236}">
+                <a16:creationId xmlns:a16="http://schemas.microsoft.com/office/drawing/2014/main" id="{2A5EBA90-6155-FD45-A74C-ECC42BCA72DF}"/>
+              </a:ext>
+            </a:extLst>
+          </p:cNvPr>
+          <p:cNvSpPr>
+            <a:spLocks noGrp="1"/>
+          </p:cNvSpPr>
+          <p:nvPr>
+            <p:ph idx="1"/>
+          </p:nvPr>
+        </p:nvSpPr>
+        <p:spPr/>
+        <p:txBody>
+          <a:bodyPr/>
+          <a:lstStyle/>
+          <a:p>
+            <a:r>
+              <a:rPr lang="de-DE" dirty="0"/>
+              <a:t>Thema: Testen mit Mocks</a:t>
+            </a:r>
+          </a:p>
+          <a:p>
+            <a:pPr lvl="1"/>
+            <a:r>
+              <a:rPr lang="de-DE" dirty="0" err="1"/>
+              <a:t>Mockito</a:t>
+            </a:r>
+            <a:r>
+              <a:rPr lang="de-DE" dirty="0"/>
+              <a:t>: Bibliothek zum Erstellen von Mock-Objekten </a:t>
+            </a:r>
+            <a:r>
+              <a:rPr lang="de-DE"/>
+              <a:t>in Unit-Tests</a:t>
+            </a:r>
+            <a:endParaRPr lang="de-DE" dirty="0"/>
+          </a:p>
+        </p:txBody>
+      </p:sp>
+    </p:spTree>
+    <p:extLst>
+      <p:ext uri="{BB962C8B-B14F-4D97-AF65-F5344CB8AC3E}">
+        <p14:creationId xmlns:p14="http://schemas.microsoft.com/office/powerpoint/2010/main" val="1609070468"/>
+      </p:ext>
+    </p:extLst>
+  </p:cSld>
+  <p:clrMapOvr>
+    <a:masterClrMapping/>
+  </p:clrMapOvr>
+</p:sld>
+</file>
+
+<file path=ppt/slides/slide39.xml><?xml version="1.0" encoding="utf-8"?>
+<p:sld xmlns:a="http://schemas.openxmlformats.org/drawingml/2006/main" xmlns:r="http://schemas.openxmlformats.org/officeDocument/2006/relationships" xmlns:p="http://schemas.openxmlformats.org/presentationml/2006/main">
+  <p:cSld>
+    <p:spTree>
+      <p:nvGrpSpPr>
+        <p:cNvPr id="1" name=""/>
+        <p:cNvGrpSpPr/>
+        <p:nvPr/>
+      </p:nvGrpSpPr>
+      <p:grpSpPr>
+        <a:xfrm>
+          <a:off x="0" y="0"/>
+          <a:ext cx="0" cy="0"/>
+          <a:chOff x="0" y="0"/>
+          <a:chExt cx="0" cy="0"/>
+        </a:xfrm>
+      </p:grpSpPr>
+      <p:sp>
+        <p:nvSpPr>
+          <p:cNvPr id="2" name="Titel 1">
+            <a:extLst>
+              <a:ext uri="{FF2B5EF4-FFF2-40B4-BE49-F238E27FC236}">
+                <a16:creationId xmlns:a16="http://schemas.microsoft.com/office/drawing/2014/main" id="{0EC7A146-A8F2-A844-9033-A0ACC828AF47}"/>
+              </a:ext>
+            </a:extLst>
+          </p:cNvPr>
+          <p:cNvSpPr>
+            <a:spLocks noGrp="1"/>
+          </p:cNvSpPr>
+          <p:nvPr>
+            <p:ph type="title"/>
+          </p:nvPr>
+        </p:nvSpPr>
+        <p:spPr/>
+        <p:txBody>
+          <a:bodyPr/>
+          <a:lstStyle/>
+          <a:p>
+            <a:r>
+              <a:rPr lang="de-DE" dirty="0" err="1"/>
+              <a:t>Step</a:t>
+            </a:r>
+            <a:r>
+              <a:rPr lang="de-DE" dirty="0"/>
+              <a:t> 90</a:t>
+            </a:r>
+          </a:p>
+        </p:txBody>
+      </p:sp>
+      <p:sp>
+        <p:nvSpPr>
+          <p:cNvPr id="3" name="Inhaltsplatzhalter 2">
+            <a:extLst>
+              <a:ext uri="{FF2B5EF4-FFF2-40B4-BE49-F238E27FC236}">
+                <a16:creationId xmlns:a16="http://schemas.microsoft.com/office/drawing/2014/main" id="{2A5EBA90-6155-FD45-A74C-ECC42BCA72DF}"/>
+              </a:ext>
+            </a:extLst>
+          </p:cNvPr>
+          <p:cNvSpPr>
+            <a:spLocks noGrp="1"/>
+          </p:cNvSpPr>
+          <p:nvPr>
+            <p:ph idx="1"/>
+          </p:nvPr>
+        </p:nvSpPr>
+        <p:spPr/>
+        <p:txBody>
+          <a:bodyPr/>
+          <a:lstStyle/>
+          <a:p>
+            <a:r>
+              <a:rPr lang="de-DE" dirty="0"/>
+              <a:t>Thema: Persistenz mit Spring Data</a:t>
+            </a:r>
+          </a:p>
+        </p:txBody>
+      </p:sp>
+    </p:spTree>
+    <p:extLst>
+      <p:ext uri="{BB962C8B-B14F-4D97-AF65-F5344CB8AC3E}">
+        <p14:creationId xmlns:p14="http://schemas.microsoft.com/office/powerpoint/2010/main" val="3263348999"/>
       </p:ext>
     </p:extLst>
   </p:cSld>
@@ -9028,6 +10025,96 @@
     <p:extLst>
       <p:ext uri="{BB962C8B-B14F-4D97-AF65-F5344CB8AC3E}">
         <p14:creationId xmlns:p14="http://schemas.microsoft.com/office/powerpoint/2010/main" val="2378491230"/>
+      </p:ext>
+    </p:extLst>
+  </p:cSld>
+  <p:clrMapOvr>
+    <a:masterClrMapping/>
+  </p:clrMapOvr>
+</p:sld>
+</file>
+
+<file path=ppt/slides/slide40.xml><?xml version="1.0" encoding="utf-8"?>
+<p:sld xmlns:a="http://schemas.openxmlformats.org/drawingml/2006/main" xmlns:r="http://schemas.openxmlformats.org/officeDocument/2006/relationships" xmlns:p="http://schemas.openxmlformats.org/presentationml/2006/main">
+  <p:cSld>
+    <p:spTree>
+      <p:nvGrpSpPr>
+        <p:cNvPr id="1" name=""/>
+        <p:cNvGrpSpPr/>
+        <p:nvPr/>
+      </p:nvGrpSpPr>
+      <p:grpSpPr>
+        <a:xfrm>
+          <a:off x="0" y="0"/>
+          <a:ext cx="0" cy="0"/>
+          <a:chOff x="0" y="0"/>
+          <a:chExt cx="0" cy="0"/>
+        </a:xfrm>
+      </p:grpSpPr>
+      <p:sp>
+        <p:nvSpPr>
+          <p:cNvPr id="2" name="Titel 1">
+            <a:extLst>
+              <a:ext uri="{FF2B5EF4-FFF2-40B4-BE49-F238E27FC236}">
+                <a16:creationId xmlns:a16="http://schemas.microsoft.com/office/drawing/2014/main" id="{0EC7A146-A8F2-A844-9033-A0ACC828AF47}"/>
+              </a:ext>
+            </a:extLst>
+          </p:cNvPr>
+          <p:cNvSpPr>
+            <a:spLocks noGrp="1"/>
+          </p:cNvSpPr>
+          <p:nvPr>
+            <p:ph type="title"/>
+          </p:nvPr>
+        </p:nvSpPr>
+        <p:spPr/>
+        <p:txBody>
+          <a:bodyPr/>
+          <a:lstStyle/>
+          <a:p>
+            <a:r>
+              <a:rPr lang="de-DE" dirty="0" err="1"/>
+              <a:t>Step</a:t>
+            </a:r>
+            <a:r>
+              <a:rPr lang="de-DE" dirty="0"/>
+              <a:t> 100</a:t>
+            </a:r>
+          </a:p>
+        </p:txBody>
+      </p:sp>
+      <p:sp>
+        <p:nvSpPr>
+          <p:cNvPr id="3" name="Inhaltsplatzhalter 2">
+            <a:extLst>
+              <a:ext uri="{FF2B5EF4-FFF2-40B4-BE49-F238E27FC236}">
+                <a16:creationId xmlns:a16="http://schemas.microsoft.com/office/drawing/2014/main" id="{2A5EBA90-6155-FD45-A74C-ECC42BCA72DF}"/>
+              </a:ext>
+            </a:extLst>
+          </p:cNvPr>
+          <p:cNvSpPr>
+            <a:spLocks noGrp="1"/>
+          </p:cNvSpPr>
+          <p:nvPr>
+            <p:ph idx="1"/>
+          </p:nvPr>
+        </p:nvSpPr>
+        <p:spPr/>
+        <p:txBody>
+          <a:bodyPr/>
+          <a:lstStyle/>
+          <a:p>
+            <a:r>
+              <a:rPr lang="de-DE" dirty="0"/>
+              <a:t>Thema: Service als Docker-Container</a:t>
+            </a:r>
+          </a:p>
+        </p:txBody>
+      </p:sp>
+    </p:spTree>
+    <p:extLst>
+      <p:ext uri="{BB962C8B-B14F-4D97-AF65-F5344CB8AC3E}">
+        <p14:creationId xmlns:p14="http://schemas.microsoft.com/office/powerpoint/2010/main" val="1059597919"/>
       </p:ext>
     </p:extLst>
   </p:cSld>

</xml_diff>

<commit_message>
update Docker and Spring Data
</commit_message>
<xml_diff>
--- a/Java-Starter.pptx
+++ b/Java-Starter.pptx
@@ -64,8 +64,8 @@
     <p:sldId id="338" r:id="rId55"/>
     <p:sldId id="316" r:id="rId56"/>
     <p:sldId id="317" r:id="rId57"/>
-    <p:sldId id="318" r:id="rId58"/>
-    <p:sldId id="319" r:id="rId59"/>
+    <p:sldId id="319" r:id="rId58"/>
+    <p:sldId id="339" r:id="rId59"/>
     <p:sldId id="320" r:id="rId60"/>
     <p:sldId id="267" r:id="rId61"/>
     <p:sldId id="266" r:id="rId62"/>
@@ -270,7 +270,7 @@
           <a:p>
             <a:fld id="{64D387BD-2FDA-4640-824D-9ADFD7023C00}" type="datetimeFigureOut">
               <a:rPr lang="de-DE" smtClean="0"/>
-              <a:t>29.04.22</a:t>
+              <a:t>02.05.22</a:t>
             </a:fld>
             <a:endParaRPr lang="de-DE"/>
           </a:p>
@@ -768,7 +768,7 @@
           <a:p>
             <a:fld id="{D504FEAC-1E62-0E47-82AE-5BB4BD139FFA}" type="datetimeFigureOut">
               <a:rPr lang="de-DE" smtClean="0"/>
-              <a:t>29.04.22</a:t>
+              <a:t>02.05.22</a:t>
             </a:fld>
             <a:endParaRPr lang="de-DE"/>
           </a:p>
@@ -966,7 +966,7 @@
           <a:p>
             <a:fld id="{D504FEAC-1E62-0E47-82AE-5BB4BD139FFA}" type="datetimeFigureOut">
               <a:rPr lang="de-DE" smtClean="0"/>
-              <a:t>29.04.22</a:t>
+              <a:t>02.05.22</a:t>
             </a:fld>
             <a:endParaRPr lang="de-DE"/>
           </a:p>
@@ -1174,7 +1174,7 @@
           <a:p>
             <a:fld id="{D504FEAC-1E62-0E47-82AE-5BB4BD139FFA}" type="datetimeFigureOut">
               <a:rPr lang="de-DE" smtClean="0"/>
-              <a:t>29.04.22</a:t>
+              <a:t>02.05.22</a:t>
             </a:fld>
             <a:endParaRPr lang="de-DE"/>
           </a:p>
@@ -1372,7 +1372,7 @@
           <a:p>
             <a:fld id="{D504FEAC-1E62-0E47-82AE-5BB4BD139FFA}" type="datetimeFigureOut">
               <a:rPr lang="de-DE" smtClean="0"/>
-              <a:t>29.04.22</a:t>
+              <a:t>02.05.22</a:t>
             </a:fld>
             <a:endParaRPr lang="de-DE"/>
           </a:p>
@@ -1647,7 +1647,7 @@
           <a:p>
             <a:fld id="{D504FEAC-1E62-0E47-82AE-5BB4BD139FFA}" type="datetimeFigureOut">
               <a:rPr lang="de-DE" smtClean="0"/>
-              <a:t>29.04.22</a:t>
+              <a:t>02.05.22</a:t>
             </a:fld>
             <a:endParaRPr lang="de-DE"/>
           </a:p>
@@ -1912,7 +1912,7 @@
           <a:p>
             <a:fld id="{D504FEAC-1E62-0E47-82AE-5BB4BD139FFA}" type="datetimeFigureOut">
               <a:rPr lang="de-DE" smtClean="0"/>
-              <a:t>29.04.22</a:t>
+              <a:t>02.05.22</a:t>
             </a:fld>
             <a:endParaRPr lang="de-DE"/>
           </a:p>
@@ -2324,7 +2324,7 @@
           <a:p>
             <a:fld id="{D504FEAC-1E62-0E47-82AE-5BB4BD139FFA}" type="datetimeFigureOut">
               <a:rPr lang="de-DE" smtClean="0"/>
-              <a:t>29.04.22</a:t>
+              <a:t>02.05.22</a:t>
             </a:fld>
             <a:endParaRPr lang="de-DE"/>
           </a:p>
@@ -2465,7 +2465,7 @@
           <a:p>
             <a:fld id="{D504FEAC-1E62-0E47-82AE-5BB4BD139FFA}" type="datetimeFigureOut">
               <a:rPr lang="de-DE" smtClean="0"/>
-              <a:t>29.04.22</a:t>
+              <a:t>02.05.22</a:t>
             </a:fld>
             <a:endParaRPr lang="de-DE"/>
           </a:p>
@@ -2578,7 +2578,7 @@
           <a:p>
             <a:fld id="{D504FEAC-1E62-0E47-82AE-5BB4BD139FFA}" type="datetimeFigureOut">
               <a:rPr lang="de-DE" smtClean="0"/>
-              <a:t>29.04.22</a:t>
+              <a:t>02.05.22</a:t>
             </a:fld>
             <a:endParaRPr lang="de-DE"/>
           </a:p>
@@ -2889,7 +2889,7 @@
           <a:p>
             <a:fld id="{D504FEAC-1E62-0E47-82AE-5BB4BD139FFA}" type="datetimeFigureOut">
               <a:rPr lang="de-DE" smtClean="0"/>
-              <a:t>29.04.22</a:t>
+              <a:t>02.05.22</a:t>
             </a:fld>
             <a:endParaRPr lang="de-DE"/>
           </a:p>
@@ -3177,7 +3177,7 @@
           <a:p>
             <a:fld id="{D504FEAC-1E62-0E47-82AE-5BB4BD139FFA}" type="datetimeFigureOut">
               <a:rPr lang="de-DE" smtClean="0"/>
-              <a:t>29.04.22</a:t>
+              <a:t>02.05.22</a:t>
             </a:fld>
             <a:endParaRPr lang="de-DE"/>
           </a:p>
@@ -3418,7 +3418,7 @@
           <a:p>
             <a:fld id="{D504FEAC-1E62-0E47-82AE-5BB4BD139FFA}" type="datetimeFigureOut">
               <a:rPr lang="de-DE" smtClean="0"/>
-              <a:t>29.04.22</a:t>
+              <a:t>02.05.22</a:t>
             </a:fld>
             <a:endParaRPr lang="de-DE"/>
           </a:p>
@@ -17174,10 +17174,18 @@
           <a:lstStyle/>
           <a:p>
             <a:r>
-              <a:rPr lang="de-DE" dirty="0" err="1"/>
+              <a:rPr lang="de-DE" dirty="0" err="1">
+                <a:solidFill>
+                  <a:schemeClr val="bg1"/>
+                </a:solidFill>
+              </a:rPr>
               <a:t>MeinComputer</a:t>
             </a:r>
-            <a:endParaRPr lang="de-DE" dirty="0"/>
+            <a:endParaRPr lang="de-DE" dirty="0">
+              <a:solidFill>
+                <a:schemeClr val="bg1"/>
+              </a:solidFill>
+            </a:endParaRPr>
           </a:p>
         </p:txBody>
       </p:sp>
@@ -17440,10 +17448,18 @@
           <a:lstStyle/>
           <a:p>
             <a:r>
-              <a:rPr lang="de-DE" dirty="0" err="1"/>
+              <a:rPr lang="de-DE" dirty="0" err="1">
+                <a:solidFill>
+                  <a:schemeClr val="bg1"/>
+                </a:solidFill>
+              </a:rPr>
               <a:t>MeinComputer</a:t>
             </a:r>
-            <a:endParaRPr lang="de-DE" dirty="0"/>
+            <a:endParaRPr lang="de-DE" dirty="0">
+              <a:solidFill>
+                <a:schemeClr val="bg1"/>
+              </a:solidFill>
+            </a:endParaRPr>
           </a:p>
         </p:txBody>
       </p:sp>
@@ -17935,19 +17951,27 @@
           <a:lstStyle/>
           <a:p>
             <a:r>
-              <a:rPr lang="de-DE" dirty="0" err="1"/>
+              <a:rPr lang="de-DE" dirty="0" err="1">
+                <a:solidFill>
+                  <a:schemeClr val="bg1"/>
+                </a:solidFill>
+              </a:rPr>
               <a:t>MeinComputer</a:t>
             </a:r>
-            <a:endParaRPr lang="de-DE" dirty="0"/>
-          </a:p>
-        </p:txBody>
-      </p:sp>
-      <p:sp>
-        <p:nvSpPr>
-          <p:cNvPr id="10" name="Rechteck 9">
-            <a:extLst>
-              <a:ext uri="{FF2B5EF4-FFF2-40B4-BE49-F238E27FC236}">
-                <a16:creationId xmlns:a16="http://schemas.microsoft.com/office/drawing/2014/main" id="{F703253C-59DE-F7F3-A2A3-7F96B2641A70}"/>
+            <a:endParaRPr lang="de-DE" dirty="0">
+              <a:solidFill>
+                <a:schemeClr val="bg1"/>
+              </a:solidFill>
+            </a:endParaRPr>
+          </a:p>
+        </p:txBody>
+      </p:sp>
+      <p:sp>
+        <p:nvSpPr>
+          <p:cNvPr id="4" name="Rechteck 3">
+            <a:extLst>
+              <a:ext uri="{FF2B5EF4-FFF2-40B4-BE49-F238E27FC236}">
+                <a16:creationId xmlns:a16="http://schemas.microsoft.com/office/drawing/2014/main" id="{0976E51F-A6A9-C790-9430-3BC124426D1C}"/>
               </a:ext>
             </a:extLst>
           </p:cNvPr>
@@ -17956,65 +17980,8 @@
         </p:nvSpPr>
         <p:spPr>
           <a:xfrm>
-            <a:off x="3102429" y="3429000"/>
-            <a:ext cx="2373085" cy="1404257"/>
-          </a:xfrm>
-          <a:prstGeom prst="rect">
-            <a:avLst/>
-          </a:prstGeom>
-          <a:solidFill>
-            <a:schemeClr val="accent6"/>
-          </a:solidFill>
-        </p:spPr>
-        <p:style>
-          <a:lnRef idx="2">
-            <a:schemeClr val="accent1">
-              <a:shade val="50000"/>
-            </a:schemeClr>
-          </a:lnRef>
-          <a:fillRef idx="1">
-            <a:schemeClr val="accent1"/>
-          </a:fillRef>
-          <a:effectRef idx="0">
-            <a:schemeClr val="accent1"/>
-          </a:effectRef>
-          <a:fontRef idx="minor">
-            <a:schemeClr val="lt1"/>
-          </a:fontRef>
-        </p:style>
-        <p:txBody>
-          <a:bodyPr rtlCol="0" anchor="ctr"/>
-          <a:lstStyle/>
-          <a:p>
-            <a:pPr algn="ctr"/>
-            <a:r>
-              <a:rPr lang="de-DE" dirty="0"/>
-              <a:t>Person </a:t>
-            </a:r>
-            <a:r>
-              <a:rPr lang="de-DE" dirty="0" err="1"/>
-              <a:t>microservice</a:t>
-            </a:r>
-            <a:endParaRPr lang="de-DE" dirty="0"/>
-          </a:p>
-        </p:txBody>
-      </p:sp>
-      <p:sp>
-        <p:nvSpPr>
-          <p:cNvPr id="4" name="Rechteck 3">
-            <a:extLst>
-              <a:ext uri="{FF2B5EF4-FFF2-40B4-BE49-F238E27FC236}">
-                <a16:creationId xmlns:a16="http://schemas.microsoft.com/office/drawing/2014/main" id="{0976E51F-A6A9-C790-9430-3BC124426D1C}"/>
-              </a:ext>
-            </a:extLst>
-          </p:cNvPr>
-          <p:cNvSpPr/>
-          <p:nvPr/>
-        </p:nvSpPr>
-        <p:spPr>
-          <a:xfrm>
-            <a:off x="6096000" y="2593075"/>
-            <a:ext cx="5504597" cy="3398292"/>
+            <a:off x="5556738" y="3046696"/>
+            <a:ext cx="5715565" cy="3398292"/>
           </a:xfrm>
           <a:prstGeom prst="rect">
             <a:avLst/>
@@ -18065,7 +18032,7 @@
         </p:nvSpPr>
         <p:spPr>
           <a:xfrm>
-            <a:off x="7349937" y="3114791"/>
+            <a:off x="7021643" y="3568412"/>
             <a:ext cx="3029803" cy="2032673"/>
           </a:xfrm>
           <a:prstGeom prst="rect">
@@ -18117,8 +18084,8 @@
         </p:nvSpPr>
         <p:spPr>
           <a:xfrm>
-            <a:off x="7903194" y="3244334"/>
-            <a:ext cx="1274580" cy="369332"/>
+            <a:off x="7574900" y="3697955"/>
+            <a:ext cx="428322" cy="369332"/>
           </a:xfrm>
           <a:prstGeom prst="rect">
             <a:avLst/>
@@ -18132,9 +18099,10 @@
           <a:lstStyle/>
           <a:p>
             <a:r>
-              <a:rPr lang="de-DE" dirty="0"/>
-              <a:t>Container 1</a:t>
-            </a:r>
+              <a:rPr lang="de-DE" dirty="0" err="1"/>
+              <a:t>db</a:t>
+            </a:r>
+            <a:endParaRPr lang="de-DE" dirty="0"/>
           </a:p>
         </p:txBody>
       </p:sp>
@@ -18152,7 +18120,7 @@
         </p:nvSpPr>
         <p:spPr>
           <a:xfrm>
-            <a:off x="7678297" y="3647794"/>
+            <a:off x="7350003" y="4101415"/>
             <a:ext cx="2373085" cy="1404257"/>
           </a:xfrm>
           <a:prstGeom prst="rect">
@@ -18190,66 +18158,21 @@
           </a:p>
         </p:txBody>
       </p:sp>
-      <p:cxnSp>
-        <p:nvCxnSpPr>
-          <p:cNvPr id="13" name="Gerade Verbindung mit Pfeil 12">
-            <a:extLst>
-              <a:ext uri="{FF2B5EF4-FFF2-40B4-BE49-F238E27FC236}">
-                <a16:creationId xmlns:a16="http://schemas.microsoft.com/office/drawing/2014/main" id="{96B270E3-22BA-C088-1968-C4CEDE244AD3}"/>
-              </a:ext>
-            </a:extLst>
-          </p:cNvPr>
-          <p:cNvCxnSpPr>
-            <a:stCxn id="10" idx="3"/>
-            <a:endCxn id="11" idx="1"/>
-          </p:cNvCxnSpPr>
+      <p:sp>
+        <p:nvSpPr>
+          <p:cNvPr id="5" name="Textfeld 4">
+            <a:extLst>
+              <a:ext uri="{FF2B5EF4-FFF2-40B4-BE49-F238E27FC236}">
+                <a16:creationId xmlns:a16="http://schemas.microsoft.com/office/drawing/2014/main" id="{8C61BD20-7A5C-E96C-4542-AC868DA6C617}"/>
+              </a:ext>
+            </a:extLst>
+          </p:cNvPr>
+          <p:cNvSpPr txBox="1"/>
           <p:nvPr/>
-        </p:nvCxnSpPr>
+        </p:nvSpPr>
         <p:spPr>
           <a:xfrm>
-            <a:off x="5475514" y="4131129"/>
-            <a:ext cx="2202783" cy="218794"/>
-          </a:xfrm>
-          <a:prstGeom prst="straightConnector1">
-            <a:avLst/>
-          </a:prstGeom>
-          <a:ln w="38100">
-            <a:solidFill>
-              <a:srgbClr val="FF0000"/>
-            </a:solidFill>
-            <a:tailEnd type="triangle"/>
-          </a:ln>
-        </p:spPr>
-        <p:style>
-          <a:lnRef idx="1">
-            <a:schemeClr val="accent1"/>
-          </a:lnRef>
-          <a:fillRef idx="0">
-            <a:schemeClr val="accent1"/>
-          </a:fillRef>
-          <a:effectRef idx="0">
-            <a:schemeClr val="accent1"/>
-          </a:effectRef>
-          <a:fontRef idx="minor">
-            <a:schemeClr val="tx1"/>
-          </a:fontRef>
-        </p:style>
-      </p:cxnSp>
-      <p:sp>
-        <p:nvSpPr>
-          <p:cNvPr id="5" name="Textfeld 4">
-            <a:extLst>
-              <a:ext uri="{FF2B5EF4-FFF2-40B4-BE49-F238E27FC236}">
-                <a16:creationId xmlns:a16="http://schemas.microsoft.com/office/drawing/2014/main" id="{8C61BD20-7A5C-E96C-4542-AC868DA6C617}"/>
-              </a:ext>
-            </a:extLst>
-          </p:cNvPr>
-          <p:cNvSpPr txBox="1"/>
-          <p:nvPr/>
-        </p:nvSpPr>
-        <p:spPr>
-          <a:xfrm>
-            <a:off x="8338505" y="2758295"/>
+            <a:off x="5703044" y="3103144"/>
             <a:ext cx="839269" cy="369332"/>
           </a:xfrm>
           <a:prstGeom prst="rect">
@@ -18272,132 +18195,20 @@
       </p:sp>
       <p:sp>
         <p:nvSpPr>
-          <p:cNvPr id="6" name="Textfeld 5">
-            <a:extLst>
-              <a:ext uri="{FF2B5EF4-FFF2-40B4-BE49-F238E27FC236}">
-                <a16:creationId xmlns:a16="http://schemas.microsoft.com/office/drawing/2014/main" id="{62ECC9DC-FAA1-9470-E01E-AD3E4ADE45AC}"/>
-              </a:ext>
-            </a:extLst>
-          </p:cNvPr>
-          <p:cNvSpPr txBox="1"/>
+          <p:cNvPr id="10" name="Rechteck 9">
+            <a:extLst>
+              <a:ext uri="{FF2B5EF4-FFF2-40B4-BE49-F238E27FC236}">
+                <a16:creationId xmlns:a16="http://schemas.microsoft.com/office/drawing/2014/main" id="{F703253C-59DE-F7F3-A2A3-7F96B2641A70}"/>
+              </a:ext>
+            </a:extLst>
+          </p:cNvPr>
+          <p:cNvSpPr/>
           <p:nvPr/>
         </p:nvSpPr>
         <p:spPr>
           <a:xfrm>
-            <a:off x="6884451" y="4331655"/>
-            <a:ext cx="652743" cy="369332"/>
-          </a:xfrm>
-          <a:prstGeom prst="rect">
-            <a:avLst/>
-          </a:prstGeom>
-          <a:noFill/>
-        </p:spPr>
-        <p:txBody>
-          <a:bodyPr wrap="none" rtlCol="0">
-            <a:spAutoFit/>
-          </a:bodyPr>
-          <a:lstStyle/>
-          <a:p>
-            <a:r>
-              <a:rPr lang="de-DE" dirty="0"/>
-              <a:t>5432</a:t>
-            </a:r>
-          </a:p>
-        </p:txBody>
-      </p:sp>
-      <p:sp>
-        <p:nvSpPr>
-          <p:cNvPr id="7" name="Textfeld 6">
-            <a:extLst>
-              <a:ext uri="{FF2B5EF4-FFF2-40B4-BE49-F238E27FC236}">
-                <a16:creationId xmlns:a16="http://schemas.microsoft.com/office/drawing/2014/main" id="{BB698380-BB82-054A-3110-1DD2609B9D43}"/>
-              </a:ext>
-            </a:extLst>
-          </p:cNvPr>
-          <p:cNvSpPr txBox="1"/>
-          <p:nvPr/>
-        </p:nvSpPr>
-        <p:spPr>
-          <a:xfrm>
-            <a:off x="5759571" y="3761795"/>
-            <a:ext cx="652743" cy="369332"/>
-          </a:xfrm>
-          <a:prstGeom prst="rect">
-            <a:avLst/>
-          </a:prstGeom>
-          <a:noFill/>
-        </p:spPr>
-        <p:txBody>
-          <a:bodyPr wrap="none" rtlCol="0">
-            <a:spAutoFit/>
-          </a:bodyPr>
-          <a:lstStyle/>
-          <a:p>
-            <a:r>
-              <a:rPr lang="de-DE" dirty="0"/>
-              <a:t>5432</a:t>
-            </a:r>
-          </a:p>
-        </p:txBody>
-      </p:sp>
-      <p:sp>
-        <p:nvSpPr>
-          <p:cNvPr id="16" name="Textfeld 15">
-            <a:extLst>
-              <a:ext uri="{FF2B5EF4-FFF2-40B4-BE49-F238E27FC236}">
-                <a16:creationId xmlns:a16="http://schemas.microsoft.com/office/drawing/2014/main" id="{80057846-A6B7-E451-FB47-CFCC3D61FE18}"/>
-              </a:ext>
-            </a:extLst>
-          </p:cNvPr>
-          <p:cNvSpPr txBox="1"/>
-          <p:nvPr/>
-        </p:nvSpPr>
-        <p:spPr>
-          <a:xfrm>
-            <a:off x="1812260" y="436728"/>
-            <a:ext cx="7229158" cy="646331"/>
-          </a:xfrm>
-          <a:prstGeom prst="rect">
-            <a:avLst/>
-          </a:prstGeom>
-          <a:noFill/>
-        </p:spPr>
-        <p:txBody>
-          <a:bodyPr wrap="none" rtlCol="0">
-            <a:spAutoFit/>
-          </a:bodyPr>
-          <a:lstStyle/>
-          <a:p>
-            <a:r>
-              <a:rPr lang="de-DE" dirty="0"/>
-              <a:t>Jeder Docker-Container verhält sich wie eine eigenständige Linux-Maschine</a:t>
-            </a:r>
-            <a:br>
-              <a:rPr lang="de-DE" dirty="0"/>
-            </a:br>
-            <a:r>
-              <a:rPr lang="de-DE" dirty="0"/>
-              <a:t>(nutzt Linux-Kernel-Virtualisierung)</a:t>
-            </a:r>
-          </a:p>
-        </p:txBody>
-      </p:sp>
-      <p:sp>
-        <p:nvSpPr>
-          <p:cNvPr id="17" name="Rechteck 16">
-            <a:extLst>
-              <a:ext uri="{FF2B5EF4-FFF2-40B4-BE49-F238E27FC236}">
-                <a16:creationId xmlns:a16="http://schemas.microsoft.com/office/drawing/2014/main" id="{68E783D0-D70F-3293-8013-1FC1A2F55871}"/>
-              </a:ext>
-            </a:extLst>
-          </p:cNvPr>
-          <p:cNvSpPr/>
-          <p:nvPr/>
-        </p:nvSpPr>
-        <p:spPr>
-          <a:xfrm>
-            <a:off x="3051361" y="1875518"/>
-            <a:ext cx="2373085" cy="751514"/>
+            <a:off x="2774135" y="3882621"/>
+            <a:ext cx="2373085" cy="1404257"/>
           </a:xfrm>
           <a:prstGeom prst="rect">
             <a:avLst/>
@@ -18429,31 +18240,136 @@
             <a:pPr algn="ctr"/>
             <a:r>
               <a:rPr lang="de-DE" dirty="0"/>
+              <a:t>Person </a:t>
+            </a:r>
+            <a:r>
+              <a:rPr lang="de-DE" dirty="0" err="1"/>
+              <a:t>microservice</a:t>
+            </a:r>
+            <a:endParaRPr lang="de-DE" dirty="0"/>
+          </a:p>
+        </p:txBody>
+      </p:sp>
+      <p:sp>
+        <p:nvSpPr>
+          <p:cNvPr id="17" name="Rechteck 16">
+            <a:extLst>
+              <a:ext uri="{FF2B5EF4-FFF2-40B4-BE49-F238E27FC236}">
+                <a16:creationId xmlns:a16="http://schemas.microsoft.com/office/drawing/2014/main" id="{FAC8843C-E156-2013-39F6-279162EC4858}"/>
+              </a:ext>
+            </a:extLst>
+          </p:cNvPr>
+          <p:cNvSpPr/>
+          <p:nvPr/>
+        </p:nvSpPr>
+        <p:spPr>
+          <a:xfrm>
+            <a:off x="2953073" y="1684361"/>
+            <a:ext cx="2169617" cy="628447"/>
+          </a:xfrm>
+          <a:prstGeom prst="rect">
+            <a:avLst/>
+          </a:prstGeom>
+          <a:solidFill>
+            <a:schemeClr val="accent6"/>
+          </a:solidFill>
+        </p:spPr>
+        <p:style>
+          <a:lnRef idx="2">
+            <a:schemeClr val="accent1">
+              <a:shade val="50000"/>
+            </a:schemeClr>
+          </a:lnRef>
+          <a:fillRef idx="1">
+            <a:schemeClr val="accent1"/>
+          </a:fillRef>
+          <a:effectRef idx="0">
+            <a:schemeClr val="accent1"/>
+          </a:effectRef>
+          <a:fontRef idx="minor">
+            <a:schemeClr val="lt1"/>
+          </a:fontRef>
+        </p:style>
+        <p:txBody>
+          <a:bodyPr rtlCol="0" anchor="ctr"/>
+          <a:lstStyle/>
+          <a:p>
+            <a:pPr algn="ctr"/>
+            <a:r>
+              <a:rPr lang="de-DE" dirty="0"/>
               <a:t>Browser</a:t>
             </a:r>
+          </a:p>
+        </p:txBody>
+      </p:sp>
+      <p:sp>
+        <p:nvSpPr>
+          <p:cNvPr id="6" name="Rechteck 5">
+            <a:extLst>
+              <a:ext uri="{FF2B5EF4-FFF2-40B4-BE49-F238E27FC236}">
+                <a16:creationId xmlns:a16="http://schemas.microsoft.com/office/drawing/2014/main" id="{4C21BB95-9C8E-396A-BA72-0C7DD10E28BD}"/>
+              </a:ext>
+            </a:extLst>
+          </p:cNvPr>
+          <p:cNvSpPr/>
+          <p:nvPr/>
+        </p:nvSpPr>
+        <p:spPr>
+          <a:xfrm>
+            <a:off x="2791390" y="2627635"/>
+            <a:ext cx="4758844" cy="45719"/>
+          </a:xfrm>
+          <a:prstGeom prst="rect">
+            <a:avLst/>
+          </a:prstGeom>
+          <a:solidFill>
+            <a:schemeClr val="tx1"/>
+          </a:solidFill>
+        </p:spPr>
+        <p:style>
+          <a:lnRef idx="2">
+            <a:schemeClr val="accent1">
+              <a:shade val="50000"/>
+            </a:schemeClr>
+          </a:lnRef>
+          <a:fillRef idx="1">
+            <a:schemeClr val="accent1"/>
+          </a:fillRef>
+          <a:effectRef idx="0">
+            <a:schemeClr val="accent1"/>
+          </a:effectRef>
+          <a:fontRef idx="minor">
+            <a:schemeClr val="lt1"/>
+          </a:fontRef>
+        </p:style>
+        <p:txBody>
+          <a:bodyPr rtlCol="0" anchor="ctr"/>
+          <a:lstStyle/>
+          <a:p>
+            <a:pPr algn="ctr"/>
+            <a:endParaRPr lang="de-DE"/>
           </a:p>
         </p:txBody>
       </p:sp>
       <p:cxnSp>
         <p:nvCxnSpPr>
-          <p:cNvPr id="18" name="Gerade Verbindung mit Pfeil 17">
-            <a:extLst>
-              <a:ext uri="{FF2B5EF4-FFF2-40B4-BE49-F238E27FC236}">
-                <a16:creationId xmlns:a16="http://schemas.microsoft.com/office/drawing/2014/main" id="{9A1A92FD-F215-DABE-0B7D-934A72A16C55}"/>
+          <p:cNvPr id="19" name="Gerade Verbindung mit Pfeil 18">
+            <a:extLst>
+              <a:ext uri="{FF2B5EF4-FFF2-40B4-BE49-F238E27FC236}">
+                <a16:creationId xmlns:a16="http://schemas.microsoft.com/office/drawing/2014/main" id="{530BFEF6-AB67-1116-F56A-EE5D0894EA83}"/>
               </a:ext>
             </a:extLst>
           </p:cNvPr>
           <p:cNvCxnSpPr>
             <a:cxnSpLocks/>
-            <a:stCxn id="17" idx="2"/>
             <a:endCxn id="10" idx="0"/>
           </p:cNvCxnSpPr>
           <p:nvPr/>
         </p:nvCxnSpPr>
         <p:spPr>
           <a:xfrm>
-            <a:off x="4237904" y="2627032"/>
-            <a:ext cx="51068" cy="801968"/>
+            <a:off x="3960678" y="2673354"/>
+            <a:ext cx="0" cy="1209267"/>
           </a:xfrm>
           <a:prstGeom prst="straightConnector1">
             <a:avLst/>
@@ -18482,10 +18398,10 @@
       </p:cxnSp>
       <p:sp>
         <p:nvSpPr>
-          <p:cNvPr id="23" name="Textfeld 22">
-            <a:extLst>
-              <a:ext uri="{FF2B5EF4-FFF2-40B4-BE49-F238E27FC236}">
-                <a16:creationId xmlns:a16="http://schemas.microsoft.com/office/drawing/2014/main" id="{75BC5FA8-EC54-8AEF-5341-8C398DDC8215}"/>
+          <p:cNvPr id="24" name="Textfeld 23">
+            <a:extLst>
+              <a:ext uri="{FF2B5EF4-FFF2-40B4-BE49-F238E27FC236}">
+                <a16:creationId xmlns:a16="http://schemas.microsoft.com/office/drawing/2014/main" id="{0D1075ED-7B9F-3155-EC11-6BC68FA80A84}"/>
               </a:ext>
             </a:extLst>
           </p:cNvPr>
@@ -18494,8 +18410,8 @@
         </p:nvSpPr>
         <p:spPr>
           <a:xfrm>
-            <a:off x="4282766" y="3086030"/>
-            <a:ext cx="652743" cy="369332"/>
+            <a:off x="3980402" y="2645055"/>
+            <a:ext cx="1026563" cy="646331"/>
           </a:xfrm>
           <a:prstGeom prst="rect">
             <a:avLst/>
@@ -18509,8 +18425,505 @@
           <a:lstStyle/>
           <a:p>
             <a:r>
-              <a:rPr lang="de-DE" dirty="0"/>
+              <a:rPr lang="de-DE" dirty="0" err="1">
+                <a:solidFill>
+                  <a:srgbClr val="FF0000"/>
+                </a:solidFill>
+              </a:rPr>
+              <a:t>localhost</a:t>
+            </a:r>
+            <a:br>
+              <a:rPr lang="de-DE" dirty="0">
+                <a:solidFill>
+                  <a:srgbClr val="FF0000"/>
+                </a:solidFill>
+              </a:rPr>
+            </a:br>
+            <a:r>
+              <a:rPr lang="de-DE" dirty="0">
+                <a:solidFill>
+                  <a:srgbClr val="FF0000"/>
+                </a:solidFill>
+              </a:rPr>
               <a:t>8080</a:t>
+            </a:r>
+          </a:p>
+        </p:txBody>
+      </p:sp>
+      <p:sp>
+        <p:nvSpPr>
+          <p:cNvPr id="27" name="Rechteck 26">
+            <a:extLst>
+              <a:ext uri="{FF2B5EF4-FFF2-40B4-BE49-F238E27FC236}">
+                <a16:creationId xmlns:a16="http://schemas.microsoft.com/office/drawing/2014/main" id="{40C40330-E8ED-473F-BB53-1716E8E3BADB}"/>
+              </a:ext>
+            </a:extLst>
+          </p:cNvPr>
+          <p:cNvSpPr/>
+          <p:nvPr/>
+        </p:nvSpPr>
+        <p:spPr>
+          <a:xfrm rot="5400000" flipV="1">
+            <a:off x="5218382" y="4576510"/>
+            <a:ext cx="2032673" cy="45719"/>
+          </a:xfrm>
+          <a:prstGeom prst="rect">
+            <a:avLst/>
+          </a:prstGeom>
+          <a:solidFill>
+            <a:schemeClr val="tx1"/>
+          </a:solidFill>
+        </p:spPr>
+        <p:style>
+          <a:lnRef idx="2">
+            <a:schemeClr val="accent1">
+              <a:shade val="50000"/>
+            </a:schemeClr>
+          </a:lnRef>
+          <a:fillRef idx="1">
+            <a:schemeClr val="accent1"/>
+          </a:fillRef>
+          <a:effectRef idx="0">
+            <a:schemeClr val="accent1"/>
+          </a:effectRef>
+          <a:fontRef idx="minor">
+            <a:schemeClr val="lt1"/>
+          </a:fontRef>
+        </p:style>
+        <p:txBody>
+          <a:bodyPr rtlCol="0" anchor="ctr"/>
+          <a:lstStyle/>
+          <a:p>
+            <a:pPr algn="ctr"/>
+            <a:endParaRPr lang="de-DE"/>
+          </a:p>
+        </p:txBody>
+      </p:sp>
+      <p:cxnSp>
+        <p:nvCxnSpPr>
+          <p:cNvPr id="31" name="Gerade Verbindung mit Pfeil 30">
+            <a:extLst>
+              <a:ext uri="{FF2B5EF4-FFF2-40B4-BE49-F238E27FC236}">
+                <a16:creationId xmlns:a16="http://schemas.microsoft.com/office/drawing/2014/main" id="{51B06C8F-3089-1DE1-C93C-41B52F78B834}"/>
+              </a:ext>
+            </a:extLst>
+          </p:cNvPr>
+          <p:cNvCxnSpPr>
+            <a:cxnSpLocks/>
+            <a:endCxn id="2" idx="1"/>
+          </p:cNvCxnSpPr>
+          <p:nvPr/>
+        </p:nvCxnSpPr>
+        <p:spPr>
+          <a:xfrm>
+            <a:off x="6257578" y="4584747"/>
+            <a:ext cx="764065" cy="2"/>
+          </a:xfrm>
+          <a:prstGeom prst="straightConnector1">
+            <a:avLst/>
+          </a:prstGeom>
+          <a:ln w="38100">
+            <a:solidFill>
+              <a:srgbClr val="FF0000"/>
+            </a:solidFill>
+            <a:tailEnd type="triangle"/>
+          </a:ln>
+        </p:spPr>
+        <p:style>
+          <a:lnRef idx="1">
+            <a:schemeClr val="accent1"/>
+          </a:lnRef>
+          <a:fillRef idx="0">
+            <a:schemeClr val="accent1"/>
+          </a:fillRef>
+          <a:effectRef idx="0">
+            <a:schemeClr val="accent1"/>
+          </a:effectRef>
+          <a:fontRef idx="minor">
+            <a:schemeClr val="tx1"/>
+          </a:fontRef>
+        </p:style>
+      </p:cxnSp>
+      <p:sp>
+        <p:nvSpPr>
+          <p:cNvPr id="35" name="Textfeld 34">
+            <a:extLst>
+              <a:ext uri="{FF2B5EF4-FFF2-40B4-BE49-F238E27FC236}">
+                <a16:creationId xmlns:a16="http://schemas.microsoft.com/office/drawing/2014/main" id="{76E6BBFC-1B5D-1DC1-93FA-50F8434F62D9}"/>
+              </a:ext>
+            </a:extLst>
+          </p:cNvPr>
+          <p:cNvSpPr txBox="1"/>
+          <p:nvPr/>
+        </p:nvSpPr>
+        <p:spPr>
+          <a:xfrm>
+            <a:off x="6419284" y="4207194"/>
+            <a:ext cx="652743" cy="646331"/>
+          </a:xfrm>
+          <a:prstGeom prst="rect">
+            <a:avLst/>
+          </a:prstGeom>
+          <a:noFill/>
+        </p:spPr>
+        <p:txBody>
+          <a:bodyPr wrap="none" rtlCol="0">
+            <a:spAutoFit/>
+          </a:bodyPr>
+          <a:lstStyle/>
+          <a:p>
+            <a:r>
+              <a:rPr lang="de-DE" dirty="0" err="1">
+                <a:solidFill>
+                  <a:srgbClr val="FF0000"/>
+                </a:solidFill>
+              </a:rPr>
+              <a:t>db</a:t>
+            </a:r>
+            <a:br>
+              <a:rPr lang="de-DE" dirty="0">
+                <a:solidFill>
+                  <a:srgbClr val="FF0000"/>
+                </a:solidFill>
+              </a:rPr>
+            </a:br>
+            <a:r>
+              <a:rPr lang="de-DE" dirty="0">
+                <a:solidFill>
+                  <a:srgbClr val="FF0000"/>
+                </a:solidFill>
+              </a:rPr>
+              <a:t>5432</a:t>
+            </a:r>
+          </a:p>
+        </p:txBody>
+      </p:sp>
+      <p:sp>
+        <p:nvSpPr>
+          <p:cNvPr id="39" name="Bogen 38">
+            <a:extLst>
+              <a:ext uri="{FF2B5EF4-FFF2-40B4-BE49-F238E27FC236}">
+                <a16:creationId xmlns:a16="http://schemas.microsoft.com/office/drawing/2014/main" id="{96A7824F-1777-AF0C-4A16-75F527AD380E}"/>
+              </a:ext>
+            </a:extLst>
+          </p:cNvPr>
+          <p:cNvSpPr/>
+          <p:nvPr/>
+        </p:nvSpPr>
+        <p:spPr>
+          <a:xfrm>
+            <a:off x="4037881" y="2673354"/>
+            <a:ext cx="914400" cy="914400"/>
+          </a:xfrm>
+          <a:prstGeom prst="arc">
+            <a:avLst/>
+          </a:prstGeom>
+        </p:spPr>
+        <p:style>
+          <a:lnRef idx="1">
+            <a:schemeClr val="accent1"/>
+          </a:lnRef>
+          <a:fillRef idx="0">
+            <a:schemeClr val="accent1"/>
+          </a:fillRef>
+          <a:effectRef idx="0">
+            <a:schemeClr val="accent1"/>
+          </a:effectRef>
+          <a:fontRef idx="minor">
+            <a:schemeClr val="tx1"/>
+          </a:fontRef>
+        </p:style>
+        <p:txBody>
+          <a:bodyPr rtlCol="0" anchor="ctr"/>
+          <a:lstStyle/>
+          <a:p>
+            <a:pPr algn="ctr"/>
+            <a:endParaRPr lang="de-DE"/>
+          </a:p>
+        </p:txBody>
+      </p:sp>
+      <p:sp>
+        <p:nvSpPr>
+          <p:cNvPr id="45" name="Oval 44">
+            <a:extLst>
+              <a:ext uri="{FF2B5EF4-FFF2-40B4-BE49-F238E27FC236}">
+                <a16:creationId xmlns:a16="http://schemas.microsoft.com/office/drawing/2014/main" id="{FC2564D9-56F3-21C8-BBFA-F1D6D365C1FA}"/>
+              </a:ext>
+            </a:extLst>
+          </p:cNvPr>
+          <p:cNvSpPr/>
+          <p:nvPr/>
+        </p:nvSpPr>
+        <p:spPr>
+          <a:xfrm>
+            <a:off x="3033360" y="407222"/>
+            <a:ext cx="2642927" cy="593094"/>
+          </a:xfrm>
+          <a:prstGeom prst="ellipse">
+            <a:avLst/>
+          </a:prstGeom>
+          <a:solidFill>
+            <a:srgbClr val="FF0000">
+              <a:alpha val="23000"/>
+            </a:srgbClr>
+          </a:solidFill>
+        </p:spPr>
+        <p:style>
+          <a:lnRef idx="2">
+            <a:schemeClr val="accent1">
+              <a:shade val="50000"/>
+            </a:schemeClr>
+          </a:lnRef>
+          <a:fillRef idx="1">
+            <a:schemeClr val="accent1"/>
+          </a:fillRef>
+          <a:effectRef idx="0">
+            <a:schemeClr val="accent1"/>
+          </a:effectRef>
+          <a:fontRef idx="minor">
+            <a:schemeClr val="lt1"/>
+          </a:fontRef>
+        </p:style>
+        <p:txBody>
+          <a:bodyPr rtlCol="0" anchor="ctr"/>
+          <a:lstStyle/>
+          <a:p>
+            <a:pPr algn="ctr"/>
+            <a:endParaRPr lang="de-DE"/>
+          </a:p>
+        </p:txBody>
+      </p:sp>
+      <p:sp>
+        <p:nvSpPr>
+          <p:cNvPr id="46" name="Textfeld 45">
+            <a:extLst>
+              <a:ext uri="{FF2B5EF4-FFF2-40B4-BE49-F238E27FC236}">
+                <a16:creationId xmlns:a16="http://schemas.microsoft.com/office/drawing/2014/main" id="{5A03E1E0-20CD-AAE2-596C-A72F1743AB22}"/>
+              </a:ext>
+            </a:extLst>
+          </p:cNvPr>
+          <p:cNvSpPr txBox="1"/>
+          <p:nvPr/>
+        </p:nvSpPr>
+        <p:spPr>
+          <a:xfrm>
+            <a:off x="1235487" y="481510"/>
+            <a:ext cx="1717586" cy="369332"/>
+          </a:xfrm>
+          <a:prstGeom prst="rect">
+            <a:avLst/>
+          </a:prstGeom>
+          <a:noFill/>
+        </p:spPr>
+        <p:txBody>
+          <a:bodyPr wrap="none" rtlCol="0">
+            <a:spAutoFit/>
+          </a:bodyPr>
+          <a:lstStyle/>
+          <a:p>
+            <a:r>
+              <a:rPr lang="de-DE" dirty="0"/>
+              <a:t>Port </a:t>
+            </a:r>
+            <a:r>
+              <a:rPr lang="de-DE" dirty="0" err="1"/>
+              <a:t>forwarding</a:t>
+            </a:r>
+            <a:r>
+              <a:rPr lang="de-DE" dirty="0"/>
+              <a:t>:</a:t>
+            </a:r>
+          </a:p>
+        </p:txBody>
+      </p:sp>
+      <p:sp>
+        <p:nvSpPr>
+          <p:cNvPr id="29" name="Oval 28">
+            <a:extLst>
+              <a:ext uri="{FF2B5EF4-FFF2-40B4-BE49-F238E27FC236}">
+                <a16:creationId xmlns:a16="http://schemas.microsoft.com/office/drawing/2014/main" id="{707BEB12-C916-A745-1000-ADAF00456CF0}"/>
+              </a:ext>
+            </a:extLst>
+          </p:cNvPr>
+          <p:cNvSpPr/>
+          <p:nvPr/>
+        </p:nvSpPr>
+        <p:spPr>
+          <a:xfrm rot="5400000">
+            <a:off x="5233916" y="3106375"/>
+            <a:ext cx="2848977" cy="1007896"/>
+          </a:xfrm>
+          <a:prstGeom prst="ellipse">
+            <a:avLst/>
+          </a:prstGeom>
+          <a:solidFill>
+            <a:srgbClr val="FF0000">
+              <a:alpha val="23000"/>
+            </a:srgbClr>
+          </a:solidFill>
+        </p:spPr>
+        <p:style>
+          <a:lnRef idx="2">
+            <a:schemeClr val="accent1">
+              <a:shade val="50000"/>
+            </a:schemeClr>
+          </a:lnRef>
+          <a:fillRef idx="1">
+            <a:schemeClr val="accent1"/>
+          </a:fillRef>
+          <a:effectRef idx="0">
+            <a:schemeClr val="accent1"/>
+          </a:effectRef>
+          <a:fontRef idx="minor">
+            <a:schemeClr val="lt1"/>
+          </a:fontRef>
+        </p:style>
+        <p:txBody>
+          <a:bodyPr rtlCol="0" anchor="ctr"/>
+          <a:lstStyle/>
+          <a:p>
+            <a:pPr algn="ctr"/>
+            <a:endParaRPr lang="de-DE" dirty="0"/>
+          </a:p>
+        </p:txBody>
+      </p:sp>
+      <p:sp>
+        <p:nvSpPr>
+          <p:cNvPr id="30" name="Textfeld 29">
+            <a:extLst>
+              <a:ext uri="{FF2B5EF4-FFF2-40B4-BE49-F238E27FC236}">
+                <a16:creationId xmlns:a16="http://schemas.microsoft.com/office/drawing/2014/main" id="{BB335211-481F-C337-70A0-993E7A512672}"/>
+              </a:ext>
+            </a:extLst>
+          </p:cNvPr>
+          <p:cNvSpPr txBox="1"/>
+          <p:nvPr/>
+        </p:nvSpPr>
+        <p:spPr>
+          <a:xfrm>
+            <a:off x="6785320" y="2160673"/>
+            <a:ext cx="1026563" cy="646331"/>
+          </a:xfrm>
+          <a:prstGeom prst="rect">
+            <a:avLst/>
+          </a:prstGeom>
+          <a:noFill/>
+        </p:spPr>
+        <p:txBody>
+          <a:bodyPr wrap="none" rtlCol="0">
+            <a:spAutoFit/>
+          </a:bodyPr>
+          <a:lstStyle/>
+          <a:p>
+            <a:r>
+              <a:rPr lang="de-DE" dirty="0" err="1">
+                <a:solidFill>
+                  <a:srgbClr val="FF0000"/>
+                </a:solidFill>
+              </a:rPr>
+              <a:t>localhost</a:t>
+            </a:r>
+            <a:br>
+              <a:rPr lang="de-DE" dirty="0">
+                <a:solidFill>
+                  <a:srgbClr val="FF0000"/>
+                </a:solidFill>
+              </a:rPr>
+            </a:br>
+            <a:r>
+              <a:rPr lang="de-DE" dirty="0">
+                <a:solidFill>
+                  <a:srgbClr val="FF0000"/>
+                </a:solidFill>
+              </a:rPr>
+              <a:t>5432</a:t>
+            </a:r>
+          </a:p>
+        </p:txBody>
+      </p:sp>
+      <p:cxnSp>
+        <p:nvCxnSpPr>
+          <p:cNvPr id="32" name="Gerade Verbindung mit Pfeil 31">
+            <a:extLst>
+              <a:ext uri="{FF2B5EF4-FFF2-40B4-BE49-F238E27FC236}">
+                <a16:creationId xmlns:a16="http://schemas.microsoft.com/office/drawing/2014/main" id="{A2ED06EF-8F8D-4412-6824-B6A2E350461F}"/>
+              </a:ext>
+            </a:extLst>
+          </p:cNvPr>
+          <p:cNvCxnSpPr>
+            <a:cxnSpLocks/>
+            <a:stCxn id="17" idx="2"/>
+          </p:cNvCxnSpPr>
+          <p:nvPr/>
+        </p:nvCxnSpPr>
+        <p:spPr>
+          <a:xfrm flipH="1">
+            <a:off x="4037881" y="2312808"/>
+            <a:ext cx="1" cy="360546"/>
+          </a:xfrm>
+          <a:prstGeom prst="straightConnector1">
+            <a:avLst/>
+          </a:prstGeom>
+          <a:ln w="38100">
+            <a:solidFill>
+              <a:srgbClr val="FF0000"/>
+            </a:solidFill>
+            <a:tailEnd type="triangle"/>
+          </a:ln>
+        </p:spPr>
+        <p:style>
+          <a:lnRef idx="1">
+            <a:schemeClr val="accent1"/>
+          </a:lnRef>
+          <a:fillRef idx="0">
+            <a:schemeClr val="accent1"/>
+          </a:fillRef>
+          <a:effectRef idx="0">
+            <a:schemeClr val="accent1"/>
+          </a:effectRef>
+          <a:fontRef idx="minor">
+            <a:schemeClr val="tx1"/>
+          </a:fontRef>
+        </p:style>
+      </p:cxnSp>
+      <p:sp>
+        <p:nvSpPr>
+          <p:cNvPr id="33" name="Textfeld 32">
+            <a:extLst>
+              <a:ext uri="{FF2B5EF4-FFF2-40B4-BE49-F238E27FC236}">
+                <a16:creationId xmlns:a16="http://schemas.microsoft.com/office/drawing/2014/main" id="{B588909F-307A-C100-2D4B-C31E014D9E66}"/>
+              </a:ext>
+            </a:extLst>
+          </p:cNvPr>
+          <p:cNvSpPr txBox="1"/>
+          <p:nvPr/>
+        </p:nvSpPr>
+        <p:spPr>
+          <a:xfrm>
+            <a:off x="6785320" y="242420"/>
+            <a:ext cx="4558401" cy="923330"/>
+          </a:xfrm>
+          <a:prstGeom prst="rect">
+            <a:avLst/>
+          </a:prstGeom>
+          <a:noFill/>
+        </p:spPr>
+        <p:txBody>
+          <a:bodyPr wrap="square" rtlCol="0">
+            <a:spAutoFit/>
+          </a:bodyPr>
+          <a:lstStyle/>
+          <a:p>
+            <a:r>
+              <a:rPr lang="de-DE" dirty="0"/>
+              <a:t>Jeder Docker-Container verhält sich wie eine eigenständige Linux-Maschine</a:t>
+            </a:r>
+            <a:br>
+              <a:rPr lang="de-DE" dirty="0"/>
+            </a:br>
+            <a:r>
+              <a:rPr lang="de-DE" dirty="0"/>
+              <a:t>(nutzt Linux-Kernel-Virtualisierung)</a:t>
             </a:r>
           </a:p>
         </p:txBody>
@@ -18518,7 +18931,7 @@
     </p:spTree>
     <p:extLst>
       <p:ext uri="{BB962C8B-B14F-4D97-AF65-F5344CB8AC3E}">
-        <p14:creationId xmlns:p14="http://schemas.microsoft.com/office/powerpoint/2010/main" val="3492998218"/>
+        <p14:creationId xmlns:p14="http://schemas.microsoft.com/office/powerpoint/2010/main" val="4049937503"/>
       </p:ext>
     </p:extLst>
   </p:cSld>
@@ -19359,52 +19772,6 @@
       </p:sp>
       <p:cxnSp>
         <p:nvCxnSpPr>
-          <p:cNvPr id="28" name="Gerade Verbindung mit Pfeil 27">
-            <a:extLst>
-              <a:ext uri="{FF2B5EF4-FFF2-40B4-BE49-F238E27FC236}">
-                <a16:creationId xmlns:a16="http://schemas.microsoft.com/office/drawing/2014/main" id="{295CC962-C4B6-5A0C-3D64-F32969520C4A}"/>
-              </a:ext>
-            </a:extLst>
-          </p:cNvPr>
-          <p:cNvCxnSpPr>
-            <a:cxnSpLocks/>
-            <a:stCxn id="12" idx="3"/>
-            <a:endCxn id="27" idx="0"/>
-          </p:cNvCxnSpPr>
-          <p:nvPr/>
-        </p:nvCxnSpPr>
-        <p:spPr>
-          <a:xfrm>
-            <a:off x="5475579" y="4584748"/>
-            <a:ext cx="736280" cy="14622"/>
-          </a:xfrm>
-          <a:prstGeom prst="straightConnector1">
-            <a:avLst/>
-          </a:prstGeom>
-          <a:ln w="38100">
-            <a:solidFill>
-              <a:srgbClr val="FF0000"/>
-            </a:solidFill>
-            <a:tailEnd type="triangle"/>
-          </a:ln>
-        </p:spPr>
-        <p:style>
-          <a:lnRef idx="1">
-            <a:schemeClr val="accent1"/>
-          </a:lnRef>
-          <a:fillRef idx="0">
-            <a:schemeClr val="accent1"/>
-          </a:fillRef>
-          <a:effectRef idx="0">
-            <a:schemeClr val="accent1"/>
-          </a:effectRef>
-          <a:fontRef idx="minor">
-            <a:schemeClr val="tx1"/>
-          </a:fontRef>
-        </p:style>
-      </p:cxnSp>
-      <p:cxnSp>
-        <p:nvCxnSpPr>
           <p:cNvPr id="31" name="Gerade Verbindung mit Pfeil 30">
             <a:extLst>
               <a:ext uri="{FF2B5EF4-FFF2-40B4-BE49-F238E27FC236}">
@@ -19799,7 +20166,7 @@
     </p:spTree>
     <p:extLst>
       <p:ext uri="{BB962C8B-B14F-4D97-AF65-F5344CB8AC3E}">
-        <p14:creationId xmlns:p14="http://schemas.microsoft.com/office/powerpoint/2010/main" val="4049937503"/>
+        <p14:creationId xmlns:p14="http://schemas.microsoft.com/office/powerpoint/2010/main" val="2837291272"/>
       </p:ext>
     </p:extLst>
   </p:cSld>
@@ -19901,7 +20268,11 @@
           <a:lstStyle/>
           <a:p>
             <a:r>
-              <a:rPr lang="de-DE" dirty="0"/>
+              <a:rPr lang="de-DE" dirty="0">
+                <a:solidFill>
+                  <a:schemeClr val="bg1"/>
+                </a:solidFill>
+              </a:rPr>
               <a:t>Cloud</a:t>
             </a:r>
           </a:p>
@@ -20304,7 +20675,7 @@
         <p:spPr>
           <a:xfrm>
             <a:off x="3853496" y="3040778"/>
-            <a:ext cx="1269194" cy="369332"/>
+            <a:ext cx="1249958" cy="369332"/>
           </a:xfrm>
           <a:prstGeom prst="rect">
             <a:avLst/>
@@ -20318,8 +20689,12 @@
           <a:lstStyle/>
           <a:p>
             <a:r>
-              <a:rPr lang="de-DE" dirty="0"/>
-              <a:t>Java-starter</a:t>
+              <a:rPr lang="de-DE" dirty="0" err="1"/>
+              <a:t>java</a:t>
+            </a:r>
+            <a:r>
+              <a:rPr lang="de-DE" dirty="0"/>
+              <a:t>-starter</a:t>
             </a:r>
           </a:p>
         </p:txBody>
@@ -20399,10 +20774,18 @@
           <a:lstStyle/>
           <a:p>
             <a:r>
-              <a:rPr lang="de-DE" dirty="0" err="1"/>
+              <a:rPr lang="de-DE" dirty="0" err="1">
+                <a:solidFill>
+                  <a:schemeClr val="bg1"/>
+                </a:solidFill>
+              </a:rPr>
               <a:t>MeinComputer</a:t>
             </a:r>
-            <a:endParaRPr lang="de-DE" dirty="0"/>
+            <a:endParaRPr lang="de-DE" dirty="0">
+              <a:solidFill>
+                <a:schemeClr val="bg1"/>
+              </a:solidFill>
+            </a:endParaRPr>
           </a:p>
         </p:txBody>
       </p:sp>
@@ -20816,6 +21199,122 @@
               <a:rPr lang="de-DE" dirty="0"/>
               <a:t>Thema: Persistenz mit Spring Data</a:t>
             </a:r>
+          </a:p>
+          <a:p>
+            <a:pPr lvl="1"/>
+            <a:r>
+              <a:rPr lang="de-DE" dirty="0"/>
+              <a:t>ORM: </a:t>
+            </a:r>
+            <a:r>
+              <a:rPr lang="de-DE" dirty="0" err="1"/>
+              <a:t>Object</a:t>
+            </a:r>
+            <a:r>
+              <a:rPr lang="de-DE" dirty="0"/>
+              <a:t>-relational </a:t>
+            </a:r>
+            <a:r>
+              <a:rPr lang="de-DE" dirty="0" err="1"/>
+              <a:t>mapping</a:t>
+            </a:r>
+            <a:endParaRPr lang="de-DE" dirty="0"/>
+          </a:p>
+          <a:p>
+            <a:pPr lvl="2"/>
+            <a:r>
+              <a:rPr lang="de-DE" dirty="0"/>
+              <a:t>Klasse </a:t>
+            </a:r>
+            <a:r>
+              <a:rPr lang="de-DE" dirty="0">
+                <a:sym typeface="Wingdings" pitchFamily="2" charset="2"/>
+              </a:rPr>
+              <a:t> Datenbanktabelle</a:t>
+            </a:r>
+          </a:p>
+          <a:p>
+            <a:pPr lvl="2"/>
+            <a:r>
+              <a:rPr lang="de-DE" dirty="0">
+                <a:sym typeface="Wingdings" pitchFamily="2" charset="2"/>
+              </a:rPr>
+              <a:t>Objekt  Datenbankeintrag (Zeile in Tabelle)</a:t>
+            </a:r>
+          </a:p>
+          <a:p>
+            <a:pPr lvl="1"/>
+            <a:r>
+              <a:rPr lang="de-DE" dirty="0">
+                <a:sym typeface="Wingdings" pitchFamily="2" charset="2"/>
+              </a:rPr>
+              <a:t>Mapping-Regeln (Auszug)</a:t>
+            </a:r>
+          </a:p>
+          <a:p>
+            <a:pPr lvl="2"/>
+            <a:r>
+              <a:rPr lang="de-DE" dirty="0">
+                <a:sym typeface="Wingdings" pitchFamily="2" charset="2"/>
+              </a:rPr>
+              <a:t>Klasse  Tabelle</a:t>
+            </a:r>
+          </a:p>
+          <a:p>
+            <a:pPr lvl="2"/>
+            <a:r>
+              <a:rPr lang="de-DE" dirty="0">
+                <a:sym typeface="Wingdings" pitchFamily="2" charset="2"/>
+              </a:rPr>
+              <a:t>Feld (Attribut)  Spalte</a:t>
+            </a:r>
+          </a:p>
+          <a:p>
+            <a:pPr lvl="2"/>
+            <a:r>
+              <a:rPr lang="de-DE" dirty="0">
+                <a:sym typeface="Wingdings" pitchFamily="2" charset="2"/>
+              </a:rPr>
+              <a:t>Beziehung  Fremdschlüssel-Beziehung (evtl. mit Relationen-Tabelle)</a:t>
+            </a:r>
+          </a:p>
+          <a:p>
+            <a:pPr lvl="1"/>
+            <a:r>
+              <a:rPr lang="de-DE" dirty="0">
+                <a:sym typeface="Wingdings" pitchFamily="2" charset="2"/>
+              </a:rPr>
+              <a:t>Bekannteste Library: Hibernate</a:t>
+            </a:r>
+          </a:p>
+          <a:p>
+            <a:pPr lvl="2"/>
+            <a:r>
+              <a:rPr lang="de-DE" dirty="0">
+                <a:sym typeface="Wingdings" pitchFamily="2" charset="2"/>
+                <a:hlinkClick r:id="rId2"/>
+              </a:rPr>
+              <a:t>https://hibernate.org/</a:t>
+            </a:r>
+            <a:endParaRPr lang="de-DE" dirty="0">
+              <a:sym typeface="Wingdings" pitchFamily="2" charset="2"/>
+            </a:endParaRPr>
+          </a:p>
+          <a:p>
+            <a:pPr lvl="2"/>
+            <a:r>
+              <a:rPr lang="de-DE" dirty="0">
+                <a:sym typeface="Wingdings" pitchFamily="2" charset="2"/>
+              </a:rPr>
+              <a:t>Wird von Spring </a:t>
+            </a:r>
+            <a:r>
+              <a:rPr lang="de-DE">
+                <a:sym typeface="Wingdings" pitchFamily="2" charset="2"/>
+              </a:rPr>
+              <a:t>Data genutzt</a:t>
+            </a:r>
+            <a:endParaRPr lang="de-DE" dirty="0"/>
           </a:p>
         </p:txBody>
       </p:sp>

</xml_diff>